<commit_message>
added content to powerpoint
</commit_message>
<xml_diff>
--- a/GIT HUB Branching & Merging.pptx
+++ b/GIT HUB Branching & Merging.pptx
@@ -5,17 +5,19 @@
     <p:sldMasterId id="2147483648" r:id="rId4"/>
   </p:sldMasterIdLst>
   <p:notesMasterIdLst>
-    <p:notesMasterId r:id="rId10"/>
+    <p:notesMasterId r:id="rId12"/>
   </p:notesMasterIdLst>
   <p:handoutMasterIdLst>
-    <p:handoutMasterId r:id="rId11"/>
+    <p:handoutMasterId r:id="rId13"/>
   </p:handoutMasterIdLst>
   <p:sldIdLst>
     <p:sldId id="256" r:id="rId5"/>
-    <p:sldId id="257" r:id="rId6"/>
-    <p:sldId id="258" r:id="rId7"/>
-    <p:sldId id="259" r:id="rId8"/>
-    <p:sldId id="260" r:id="rId9"/>
+    <p:sldId id="263" r:id="rId6"/>
+    <p:sldId id="257" r:id="rId7"/>
+    <p:sldId id="261" r:id="rId8"/>
+    <p:sldId id="258" r:id="rId9"/>
+    <p:sldId id="259" r:id="rId10"/>
+    <p:sldId id="260" r:id="rId11"/>
   </p:sldIdLst>
   <p:sldSz cx="12192000" cy="6858000"/>
   <p:notesSz cx="6858000" cy="9144000"/>
@@ -218,7 +220,7 @@
           <a:p>
             <a:fld id="{762B48F5-BACC-47D6-A0F7-82FBF9C6BC85}" type="datetimeFigureOut">
               <a:rPr lang="en-US"/>
-              <a:t>9/25/2017</a:t>
+              <a:t>9/26/2017</a:t>
             </a:fld>
             <a:endParaRPr/>
           </a:p>
@@ -383,7 +385,7 @@
           <a:p>
             <a:fld id="{0CB1CD00-5424-4675-AB18-2C419B060449}" type="datetimeFigureOut">
               <a:rPr lang="en-US"/>
-              <a:t>9/25/2017</a:t>
+              <a:t>9/26/2017</a:t>
             </a:fld>
             <a:endParaRPr/>
           </a:p>
@@ -1034,7 +1036,7 @@
           <a:p>
             <a:fld id="{37CC0096-1860-4642-9CD2-0079EA5E7CD1}" type="datetimeFigureOut">
               <a:rPr lang="en-US" smtClean="0"/>
-              <a:t>9/25/2017</a:t>
+              <a:t>9/26/2017</a:t>
             </a:fld>
             <a:endParaRPr lang="en-US"/>
           </a:p>
@@ -1214,7 +1216,7 @@
           <a:p>
             <a:fld id="{37CC0096-1860-4642-9CD2-0079EA5E7CD1}" type="datetimeFigureOut">
               <a:rPr lang="en-US" smtClean="0"/>
-              <a:t>9/25/2017</a:t>
+              <a:t>9/26/2017</a:t>
             </a:fld>
             <a:endParaRPr lang="en-US"/>
           </a:p>
@@ -1388,7 +1390,7 @@
           <a:p>
             <a:fld id="{37CC0096-1860-4642-9CD2-0079EA5E7CD1}" type="datetimeFigureOut">
               <a:rPr lang="en-US" smtClean="0"/>
-              <a:t>9/25/2017</a:t>
+              <a:t>9/26/2017</a:t>
             </a:fld>
             <a:endParaRPr lang="en-US"/>
           </a:p>
@@ -1823,7 +1825,7 @@
           <a:p>
             <a:fld id="{37CC0096-1860-4642-9CD2-0079EA5E7CD1}" type="datetimeFigureOut">
               <a:rPr lang="en-US" smtClean="0"/>
-              <a:t>9/25/2017</a:t>
+              <a:t>9/26/2017</a:t>
             </a:fld>
             <a:endParaRPr lang="en-US"/>
           </a:p>
@@ -2263,7 +2265,7 @@
           <a:p>
             <a:fld id="{37CC0096-1860-4642-9CD2-0079EA5E7CD1}" type="datetimeFigureOut">
               <a:rPr lang="en-US" smtClean="0"/>
-              <a:t>9/25/2017</a:t>
+              <a:t>9/26/2017</a:t>
             </a:fld>
             <a:endParaRPr lang="en-US"/>
           </a:p>
@@ -2381,7 +2383,7 @@
           <a:p>
             <a:fld id="{37CC0096-1860-4642-9CD2-0079EA5E7CD1}" type="datetimeFigureOut">
               <a:rPr lang="en-US" smtClean="0"/>
-              <a:t>9/25/2017</a:t>
+              <a:t>9/26/2017</a:t>
             </a:fld>
             <a:endParaRPr lang="en-US"/>
           </a:p>
@@ -2476,7 +2478,7 @@
           <a:p>
             <a:fld id="{37CC0096-1860-4642-9CD2-0079EA5E7CD1}" type="datetimeFigureOut">
               <a:rPr lang="en-US" smtClean="0"/>
-              <a:t>9/25/2017</a:t>
+              <a:t>9/26/2017</a:t>
             </a:fld>
             <a:endParaRPr lang="en-US"/>
           </a:p>
@@ -2760,7 +2762,7 @@
           <a:p>
             <a:fld id="{37CC0096-1860-4642-9CD2-0079EA5E7CD1}" type="datetimeFigureOut">
               <a:rPr lang="en-US" smtClean="0"/>
-              <a:t>9/25/2017</a:t>
+              <a:t>9/26/2017</a:t>
             </a:fld>
             <a:endParaRPr lang="en-US"/>
           </a:p>
@@ -3073,7 +3075,7 @@
           <a:p>
             <a:fld id="{37CC0096-1860-4642-9CD2-0079EA5E7CD1}" type="datetimeFigureOut">
               <a:rPr lang="en-US" smtClean="0"/>
-              <a:t>9/25/2017</a:t>
+              <a:t>9/26/2017</a:t>
             </a:fld>
             <a:endParaRPr lang="en-US"/>
           </a:p>
@@ -3305,7 +3307,7 @@
             <a:fld id="{37CC0096-1860-4642-9CD2-0079EA5E7CD1}" type="datetimeFigureOut">
               <a:rPr lang="en-US" smtClean="0"/>
               <a:pPr/>
-              <a:t>9/25/2017</a:t>
+              <a:t>9/26/2017</a:t>
             </a:fld>
             <a:endParaRPr lang="en-US"/>
           </a:p>
@@ -3771,12 +3773,28 @@
               <a:t>Presented by </a:t>
             </a:r>
             <a:r>
-              <a:rPr lang="en-US" dirty="0" err="1" smtClean="0"/>
+              <a:rPr lang="en-US" dirty="0" smtClean="0"/>
+              <a:t>Adam</a:t>
+            </a:r>
+            <a:r>
+              <a:rPr lang="en-US" dirty="0" smtClean="0"/>
+              <a:t>, </a:t>
+            </a:r>
+            <a:r>
+              <a:rPr lang="en-US" dirty="0" smtClean="0"/>
+              <a:t>Justin, </a:t>
+            </a:r>
+            <a:r>
+              <a:rPr lang="en-US" dirty="0" smtClean="0"/>
               <a:t>Kalin</a:t>
             </a:r>
             <a:r>
               <a:rPr lang="en-US" dirty="0" smtClean="0"/>
-              <a:t>, Justin, Adam &amp; Ashley</a:t>
+              <a:t> </a:t>
+            </a:r>
+            <a:r>
+              <a:rPr lang="en-US" dirty="0" smtClean="0"/>
+              <a:t>&amp; Ashley</a:t>
             </a:r>
             <a:endParaRPr dirty="0"/>
           </a:p>
@@ -3792,6 +3810,13 @@
   <p:clrMapOvr>
     <a:masterClrMapping/>
   </p:clrMapOvr>
+  <p:timing>
+    <p:tnLst>
+      <p:par>
+        <p:cTn id="1" dur="indefinite" restart="never" nodeType="tmRoot"/>
+      </p:par>
+    </p:tnLst>
+  </p:timing>
 </p:sld>
 </file>
 
@@ -3822,6 +3847,264 @@
             <p:ph type="title"/>
           </p:nvPr>
         </p:nvSpPr>
+        <p:spPr/>
+        <p:txBody>
+          <a:bodyPr/>
+          <a:lstStyle/>
+          <a:p>
+            <a:pPr algn="ctr"/>
+            <a:r>
+              <a:rPr lang="en-US" dirty="0" smtClean="0"/>
+              <a:t>Basic </a:t>
+            </a:r>
+            <a:r>
+              <a:rPr lang="en-US" dirty="0" err="1" smtClean="0"/>
+              <a:t>Git</a:t>
+            </a:r>
+            <a:r>
+              <a:rPr lang="en-US" dirty="0" smtClean="0"/>
+              <a:t> Commands</a:t>
+            </a:r>
+            <a:endParaRPr lang="en-US" dirty="0"/>
+          </a:p>
+        </p:txBody>
+      </p:sp>
+      <p:sp>
+        <p:nvSpPr>
+          <p:cNvPr id="3" name="Content Placeholder 2"/>
+          <p:cNvSpPr>
+            <a:spLocks noGrp="1"/>
+          </p:cNvSpPr>
+          <p:nvPr>
+            <p:ph sz="half" idx="1"/>
+          </p:nvPr>
+        </p:nvSpPr>
+        <p:spPr/>
+        <p:txBody>
+          <a:bodyPr/>
+          <a:lstStyle/>
+          <a:p>
+            <a:r>
+              <a:rPr lang="en-US" dirty="0" err="1" smtClean="0"/>
+              <a:t>Git</a:t>
+            </a:r>
+            <a:r>
+              <a:rPr lang="en-US" dirty="0" smtClean="0"/>
+              <a:t> Commands</a:t>
+            </a:r>
+          </a:p>
+          <a:p>
+            <a:pPr lvl="1"/>
+            <a:r>
+              <a:rPr lang="en-US" dirty="0" err="1" smtClean="0"/>
+              <a:t>git</a:t>
+            </a:r>
+            <a:r>
+              <a:rPr lang="en-US" dirty="0" smtClean="0"/>
+              <a:t> </a:t>
+            </a:r>
+            <a:r>
+              <a:rPr lang="en-US" dirty="0" err="1" smtClean="0"/>
+              <a:t>init</a:t>
+            </a:r>
+            <a:endParaRPr lang="en-US" dirty="0" smtClean="0"/>
+          </a:p>
+          <a:p>
+            <a:pPr lvl="1"/>
+            <a:r>
+              <a:rPr lang="en-US" dirty="0" err="1" smtClean="0"/>
+              <a:t>git</a:t>
+            </a:r>
+            <a:r>
+              <a:rPr lang="en-US" dirty="0" smtClean="0"/>
+              <a:t> clone &lt;repo URL&gt;</a:t>
+            </a:r>
+          </a:p>
+          <a:p>
+            <a:pPr lvl="1"/>
+            <a:r>
+              <a:rPr lang="en-US" dirty="0" err="1" smtClean="0"/>
+              <a:t>git</a:t>
+            </a:r>
+            <a:r>
+              <a:rPr lang="en-US" dirty="0" smtClean="0"/>
+              <a:t> add .</a:t>
+            </a:r>
+          </a:p>
+          <a:p>
+            <a:pPr lvl="1"/>
+            <a:r>
+              <a:rPr lang="en-US" dirty="0" err="1" smtClean="0"/>
+              <a:t>git</a:t>
+            </a:r>
+            <a:r>
+              <a:rPr lang="en-US" dirty="0" smtClean="0"/>
+              <a:t> add &lt;file-name&gt;</a:t>
+            </a:r>
+          </a:p>
+          <a:p>
+            <a:pPr lvl="1"/>
+            <a:r>
+              <a:rPr lang="en-US" dirty="0" err="1" smtClean="0"/>
+              <a:t>git</a:t>
+            </a:r>
+            <a:r>
+              <a:rPr lang="en-US" dirty="0" smtClean="0"/>
+              <a:t> commit –</a:t>
+            </a:r>
+            <a:r>
+              <a:rPr lang="en-US" dirty="0" err="1" smtClean="0"/>
+              <a:t>m’some</a:t>
+            </a:r>
+            <a:r>
+              <a:rPr lang="en-US" dirty="0" smtClean="0"/>
+              <a:t> comment’</a:t>
+            </a:r>
+          </a:p>
+          <a:p>
+            <a:pPr lvl="1"/>
+            <a:r>
+              <a:rPr lang="en-US" dirty="0" err="1" smtClean="0"/>
+              <a:t>git</a:t>
+            </a:r>
+            <a:r>
+              <a:rPr lang="en-US" dirty="0" smtClean="0"/>
+              <a:t> push</a:t>
+            </a:r>
+          </a:p>
+          <a:p>
+            <a:pPr lvl="1"/>
+            <a:r>
+              <a:rPr lang="en-US" dirty="0" err="1" smtClean="0"/>
+              <a:t>git</a:t>
+            </a:r>
+            <a:r>
+              <a:rPr lang="en-US" dirty="0" smtClean="0"/>
+              <a:t> pull</a:t>
+            </a:r>
+            <a:endParaRPr lang="en-US" dirty="0"/>
+          </a:p>
+        </p:txBody>
+      </p:sp>
+      <p:sp>
+        <p:nvSpPr>
+          <p:cNvPr id="4" name="Content Placeholder 3"/>
+          <p:cNvSpPr>
+            <a:spLocks noGrp="1"/>
+          </p:cNvSpPr>
+          <p:nvPr>
+            <p:ph sz="half" idx="2"/>
+          </p:nvPr>
+        </p:nvSpPr>
+        <p:spPr/>
+        <p:txBody>
+          <a:bodyPr/>
+          <a:lstStyle/>
+          <a:p>
+            <a:r>
+              <a:rPr lang="en-US" dirty="0" smtClean="0"/>
+              <a:t>What They Do</a:t>
+            </a:r>
+          </a:p>
+          <a:p>
+            <a:pPr lvl="1"/>
+            <a:r>
+              <a:rPr lang="en-US" dirty="0" smtClean="0"/>
+              <a:t>Initializes Repo</a:t>
+            </a:r>
+          </a:p>
+          <a:p>
+            <a:pPr lvl="1"/>
+            <a:r>
+              <a:rPr lang="en-US" dirty="0" smtClean="0"/>
+              <a:t>Clones the repo to a location</a:t>
+            </a:r>
+          </a:p>
+          <a:p>
+            <a:pPr lvl="1"/>
+            <a:r>
+              <a:rPr lang="en-US" dirty="0" smtClean="0"/>
+              <a:t>Adds ALL files to the staging area</a:t>
+            </a:r>
+          </a:p>
+          <a:p>
+            <a:pPr lvl="1"/>
+            <a:r>
+              <a:rPr lang="en-US" dirty="0" smtClean="0"/>
+              <a:t>Adds the specified file to stage</a:t>
+            </a:r>
+          </a:p>
+          <a:p>
+            <a:pPr lvl="1"/>
+            <a:r>
+              <a:rPr lang="en-US" dirty="0" smtClean="0"/>
+              <a:t>Commits all staged files</a:t>
+            </a:r>
+          </a:p>
+          <a:p>
+            <a:pPr lvl="1"/>
+            <a:r>
+              <a:rPr lang="en-US" dirty="0" smtClean="0"/>
+              <a:t>Pushes the changes to GitHub</a:t>
+            </a:r>
+          </a:p>
+          <a:p>
+            <a:pPr lvl="1"/>
+            <a:r>
+              <a:rPr lang="en-US" dirty="0" smtClean="0"/>
+              <a:t>Grabs any changes from GitHub</a:t>
+            </a:r>
+            <a:endParaRPr lang="en-US" dirty="0"/>
+          </a:p>
+        </p:txBody>
+      </p:sp>
+    </p:spTree>
+    <p:extLst>
+      <p:ext uri="{BB962C8B-B14F-4D97-AF65-F5344CB8AC3E}">
+        <p14:creationId xmlns:p14="http://schemas.microsoft.com/office/powerpoint/2010/main" val="3779814757"/>
+      </p:ext>
+    </p:extLst>
+  </p:cSld>
+  <p:clrMapOvr>
+    <a:masterClrMapping/>
+  </p:clrMapOvr>
+  <p:timing>
+    <p:tnLst>
+      <p:par>
+        <p:cTn id="1" dur="indefinite" restart="never" nodeType="tmRoot"/>
+      </p:par>
+    </p:tnLst>
+  </p:timing>
+</p:sld>
+</file>
+
+<file path=ppt/slides/slide3.xml><?xml version="1.0" encoding="utf-8"?>
+<p:sld xmlns:a="http://schemas.openxmlformats.org/drawingml/2006/main" xmlns:r="http://schemas.openxmlformats.org/officeDocument/2006/relationships" xmlns:p="http://schemas.openxmlformats.org/presentationml/2006/main">
+  <p:cSld>
+    <p:spTree>
+      <p:nvGrpSpPr>
+        <p:cNvPr id="1" name=""/>
+        <p:cNvGrpSpPr/>
+        <p:nvPr/>
+      </p:nvGrpSpPr>
+      <p:grpSpPr>
+        <a:xfrm>
+          <a:off x="0" y="0"/>
+          <a:ext cx="0" cy="0"/>
+          <a:chOff x="0" y="0"/>
+          <a:chExt cx="0" cy="0"/>
+        </a:xfrm>
+      </p:grpSpPr>
+      <p:sp>
+        <p:nvSpPr>
+          <p:cNvPr id="2" name="Title 1"/>
+          <p:cNvSpPr>
+            <a:spLocks noGrp="1"/>
+          </p:cNvSpPr>
+          <p:nvPr>
+            <p:ph type="title"/>
+          </p:nvPr>
+        </p:nvSpPr>
         <p:spPr>
           <a:xfrm>
             <a:off x="1524000" y="457200"/>
@@ -3867,8 +4150,8 @@
         </p:blipFill>
         <p:spPr>
           <a:xfrm>
-            <a:off x="1447800" y="1825625"/>
-            <a:ext cx="4343400" cy="1883118"/>
+            <a:off x="457200" y="2514600"/>
+            <a:ext cx="5448399" cy="2362200"/>
           </a:xfrm>
         </p:spPr>
       </p:pic>
@@ -3914,10 +4197,215 @@
   <p:clrMapOvr>
     <a:masterClrMapping/>
   </p:clrMapOvr>
+  <p:timing>
+    <p:tnLst>
+      <p:par>
+        <p:cTn id="1" dur="indefinite" restart="never" nodeType="tmRoot"/>
+      </p:par>
+    </p:tnLst>
+  </p:timing>
 </p:sld>
 </file>
 
-<file path=ppt/slides/slide3.xml><?xml version="1.0" encoding="utf-8"?>
+<file path=ppt/slides/slide4.xml><?xml version="1.0" encoding="utf-8"?>
+<p:sld xmlns:a="http://schemas.openxmlformats.org/drawingml/2006/main" xmlns:r="http://schemas.openxmlformats.org/officeDocument/2006/relationships" xmlns:p="http://schemas.openxmlformats.org/presentationml/2006/main">
+  <p:cSld>
+    <p:spTree>
+      <p:nvGrpSpPr>
+        <p:cNvPr id="1" name=""/>
+        <p:cNvGrpSpPr/>
+        <p:nvPr/>
+      </p:nvGrpSpPr>
+      <p:grpSpPr>
+        <a:xfrm>
+          <a:off x="0" y="0"/>
+          <a:ext cx="0" cy="0"/>
+          <a:chOff x="0" y="0"/>
+          <a:chExt cx="0" cy="0"/>
+        </a:xfrm>
+      </p:grpSpPr>
+      <p:sp>
+        <p:nvSpPr>
+          <p:cNvPr id="2" name="Title 1"/>
+          <p:cNvSpPr>
+            <a:spLocks noGrp="1"/>
+          </p:cNvSpPr>
+          <p:nvPr>
+            <p:ph type="title"/>
+          </p:nvPr>
+        </p:nvSpPr>
+        <p:spPr>
+          <a:xfrm>
+            <a:off x="1524000" y="457200"/>
+            <a:ext cx="9144000" cy="914400"/>
+          </a:xfrm>
+        </p:spPr>
+        <p:txBody>
+          <a:bodyPr>
+            <a:normAutofit/>
+          </a:bodyPr>
+          <a:lstStyle/>
+          <a:p>
+            <a:pPr algn="ctr"/>
+            <a:r>
+              <a:rPr lang="en-US" sz="4400" dirty="0" err="1" smtClean="0"/>
+              <a:t>Git</a:t>
+            </a:r>
+            <a:r>
+              <a:rPr lang="en-US" sz="4400" dirty="0" smtClean="0"/>
+              <a:t> Branchy</a:t>
+            </a:r>
+            <a:endParaRPr lang="en-US" sz="4400" dirty="0"/>
+          </a:p>
+        </p:txBody>
+      </p:sp>
+      <p:sp>
+        <p:nvSpPr>
+          <p:cNvPr id="3" name="Content Placeholder 2"/>
+          <p:cNvSpPr>
+            <a:spLocks noGrp="1"/>
+          </p:cNvSpPr>
+          <p:nvPr>
+            <p:ph sz="half" idx="1"/>
+          </p:nvPr>
+        </p:nvSpPr>
+        <p:spPr/>
+        <p:txBody>
+          <a:bodyPr/>
+          <a:lstStyle/>
+          <a:p>
+            <a:r>
+              <a:rPr lang="en-US" dirty="0" smtClean="0"/>
+              <a:t>Common </a:t>
+            </a:r>
+            <a:r>
+              <a:rPr lang="en-US" dirty="0" err="1" smtClean="0"/>
+              <a:t>Git</a:t>
+            </a:r>
+            <a:r>
+              <a:rPr lang="en-US" dirty="0" smtClean="0"/>
+              <a:t> Branch Commands</a:t>
+            </a:r>
+          </a:p>
+          <a:p>
+            <a:pPr lvl="1"/>
+            <a:r>
+              <a:rPr lang="en-US" dirty="0" err="1" smtClean="0"/>
+              <a:t>git</a:t>
+            </a:r>
+            <a:r>
+              <a:rPr lang="en-US" dirty="0" smtClean="0"/>
+              <a:t> branch &lt;branch-Name&gt;</a:t>
+            </a:r>
+          </a:p>
+          <a:p>
+            <a:pPr lvl="1"/>
+            <a:r>
+              <a:rPr lang="en-US" dirty="0" err="1" smtClean="0"/>
+              <a:t>git</a:t>
+            </a:r>
+            <a:r>
+              <a:rPr lang="en-US" dirty="0" smtClean="0"/>
+              <a:t> checkout ‘branch-Name’</a:t>
+            </a:r>
+          </a:p>
+          <a:p>
+            <a:pPr lvl="1"/>
+            <a:r>
+              <a:rPr lang="en-US" dirty="0" err="1" smtClean="0"/>
+              <a:t>git</a:t>
+            </a:r>
+            <a:r>
+              <a:rPr lang="en-US" dirty="0" smtClean="0"/>
+              <a:t> branch -d &lt;branch-Name&gt;</a:t>
+            </a:r>
+          </a:p>
+          <a:p>
+            <a:pPr lvl="1"/>
+            <a:r>
+              <a:rPr lang="en-US" dirty="0" err="1" smtClean="0"/>
+              <a:t>git</a:t>
+            </a:r>
+            <a:r>
+              <a:rPr lang="en-US" dirty="0" smtClean="0"/>
+              <a:t> branch –D &lt;branch-Name&gt;</a:t>
+            </a:r>
+            <a:endParaRPr lang="en-US" dirty="0"/>
+          </a:p>
+        </p:txBody>
+      </p:sp>
+      <p:sp>
+        <p:nvSpPr>
+          <p:cNvPr id="4" name="Content Placeholder 3"/>
+          <p:cNvSpPr>
+            <a:spLocks noGrp="1"/>
+          </p:cNvSpPr>
+          <p:nvPr>
+            <p:ph sz="half" idx="2"/>
+          </p:nvPr>
+        </p:nvSpPr>
+        <p:spPr/>
+        <p:txBody>
+          <a:bodyPr/>
+          <a:lstStyle/>
+          <a:p>
+            <a:r>
+              <a:rPr lang="en-US" dirty="0" smtClean="0"/>
+              <a:t>What it means</a:t>
+            </a:r>
+          </a:p>
+          <a:p>
+            <a:pPr lvl="1"/>
+            <a:r>
+              <a:rPr lang="en-US" dirty="0" smtClean="0"/>
+              <a:t>Makes the new branch</a:t>
+            </a:r>
+          </a:p>
+          <a:p>
+            <a:pPr lvl="1"/>
+            <a:r>
+              <a:rPr lang="en-US" dirty="0" smtClean="0"/>
+              <a:t>Switch to  named branch</a:t>
+            </a:r>
+          </a:p>
+          <a:p>
+            <a:pPr lvl="1"/>
+            <a:r>
+              <a:rPr lang="en-US" dirty="0" smtClean="0"/>
+              <a:t>Safely Delete the named branch</a:t>
+            </a:r>
+          </a:p>
+          <a:p>
+            <a:pPr lvl="1"/>
+            <a:r>
+              <a:rPr lang="en-US" dirty="0" smtClean="0"/>
+              <a:t>Non safe way to delete branch</a:t>
+            </a:r>
+            <a:endParaRPr lang="en-US" dirty="0"/>
+          </a:p>
+        </p:txBody>
+      </p:sp>
+    </p:spTree>
+    <p:extLst>
+      <p:ext uri="{BB962C8B-B14F-4D97-AF65-F5344CB8AC3E}">
+        <p14:creationId xmlns:p14="http://schemas.microsoft.com/office/powerpoint/2010/main" val="2236801193"/>
+      </p:ext>
+    </p:extLst>
+  </p:cSld>
+  <p:clrMapOvr>
+    <a:masterClrMapping/>
+  </p:clrMapOvr>
+  <p:timing>
+    <p:tnLst>
+      <p:par>
+        <p:cTn id="1" dur="indefinite" restart="never" nodeType="tmRoot"/>
+      </p:par>
+    </p:tnLst>
+  </p:timing>
+</p:sld>
+</file>
+
+<file path=ppt/slides/slide5.xml><?xml version="1.0" encoding="utf-8"?>
 <p:sld xmlns:a="http://schemas.openxmlformats.org/drawingml/2006/main" xmlns:r="http://schemas.openxmlformats.org/officeDocument/2006/relationships" xmlns:p="http://schemas.openxmlformats.org/presentationml/2006/main">
   <p:cSld>
     <p:spTree>
@@ -3958,8 +4446,8 @@
         </p:blipFill>
         <p:spPr>
           <a:xfrm>
-            <a:off x="3407466" y="1825625"/>
-            <a:ext cx="2558544" cy="1962194"/>
+            <a:off x="40177" y="3577978"/>
+            <a:ext cx="4235336" cy="3248157"/>
           </a:xfrm>
         </p:spPr>
       </p:pic>
@@ -4039,7 +4527,12 @@
             <p:ph type="title"/>
           </p:nvPr>
         </p:nvSpPr>
-        <p:spPr/>
+        <p:spPr>
+          <a:xfrm>
+            <a:off x="3048000" y="0"/>
+            <a:ext cx="9144000" cy="1143000"/>
+          </a:xfrm>
+        </p:spPr>
         <p:txBody>
           <a:bodyPr>
             <a:normAutofit/>
@@ -4077,8 +4570,8 @@
         </p:blipFill>
         <p:spPr>
           <a:xfrm>
-            <a:off x="845369" y="1825625"/>
-            <a:ext cx="2377440" cy="1962194"/>
+            <a:off x="31864" y="57219"/>
+            <a:ext cx="4243649" cy="3502449"/>
           </a:xfrm>
           <a:prstGeom prst="rect">
             <a:avLst/>
@@ -4095,10 +4588,17 @@
   <p:clrMapOvr>
     <a:masterClrMapping/>
   </p:clrMapOvr>
+  <p:timing>
+    <p:tnLst>
+      <p:par>
+        <p:cTn id="1" dur="indefinite" restart="never" nodeType="tmRoot"/>
+      </p:par>
+    </p:tnLst>
+  </p:timing>
 </p:sld>
 </file>
 
-<file path=ppt/slides/slide4.xml><?xml version="1.0" encoding="utf-8"?>
+<file path=ppt/slides/slide6.xml><?xml version="1.0" encoding="utf-8"?>
 <p:sld xmlns:a="http://schemas.openxmlformats.org/drawingml/2006/main" xmlns:r="http://schemas.openxmlformats.org/officeDocument/2006/relationships" xmlns:p="http://schemas.openxmlformats.org/presentationml/2006/main">
   <p:cSld>
     <p:spTree>
@@ -4137,7 +4637,6 @@
               <a:rPr lang="en-US" sz="6600" dirty="0"/>
               <a:t>Fast-Forward Merge </a:t>
             </a:r>
-            <a:endParaRPr lang="en-US" sz="6600" dirty="0"/>
           </a:p>
         </p:txBody>
       </p:sp>
@@ -4195,7 +4694,6 @@
               <a:rPr lang="en-US" dirty="0"/>
               <a:t>However, a fast-forward merge is not possible if the branches have diverged.</a:t>
             </a:r>
-            <a:endParaRPr lang="en-US" dirty="0"/>
           </a:p>
         </p:txBody>
       </p:sp>
@@ -4209,10 +4707,17 @@
   <p:clrMapOvr>
     <a:masterClrMapping/>
   </p:clrMapOvr>
+  <p:timing>
+    <p:tnLst>
+      <p:par>
+        <p:cTn id="1" dur="indefinite" restart="never" nodeType="tmRoot"/>
+      </p:par>
+    </p:tnLst>
+  </p:timing>
 </p:sld>
 </file>
 
-<file path=ppt/slides/slide5.xml><?xml version="1.0" encoding="utf-8"?>
+<file path=ppt/slides/slide7.xml><?xml version="1.0" encoding="utf-8"?>
 <p:sld xmlns:a="http://schemas.openxmlformats.org/drawingml/2006/main" xmlns:r="http://schemas.openxmlformats.org/officeDocument/2006/relationships" xmlns:p="http://schemas.openxmlformats.org/presentationml/2006/main">
   <p:cSld>
     <p:spTree>
@@ -4308,6 +4813,13 @@
   <p:clrMapOvr>
     <a:masterClrMapping/>
   </p:clrMapOvr>
+  <p:timing>
+    <p:tnLst>
+      <p:par>
+        <p:cTn id="1" dur="indefinite" restart="never" nodeType="tmRoot"/>
+      </p:par>
+    </p:tnLst>
+  </p:timing>
 </p:sld>
 </file>
 
@@ -5095,6 +5607,141 @@
 </file>
 
 <file path=customXml/item1.xml><?xml version="1.0" encoding="utf-8"?>
+<p:properties xmlns:p="http://schemas.microsoft.com/office/2006/metadata/properties" xmlns:xsi="http://www.w3.org/2001/XMLSchema-instance" xmlns:pc="http://schemas.microsoft.com/office/infopath/2007/PartnerControls">
+  <documentManagement>
+    <DirectSourceMarket xmlns="4873beb7-5857-4685-be1f-d57550cc96cc" xsi:nil="true"/>
+    <ApprovalStatus xmlns="4873beb7-5857-4685-be1f-d57550cc96cc">InProgress</ApprovalStatus>
+    <MarketSpecific xmlns="4873beb7-5857-4685-be1f-d57550cc96cc">false</MarketSpecific>
+    <LocComments xmlns="4873beb7-5857-4685-be1f-d57550cc96cc" xsi:nil="true"/>
+    <ThumbnailAssetId xmlns="4873beb7-5857-4685-be1f-d57550cc96cc" xsi:nil="true"/>
+    <PrimaryImageGen xmlns="4873beb7-5857-4685-be1f-d57550cc96cc">true</PrimaryImageGen>
+    <LegacyData xmlns="4873beb7-5857-4685-be1f-d57550cc96cc" xsi:nil="true"/>
+    <LocRecommendedHandoff xmlns="4873beb7-5857-4685-be1f-d57550cc96cc" xsi:nil="true"/>
+    <BusinessGroup xmlns="4873beb7-5857-4685-be1f-d57550cc96cc" xsi:nil="true"/>
+    <BlockPublish xmlns="4873beb7-5857-4685-be1f-d57550cc96cc">false</BlockPublish>
+    <TPFriendlyName xmlns="4873beb7-5857-4685-be1f-d57550cc96cc" xsi:nil="true"/>
+    <NumericId xmlns="4873beb7-5857-4685-be1f-d57550cc96cc" xsi:nil="true"/>
+    <APEditor xmlns="4873beb7-5857-4685-be1f-d57550cc96cc">
+      <UserInfo>
+        <DisplayName/>
+        <AccountId xsi:nil="true"/>
+        <AccountType/>
+      </UserInfo>
+    </APEditor>
+    <SourceTitle xmlns="4873beb7-5857-4685-be1f-d57550cc96cc" xsi:nil="true"/>
+    <OpenTemplate xmlns="4873beb7-5857-4685-be1f-d57550cc96cc">true</OpenTemplate>
+    <UALocComments xmlns="4873beb7-5857-4685-be1f-d57550cc96cc" xsi:nil="true"/>
+    <ParentAssetId xmlns="4873beb7-5857-4685-be1f-d57550cc96cc" xsi:nil="true"/>
+    <IntlLangReviewDate xmlns="4873beb7-5857-4685-be1f-d57550cc96cc" xsi:nil="true"/>
+    <FeatureTagsTaxHTField0 xmlns="4873beb7-5857-4685-be1f-d57550cc96cc">
+      <Terms xmlns="http://schemas.microsoft.com/office/infopath/2007/PartnerControls"/>
+    </FeatureTagsTaxHTField0>
+    <PublishStatusLookup xmlns="4873beb7-5857-4685-be1f-d57550cc96cc">
+      <Value>1566889</Value>
+    </PublishStatusLookup>
+    <Providers xmlns="4873beb7-5857-4685-be1f-d57550cc96cc" xsi:nil="true"/>
+    <MachineTranslated xmlns="4873beb7-5857-4685-be1f-d57550cc96cc">false</MachineTranslated>
+    <OriginalSourceMarket xmlns="4873beb7-5857-4685-be1f-d57550cc96cc" xsi:nil="true"/>
+    <APDescription xmlns="4873beb7-5857-4685-be1f-d57550cc96cc" xsi:nil="true"/>
+    <ClipArtFilename xmlns="4873beb7-5857-4685-be1f-d57550cc96cc" xsi:nil="true"/>
+    <ContentItem xmlns="4873beb7-5857-4685-be1f-d57550cc96cc" xsi:nil="true"/>
+    <TPInstallLocation xmlns="4873beb7-5857-4685-be1f-d57550cc96cc" xsi:nil="true"/>
+    <PublishTargets xmlns="4873beb7-5857-4685-be1f-d57550cc96cc">OfficeOnlineVNext</PublishTargets>
+    <TimesCloned xmlns="4873beb7-5857-4685-be1f-d57550cc96cc" xsi:nil="true"/>
+    <AssetStart xmlns="4873beb7-5857-4685-be1f-d57550cc96cc">2012-05-23T08:44:00+00:00</AssetStart>
+    <Provider xmlns="4873beb7-5857-4685-be1f-d57550cc96cc" xsi:nil="true"/>
+    <AcquiredFrom xmlns="4873beb7-5857-4685-be1f-d57550cc96cc">Internal MS</AcquiredFrom>
+    <FriendlyTitle xmlns="4873beb7-5857-4685-be1f-d57550cc96cc" xsi:nil="true"/>
+    <LastHandOff xmlns="4873beb7-5857-4685-be1f-d57550cc96cc" xsi:nil="true"/>
+    <TPClientViewer xmlns="4873beb7-5857-4685-be1f-d57550cc96cc" xsi:nil="true"/>
+    <UACurrentWords xmlns="4873beb7-5857-4685-be1f-d57550cc96cc" xsi:nil="true"/>
+    <ArtSampleDocs xmlns="4873beb7-5857-4685-be1f-d57550cc96cc" xsi:nil="true"/>
+    <UALocRecommendation xmlns="4873beb7-5857-4685-be1f-d57550cc96cc">Localize</UALocRecommendation>
+    <Manager xmlns="4873beb7-5857-4685-be1f-d57550cc96cc" xsi:nil="true"/>
+    <ShowIn xmlns="4873beb7-5857-4685-be1f-d57550cc96cc">Show everywhere</ShowIn>
+    <UANotes xmlns="4873beb7-5857-4685-be1f-d57550cc96cc" xsi:nil="true"/>
+    <TemplateStatus xmlns="4873beb7-5857-4685-be1f-d57550cc96cc">Complete</TemplateStatus>
+    <InternalTagsTaxHTField0 xmlns="4873beb7-5857-4685-be1f-d57550cc96cc">
+      <Terms xmlns="http://schemas.microsoft.com/office/infopath/2007/PartnerControls"/>
+    </InternalTagsTaxHTField0>
+    <CSXHash xmlns="4873beb7-5857-4685-be1f-d57550cc96cc" xsi:nil="true"/>
+    <Downloads xmlns="4873beb7-5857-4685-be1f-d57550cc96cc">0</Downloads>
+    <VoteCount xmlns="4873beb7-5857-4685-be1f-d57550cc96cc" xsi:nil="true"/>
+    <OOCacheId xmlns="4873beb7-5857-4685-be1f-d57550cc96cc" xsi:nil="true"/>
+    <IsDeleted xmlns="4873beb7-5857-4685-be1f-d57550cc96cc">false</IsDeleted>
+    <AssetExpire xmlns="4873beb7-5857-4685-be1f-d57550cc96cc">2029-01-01T08:00:00+00:00</AssetExpire>
+    <DSATActionTaken xmlns="4873beb7-5857-4685-be1f-d57550cc96cc" xsi:nil="true"/>
+    <CSXSubmissionMarket xmlns="4873beb7-5857-4685-be1f-d57550cc96cc" xsi:nil="true"/>
+    <TPExecutable xmlns="4873beb7-5857-4685-be1f-d57550cc96cc" xsi:nil="true"/>
+    <SubmitterId xmlns="4873beb7-5857-4685-be1f-d57550cc96cc" xsi:nil="true"/>
+    <EditorialTags xmlns="4873beb7-5857-4685-be1f-d57550cc96cc" xsi:nil="true"/>
+    <ApprovalLog xmlns="4873beb7-5857-4685-be1f-d57550cc96cc" xsi:nil="true"/>
+    <AssetType xmlns="4873beb7-5857-4685-be1f-d57550cc96cc">TP</AssetType>
+    <BugNumber xmlns="4873beb7-5857-4685-be1f-d57550cc96cc" xsi:nil="true"/>
+    <CSXSubmissionDate xmlns="4873beb7-5857-4685-be1f-d57550cc96cc" xsi:nil="true"/>
+    <CSXUpdate xmlns="4873beb7-5857-4685-be1f-d57550cc96cc">false</CSXUpdate>
+    <Milestone xmlns="4873beb7-5857-4685-be1f-d57550cc96cc" xsi:nil="true"/>
+    <RecommendationsModifier xmlns="4873beb7-5857-4685-be1f-d57550cc96cc" xsi:nil="true"/>
+    <OriginAsset xmlns="4873beb7-5857-4685-be1f-d57550cc96cc" xsi:nil="true"/>
+    <TPComponent xmlns="4873beb7-5857-4685-be1f-d57550cc96cc" xsi:nil="true"/>
+    <AssetId xmlns="4873beb7-5857-4685-be1f-d57550cc96cc">TP102901017</AssetId>
+    <IntlLocPriority xmlns="4873beb7-5857-4685-be1f-d57550cc96cc" xsi:nil="true"/>
+    <PolicheckWords xmlns="4873beb7-5857-4685-be1f-d57550cc96cc" xsi:nil="true"/>
+    <TPLaunchHelpLink xmlns="4873beb7-5857-4685-be1f-d57550cc96cc" xsi:nil="true"/>
+    <TPApplication xmlns="4873beb7-5857-4685-be1f-d57550cc96cc" xsi:nil="true"/>
+    <CrawlForDependencies xmlns="4873beb7-5857-4685-be1f-d57550cc96cc">false</CrawlForDependencies>
+    <HandoffToMSDN xmlns="4873beb7-5857-4685-be1f-d57550cc96cc" xsi:nil="true"/>
+    <PlannedPubDate xmlns="4873beb7-5857-4685-be1f-d57550cc96cc" xsi:nil="true"/>
+    <IntlLangReviewer xmlns="4873beb7-5857-4685-be1f-d57550cc96cc" xsi:nil="true"/>
+    <TrustLevel xmlns="4873beb7-5857-4685-be1f-d57550cc96cc">1 Microsoft Managed Content</TrustLevel>
+    <LocLastLocAttemptVersionLookup xmlns="4873beb7-5857-4685-be1f-d57550cc96cc">836753</LocLastLocAttemptVersionLookup>
+    <IsSearchable xmlns="4873beb7-5857-4685-be1f-d57550cc96cc">true</IsSearchable>
+    <TemplateTemplateType xmlns="4873beb7-5857-4685-be1f-d57550cc96cc">PowerPoint Design Template</TemplateTemplateType>
+    <CampaignTagsTaxHTField0 xmlns="4873beb7-5857-4685-be1f-d57550cc96cc">
+      <Terms xmlns="http://schemas.microsoft.com/office/infopath/2007/PartnerControls"/>
+    </CampaignTagsTaxHTField0>
+    <TPNamespace xmlns="4873beb7-5857-4685-be1f-d57550cc96cc" xsi:nil="true"/>
+    <TaxCatchAll xmlns="4873beb7-5857-4685-be1f-d57550cc96cc"/>
+    <Markets xmlns="4873beb7-5857-4685-be1f-d57550cc96cc"/>
+    <UAProjectedTotalWords xmlns="4873beb7-5857-4685-be1f-d57550cc96cc" xsi:nil="true"/>
+    <IntlLangReview xmlns="4873beb7-5857-4685-be1f-d57550cc96cc">false</IntlLangReview>
+    <OutputCachingOn xmlns="4873beb7-5857-4685-be1f-d57550cc96cc">false</OutputCachingOn>
+    <AverageRating xmlns="4873beb7-5857-4685-be1f-d57550cc96cc" xsi:nil="true"/>
+    <APAuthor xmlns="4873beb7-5857-4685-be1f-d57550cc96cc">
+      <UserInfo>
+        <DisplayName>REDMOND\v-anij</DisplayName>
+        <AccountId>2469</AccountId>
+        <AccountType/>
+      </UserInfo>
+    </APAuthor>
+    <LocManualTestRequired xmlns="4873beb7-5857-4685-be1f-d57550cc96cc">false</LocManualTestRequired>
+    <TPCommandLine xmlns="4873beb7-5857-4685-be1f-d57550cc96cc" xsi:nil="true"/>
+    <TPAppVersion xmlns="4873beb7-5857-4685-be1f-d57550cc96cc" xsi:nil="true"/>
+    <EditorialStatus xmlns="4873beb7-5857-4685-be1f-d57550cc96cc">Complete</EditorialStatus>
+    <LastModifiedDateTime xmlns="4873beb7-5857-4685-be1f-d57550cc96cc" xsi:nil="true"/>
+    <ScenarioTagsTaxHTField0 xmlns="4873beb7-5857-4685-be1f-d57550cc96cc">
+      <Terms xmlns="http://schemas.microsoft.com/office/infopath/2007/PartnerControls"/>
+    </ScenarioTagsTaxHTField0>
+    <OriginalRelease xmlns="4873beb7-5857-4685-be1f-d57550cc96cc">15</OriginalRelease>
+    <TPLaunchHelpLinkType xmlns="4873beb7-5857-4685-be1f-d57550cc96cc">Template</TPLaunchHelpLinkType>
+    <LocalizationTagsTaxHTField0 xmlns="4873beb7-5857-4685-be1f-d57550cc96cc">
+      <Terms xmlns="http://schemas.microsoft.com/office/infopath/2007/PartnerControls"/>
+    </LocalizationTagsTaxHTField0>
+    <LocMarketGroupTiers2 xmlns="4873beb7-5857-4685-be1f-d57550cc96cc" xsi:nil="true"/>
+  </documentManagement>
+</p:properties>
+</file>
+
+<file path=customXml/item2.xml><?xml version="1.0" encoding="utf-8"?>
+<?mso-contentType ?>
+<FormTemplates xmlns="http://schemas.microsoft.com/sharepoint/v3/contenttype/forms">
+  <Display>DocumentLibraryForm</Display>
+  <Edit>AssetEditForm</Edit>
+  <New>DocumentLibraryForm</New>
+</FormTemplates>
+</file>
+
+<file path=customXml/item3.xml><?xml version="1.0" encoding="utf-8"?>
 <ct:contentTypeSchema xmlns:ct="http://schemas.microsoft.com/office/2006/metadata/contentType" xmlns:ma="http://schemas.microsoft.com/office/2006/metadata/properties/metaAttributes" ct:_="" ma:_="" ma:contentTypeName="TemplateFile" ma:contentTypeID="0x0101006EDDDB5EE6D98C44930B742096920B300400F5B6D36B3EF94B4E9A635CDF2A18F5B8" ma:contentTypeVersion="72" ma:contentTypeDescription="Create a new document." ma:contentTypeScope="" ma:versionID="a23e56308344d904b51738559c3d67c9">
   <xsd:schema xmlns:xsd="http://www.w3.org/2001/XMLSchema" xmlns:xs="http://www.w3.org/2001/XMLSchema" xmlns:p="http://schemas.microsoft.com/office/2006/metadata/properties" xmlns:ns2="4873beb7-5857-4685-be1f-d57550cc96cc" targetNamespace="http://schemas.microsoft.com/office/2006/metadata/properties" ma:root="true" ma:fieldsID="cd0908cc4600e77bf5da051303e00c8d" ns2:_="">
     <xsd:import namespace="4873beb7-5857-4685-be1f-d57550cc96cc"/>
@@ -6134,142 +6781,31 @@
 </ct:contentTypeSchema>
 </file>
 
-<file path=customXml/item2.xml><?xml version="1.0" encoding="utf-8"?>
-<?mso-contentType ?>
-<FormTemplates xmlns="http://schemas.microsoft.com/sharepoint/v3/contenttype/forms">
-  <Display>DocumentLibraryForm</Display>
-  <Edit>AssetEditForm</Edit>
-  <New>DocumentLibraryForm</New>
-</FormTemplates>
+<file path=customXml/itemProps1.xml><?xml version="1.0" encoding="utf-8"?>
+<ds:datastoreItem xmlns:ds="http://schemas.openxmlformats.org/officeDocument/2006/customXml" ds:itemID="{04098515-0C12-46CF-BC7C-69B4A13CD5FA}">
+  <ds:schemaRefs>
+    <ds:schemaRef ds:uri="http://schemas.microsoft.com/office/infopath/2007/PartnerControls"/>
+    <ds:schemaRef ds:uri="http://purl.org/dc/elements/1.1/"/>
+    <ds:schemaRef ds:uri="http://purl.org/dc/terms/"/>
+    <ds:schemaRef ds:uri="http://schemas.microsoft.com/office/2006/documentManagement/types"/>
+    <ds:schemaRef ds:uri="http://purl.org/dc/dcmitype/"/>
+    <ds:schemaRef ds:uri="4873beb7-5857-4685-be1f-d57550cc96cc"/>
+    <ds:schemaRef ds:uri="http://schemas.openxmlformats.org/package/2006/metadata/core-properties"/>
+    <ds:schemaRef ds:uri="http://schemas.microsoft.com/office/2006/metadata/properties"/>
+    <ds:schemaRef ds:uri="http://www.w3.org/XML/1998/namespace"/>
+  </ds:schemaRefs>
+</ds:datastoreItem>
 </file>
 
-<file path=customXml/item3.xml><?xml version="1.0" encoding="utf-8"?>
-<p:properties xmlns:p="http://schemas.microsoft.com/office/2006/metadata/properties" xmlns:xsi="http://www.w3.org/2001/XMLSchema-instance" xmlns:pc="http://schemas.microsoft.com/office/infopath/2007/PartnerControls">
-  <documentManagement>
-    <DirectSourceMarket xmlns="4873beb7-5857-4685-be1f-d57550cc96cc" xsi:nil="true"/>
-    <ApprovalStatus xmlns="4873beb7-5857-4685-be1f-d57550cc96cc">InProgress</ApprovalStatus>
-    <MarketSpecific xmlns="4873beb7-5857-4685-be1f-d57550cc96cc">false</MarketSpecific>
-    <LocComments xmlns="4873beb7-5857-4685-be1f-d57550cc96cc" xsi:nil="true"/>
-    <ThumbnailAssetId xmlns="4873beb7-5857-4685-be1f-d57550cc96cc" xsi:nil="true"/>
-    <PrimaryImageGen xmlns="4873beb7-5857-4685-be1f-d57550cc96cc">true</PrimaryImageGen>
-    <LegacyData xmlns="4873beb7-5857-4685-be1f-d57550cc96cc" xsi:nil="true"/>
-    <LocRecommendedHandoff xmlns="4873beb7-5857-4685-be1f-d57550cc96cc" xsi:nil="true"/>
-    <BusinessGroup xmlns="4873beb7-5857-4685-be1f-d57550cc96cc" xsi:nil="true"/>
-    <BlockPublish xmlns="4873beb7-5857-4685-be1f-d57550cc96cc">false</BlockPublish>
-    <TPFriendlyName xmlns="4873beb7-5857-4685-be1f-d57550cc96cc" xsi:nil="true"/>
-    <NumericId xmlns="4873beb7-5857-4685-be1f-d57550cc96cc" xsi:nil="true"/>
-    <APEditor xmlns="4873beb7-5857-4685-be1f-d57550cc96cc">
-      <UserInfo>
-        <DisplayName/>
-        <AccountId xsi:nil="true"/>
-        <AccountType/>
-      </UserInfo>
-    </APEditor>
-    <SourceTitle xmlns="4873beb7-5857-4685-be1f-d57550cc96cc" xsi:nil="true"/>
-    <OpenTemplate xmlns="4873beb7-5857-4685-be1f-d57550cc96cc">true</OpenTemplate>
-    <UALocComments xmlns="4873beb7-5857-4685-be1f-d57550cc96cc" xsi:nil="true"/>
-    <ParentAssetId xmlns="4873beb7-5857-4685-be1f-d57550cc96cc" xsi:nil="true"/>
-    <IntlLangReviewDate xmlns="4873beb7-5857-4685-be1f-d57550cc96cc" xsi:nil="true"/>
-    <FeatureTagsTaxHTField0 xmlns="4873beb7-5857-4685-be1f-d57550cc96cc">
-      <Terms xmlns="http://schemas.microsoft.com/office/infopath/2007/PartnerControls"/>
-    </FeatureTagsTaxHTField0>
-    <PublishStatusLookup xmlns="4873beb7-5857-4685-be1f-d57550cc96cc">
-      <Value>1566889</Value>
-    </PublishStatusLookup>
-    <Providers xmlns="4873beb7-5857-4685-be1f-d57550cc96cc" xsi:nil="true"/>
-    <MachineTranslated xmlns="4873beb7-5857-4685-be1f-d57550cc96cc">false</MachineTranslated>
-    <OriginalSourceMarket xmlns="4873beb7-5857-4685-be1f-d57550cc96cc" xsi:nil="true"/>
-    <APDescription xmlns="4873beb7-5857-4685-be1f-d57550cc96cc" xsi:nil="true"/>
-    <ClipArtFilename xmlns="4873beb7-5857-4685-be1f-d57550cc96cc" xsi:nil="true"/>
-    <ContentItem xmlns="4873beb7-5857-4685-be1f-d57550cc96cc" xsi:nil="true"/>
-    <TPInstallLocation xmlns="4873beb7-5857-4685-be1f-d57550cc96cc" xsi:nil="true"/>
-    <PublishTargets xmlns="4873beb7-5857-4685-be1f-d57550cc96cc">OfficeOnlineVNext</PublishTargets>
-    <TimesCloned xmlns="4873beb7-5857-4685-be1f-d57550cc96cc" xsi:nil="true"/>
-    <AssetStart xmlns="4873beb7-5857-4685-be1f-d57550cc96cc">2012-05-23T08:44:00+00:00</AssetStart>
-    <Provider xmlns="4873beb7-5857-4685-be1f-d57550cc96cc" xsi:nil="true"/>
-    <AcquiredFrom xmlns="4873beb7-5857-4685-be1f-d57550cc96cc">Internal MS</AcquiredFrom>
-    <FriendlyTitle xmlns="4873beb7-5857-4685-be1f-d57550cc96cc" xsi:nil="true"/>
-    <LastHandOff xmlns="4873beb7-5857-4685-be1f-d57550cc96cc" xsi:nil="true"/>
-    <TPClientViewer xmlns="4873beb7-5857-4685-be1f-d57550cc96cc" xsi:nil="true"/>
-    <UACurrentWords xmlns="4873beb7-5857-4685-be1f-d57550cc96cc" xsi:nil="true"/>
-    <ArtSampleDocs xmlns="4873beb7-5857-4685-be1f-d57550cc96cc" xsi:nil="true"/>
-    <UALocRecommendation xmlns="4873beb7-5857-4685-be1f-d57550cc96cc">Localize</UALocRecommendation>
-    <Manager xmlns="4873beb7-5857-4685-be1f-d57550cc96cc" xsi:nil="true"/>
-    <ShowIn xmlns="4873beb7-5857-4685-be1f-d57550cc96cc">Show everywhere</ShowIn>
-    <UANotes xmlns="4873beb7-5857-4685-be1f-d57550cc96cc" xsi:nil="true"/>
-    <TemplateStatus xmlns="4873beb7-5857-4685-be1f-d57550cc96cc">Complete</TemplateStatus>
-    <InternalTagsTaxHTField0 xmlns="4873beb7-5857-4685-be1f-d57550cc96cc">
-      <Terms xmlns="http://schemas.microsoft.com/office/infopath/2007/PartnerControls"/>
-    </InternalTagsTaxHTField0>
-    <CSXHash xmlns="4873beb7-5857-4685-be1f-d57550cc96cc" xsi:nil="true"/>
-    <Downloads xmlns="4873beb7-5857-4685-be1f-d57550cc96cc">0</Downloads>
-    <VoteCount xmlns="4873beb7-5857-4685-be1f-d57550cc96cc" xsi:nil="true"/>
-    <OOCacheId xmlns="4873beb7-5857-4685-be1f-d57550cc96cc" xsi:nil="true"/>
-    <IsDeleted xmlns="4873beb7-5857-4685-be1f-d57550cc96cc">false</IsDeleted>
-    <AssetExpire xmlns="4873beb7-5857-4685-be1f-d57550cc96cc">2029-01-01T08:00:00+00:00</AssetExpire>
-    <DSATActionTaken xmlns="4873beb7-5857-4685-be1f-d57550cc96cc" xsi:nil="true"/>
-    <CSXSubmissionMarket xmlns="4873beb7-5857-4685-be1f-d57550cc96cc" xsi:nil="true"/>
-    <TPExecutable xmlns="4873beb7-5857-4685-be1f-d57550cc96cc" xsi:nil="true"/>
-    <SubmitterId xmlns="4873beb7-5857-4685-be1f-d57550cc96cc" xsi:nil="true"/>
-    <EditorialTags xmlns="4873beb7-5857-4685-be1f-d57550cc96cc" xsi:nil="true"/>
-    <ApprovalLog xmlns="4873beb7-5857-4685-be1f-d57550cc96cc" xsi:nil="true"/>
-    <AssetType xmlns="4873beb7-5857-4685-be1f-d57550cc96cc">TP</AssetType>
-    <BugNumber xmlns="4873beb7-5857-4685-be1f-d57550cc96cc" xsi:nil="true"/>
-    <CSXSubmissionDate xmlns="4873beb7-5857-4685-be1f-d57550cc96cc" xsi:nil="true"/>
-    <CSXUpdate xmlns="4873beb7-5857-4685-be1f-d57550cc96cc">false</CSXUpdate>
-    <Milestone xmlns="4873beb7-5857-4685-be1f-d57550cc96cc" xsi:nil="true"/>
-    <RecommendationsModifier xmlns="4873beb7-5857-4685-be1f-d57550cc96cc" xsi:nil="true"/>
-    <OriginAsset xmlns="4873beb7-5857-4685-be1f-d57550cc96cc" xsi:nil="true"/>
-    <TPComponent xmlns="4873beb7-5857-4685-be1f-d57550cc96cc" xsi:nil="true"/>
-    <AssetId xmlns="4873beb7-5857-4685-be1f-d57550cc96cc">TP102901017</AssetId>
-    <IntlLocPriority xmlns="4873beb7-5857-4685-be1f-d57550cc96cc" xsi:nil="true"/>
-    <PolicheckWords xmlns="4873beb7-5857-4685-be1f-d57550cc96cc" xsi:nil="true"/>
-    <TPLaunchHelpLink xmlns="4873beb7-5857-4685-be1f-d57550cc96cc" xsi:nil="true"/>
-    <TPApplication xmlns="4873beb7-5857-4685-be1f-d57550cc96cc" xsi:nil="true"/>
-    <CrawlForDependencies xmlns="4873beb7-5857-4685-be1f-d57550cc96cc">false</CrawlForDependencies>
-    <HandoffToMSDN xmlns="4873beb7-5857-4685-be1f-d57550cc96cc" xsi:nil="true"/>
-    <PlannedPubDate xmlns="4873beb7-5857-4685-be1f-d57550cc96cc" xsi:nil="true"/>
-    <IntlLangReviewer xmlns="4873beb7-5857-4685-be1f-d57550cc96cc" xsi:nil="true"/>
-    <TrustLevel xmlns="4873beb7-5857-4685-be1f-d57550cc96cc">1 Microsoft Managed Content</TrustLevel>
-    <LocLastLocAttemptVersionLookup xmlns="4873beb7-5857-4685-be1f-d57550cc96cc">836753</LocLastLocAttemptVersionLookup>
-    <IsSearchable xmlns="4873beb7-5857-4685-be1f-d57550cc96cc">true</IsSearchable>
-    <TemplateTemplateType xmlns="4873beb7-5857-4685-be1f-d57550cc96cc">PowerPoint Design Template</TemplateTemplateType>
-    <CampaignTagsTaxHTField0 xmlns="4873beb7-5857-4685-be1f-d57550cc96cc">
-      <Terms xmlns="http://schemas.microsoft.com/office/infopath/2007/PartnerControls"/>
-    </CampaignTagsTaxHTField0>
-    <TPNamespace xmlns="4873beb7-5857-4685-be1f-d57550cc96cc" xsi:nil="true"/>
-    <TaxCatchAll xmlns="4873beb7-5857-4685-be1f-d57550cc96cc"/>
-    <Markets xmlns="4873beb7-5857-4685-be1f-d57550cc96cc"/>
-    <UAProjectedTotalWords xmlns="4873beb7-5857-4685-be1f-d57550cc96cc" xsi:nil="true"/>
-    <IntlLangReview xmlns="4873beb7-5857-4685-be1f-d57550cc96cc">false</IntlLangReview>
-    <OutputCachingOn xmlns="4873beb7-5857-4685-be1f-d57550cc96cc">false</OutputCachingOn>
-    <AverageRating xmlns="4873beb7-5857-4685-be1f-d57550cc96cc" xsi:nil="true"/>
-    <APAuthor xmlns="4873beb7-5857-4685-be1f-d57550cc96cc">
-      <UserInfo>
-        <DisplayName>REDMOND\v-anij</DisplayName>
-        <AccountId>2469</AccountId>
-        <AccountType/>
-      </UserInfo>
-    </APAuthor>
-    <LocManualTestRequired xmlns="4873beb7-5857-4685-be1f-d57550cc96cc">false</LocManualTestRequired>
-    <TPCommandLine xmlns="4873beb7-5857-4685-be1f-d57550cc96cc" xsi:nil="true"/>
-    <TPAppVersion xmlns="4873beb7-5857-4685-be1f-d57550cc96cc" xsi:nil="true"/>
-    <EditorialStatus xmlns="4873beb7-5857-4685-be1f-d57550cc96cc">Complete</EditorialStatus>
-    <LastModifiedDateTime xmlns="4873beb7-5857-4685-be1f-d57550cc96cc" xsi:nil="true"/>
-    <ScenarioTagsTaxHTField0 xmlns="4873beb7-5857-4685-be1f-d57550cc96cc">
-      <Terms xmlns="http://schemas.microsoft.com/office/infopath/2007/PartnerControls"/>
-    </ScenarioTagsTaxHTField0>
-    <OriginalRelease xmlns="4873beb7-5857-4685-be1f-d57550cc96cc">15</OriginalRelease>
-    <TPLaunchHelpLinkType xmlns="4873beb7-5857-4685-be1f-d57550cc96cc">Template</TPLaunchHelpLinkType>
-    <LocalizationTagsTaxHTField0 xmlns="4873beb7-5857-4685-be1f-d57550cc96cc">
-      <Terms xmlns="http://schemas.microsoft.com/office/infopath/2007/PartnerControls"/>
-    </LocalizationTagsTaxHTField0>
-    <LocMarketGroupTiers2 xmlns="4873beb7-5857-4685-be1f-d57550cc96cc" xsi:nil="true"/>
-  </documentManagement>
-</p:properties>
+<file path=customXml/itemProps2.xml><?xml version="1.0" encoding="utf-8"?>
+<ds:datastoreItem xmlns:ds="http://schemas.openxmlformats.org/officeDocument/2006/customXml" ds:itemID="{746CFF6F-D9AA-4BC0-911A-0A1356771912}">
+  <ds:schemaRefs>
+    <ds:schemaRef ds:uri="http://schemas.microsoft.com/sharepoint/v3/contenttype/forms"/>
+  </ds:schemaRefs>
+</ds:datastoreItem>
 </file>
 
-<file path=customXml/itemProps1.xml><?xml version="1.0" encoding="utf-8"?>
+<file path=customXml/itemProps3.xml><?xml version="1.0" encoding="utf-8"?>
 <ds:datastoreItem xmlns:ds="http://schemas.openxmlformats.org/officeDocument/2006/customXml" ds:itemID="{0B5C6E15-39DC-470B-9445-F754B9458020}">
   <ds:schemaRefs>
     <ds:schemaRef ds:uri="http://schemas.microsoft.com/office/2006/metadata/contentType"/>
@@ -6285,28 +6821,4 @@
     <ds:schemaRef ds:uri="http://schemas.microsoft.com/internal/obd"/>
   </ds:schemaRefs>
 </ds:datastoreItem>
-</file>
-
-<file path=customXml/itemProps2.xml><?xml version="1.0" encoding="utf-8"?>
-<ds:datastoreItem xmlns:ds="http://schemas.openxmlformats.org/officeDocument/2006/customXml" ds:itemID="{746CFF6F-D9AA-4BC0-911A-0A1356771912}">
-  <ds:schemaRefs>
-    <ds:schemaRef ds:uri="http://schemas.microsoft.com/sharepoint/v3/contenttype/forms"/>
-  </ds:schemaRefs>
-</ds:datastoreItem>
-</file>
-
-<file path=customXml/itemProps3.xml><?xml version="1.0" encoding="utf-8"?>
-<ds:datastoreItem xmlns:ds="http://schemas.openxmlformats.org/officeDocument/2006/customXml" ds:itemID="{04098515-0C12-46CF-BC7C-69B4A13CD5FA}">
-  <ds:schemaRefs>
-    <ds:schemaRef ds:uri="http://schemas.microsoft.com/office/infopath/2007/PartnerControls"/>
-    <ds:schemaRef ds:uri="http://purl.org/dc/elements/1.1/"/>
-    <ds:schemaRef ds:uri="http://purl.org/dc/terms/"/>
-    <ds:schemaRef ds:uri="http://schemas.microsoft.com/office/2006/documentManagement/types"/>
-    <ds:schemaRef ds:uri="http://purl.org/dc/dcmitype/"/>
-    <ds:schemaRef ds:uri="4873beb7-5857-4685-be1f-d57550cc96cc"/>
-    <ds:schemaRef ds:uri="http://schemas.openxmlformats.org/package/2006/metadata/core-properties"/>
-    <ds:schemaRef ds:uri="http://schemas.microsoft.com/office/2006/metadata/properties"/>
-    <ds:schemaRef ds:uri="http://www.w3.org/XML/1998/namespace"/>
-  </ds:schemaRefs>
-</ds:datastoreItem>
 </file>
</xml_diff>

<commit_message>
Added got comands to pp
</commit_message>
<xml_diff>
--- a/GIT HUB Branching & Merging.pptx
+++ b/GIT HUB Branching & Merging.pptx
@@ -5,10 +5,10 @@
     <p:sldMasterId id="2147483648" r:id="rId4"/>
   </p:sldMasterIdLst>
   <p:notesMasterIdLst>
-    <p:notesMasterId r:id="rId12"/>
+    <p:notesMasterId r:id="rId13"/>
   </p:notesMasterIdLst>
   <p:handoutMasterIdLst>
-    <p:handoutMasterId r:id="rId13"/>
+    <p:handoutMasterId r:id="rId14"/>
   </p:handoutMasterIdLst>
   <p:sldIdLst>
     <p:sldId id="256" r:id="rId5"/>
@@ -16,8 +16,9 @@
     <p:sldId id="257" r:id="rId7"/>
     <p:sldId id="261" r:id="rId8"/>
     <p:sldId id="258" r:id="rId9"/>
-    <p:sldId id="259" r:id="rId10"/>
-    <p:sldId id="260" r:id="rId11"/>
+    <p:sldId id="264" r:id="rId10"/>
+    <p:sldId id="259" r:id="rId11"/>
+    <p:sldId id="260" r:id="rId12"/>
   </p:sldIdLst>
   <p:sldSz cx="12192000" cy="6858000"/>
   <p:notesSz cx="6858000" cy="9144000"/>
@@ -3770,31 +3771,7 @@
           <a:p>
             <a:r>
               <a:rPr lang="en-US" dirty="0" smtClean="0"/>
-              <a:t>Presented by </a:t>
-            </a:r>
-            <a:r>
-              <a:rPr lang="en-US" dirty="0" smtClean="0"/>
-              <a:t>Adam</a:t>
-            </a:r>
-            <a:r>
-              <a:rPr lang="en-US" dirty="0" smtClean="0"/>
-              <a:t>, </a:t>
-            </a:r>
-            <a:r>
-              <a:rPr lang="en-US" dirty="0" smtClean="0"/>
-              <a:t>Justin, </a:t>
-            </a:r>
-            <a:r>
-              <a:rPr lang="en-US" dirty="0" smtClean="0"/>
-              <a:t>Kalin</a:t>
-            </a:r>
-            <a:r>
-              <a:rPr lang="en-US" dirty="0" smtClean="0"/>
-              <a:t> </a:t>
-            </a:r>
-            <a:r>
-              <a:rPr lang="en-US" dirty="0" smtClean="0"/>
-              <a:t>&amp; Ashley</a:t>
+              <a:t>Presented by Adam, Justin, Kalin &amp; Ashley</a:t>
             </a:r>
             <a:endParaRPr dirty="0"/>
           </a:p>
@@ -3917,7 +3894,11 @@
             </a:r>
             <a:r>
               <a:rPr lang="en-US" dirty="0" smtClean="0"/>
-              <a:t> clone &lt;repo URL&gt;</a:t>
+              <a:t> clone &lt;repo URL</a:t>
+            </a:r>
+            <a:r>
+              <a:rPr lang="en-US" dirty="0" smtClean="0"/>
+              <a:t>&gt;</a:t>
             </a:r>
           </a:p>
           <a:p>
@@ -3928,8 +3909,9 @@
             </a:r>
             <a:r>
               <a:rPr lang="en-US" dirty="0" smtClean="0"/>
-              <a:t> add .</a:t>
-            </a:r>
+              <a:t> Status</a:t>
+            </a:r>
+            <a:endParaRPr lang="en-US" dirty="0" smtClean="0"/>
           </a:p>
           <a:p>
             <a:pPr lvl="1"/>
@@ -3939,17 +3921,59 @@
             </a:r>
             <a:r>
               <a:rPr lang="en-US" dirty="0" smtClean="0"/>
-              <a:t> add &lt;file-name&gt;</a:t>
-            </a:r>
-          </a:p>
-          <a:p>
-            <a:pPr lvl="1"/>
+              <a:t> add </a:t>
+            </a:r>
+            <a:r>
+              <a:rPr lang="en-US" dirty="0" smtClean="0"/>
+              <a:t>–A</a:t>
+            </a:r>
+          </a:p>
+          <a:p>
+            <a:pPr lvl="2"/>
+            <a:r>
+              <a:rPr lang="en-US" dirty="0" err="1"/>
+              <a:t>g</a:t>
+            </a:r>
+            <a:r>
+              <a:rPr lang="en-US" dirty="0" err="1" smtClean="0"/>
+              <a:t>it</a:t>
+            </a:r>
+            <a:r>
+              <a:rPr lang="en-US" dirty="0" smtClean="0"/>
+              <a:t> add .</a:t>
+            </a:r>
+          </a:p>
+          <a:p>
+            <a:pPr lvl="2"/>
             <a:r>
               <a:rPr lang="en-US" dirty="0" err="1" smtClean="0"/>
               <a:t>git</a:t>
             </a:r>
             <a:r>
               <a:rPr lang="en-US" dirty="0" smtClean="0"/>
+              <a:t> add -u</a:t>
+            </a:r>
+            <a:endParaRPr lang="en-US" dirty="0" smtClean="0"/>
+          </a:p>
+          <a:p>
+            <a:pPr lvl="1"/>
+            <a:r>
+              <a:rPr lang="en-US" dirty="0" err="1" smtClean="0"/>
+              <a:t>git</a:t>
+            </a:r>
+            <a:r>
+              <a:rPr lang="en-US" dirty="0" smtClean="0"/>
+              <a:t> add &lt;file-name&gt;</a:t>
+            </a:r>
+          </a:p>
+          <a:p>
+            <a:pPr lvl="1"/>
+            <a:r>
+              <a:rPr lang="en-US" dirty="0" err="1" smtClean="0"/>
+              <a:t>git</a:t>
+            </a:r>
+            <a:r>
+              <a:rPr lang="en-US" dirty="0" smtClean="0"/>
               <a:t> commit –</a:t>
             </a:r>
             <a:r>
@@ -4017,15 +4041,50 @@
             <a:pPr lvl="1"/>
             <a:r>
               <a:rPr lang="en-US" dirty="0" smtClean="0"/>
-              <a:t>Clones the repo to a location</a:t>
+              <a:t>Clones the repo to a </a:t>
+            </a:r>
+            <a:r>
+              <a:rPr lang="en-US" dirty="0" smtClean="0"/>
+              <a:t>location</a:t>
             </a:r>
           </a:p>
           <a:p>
             <a:pPr lvl="1"/>
             <a:r>
               <a:rPr lang="en-US" dirty="0" smtClean="0"/>
-              <a:t>Adds ALL files to the staging area</a:t>
-            </a:r>
+              <a:t>Gets the current branch status</a:t>
+            </a:r>
+            <a:endParaRPr lang="en-US" dirty="0" smtClean="0"/>
+          </a:p>
+          <a:p>
+            <a:pPr lvl="1"/>
+            <a:r>
+              <a:rPr lang="en-US" dirty="0" smtClean="0"/>
+              <a:t>Adds ALL files to the staging </a:t>
+            </a:r>
+            <a:r>
+              <a:rPr lang="en-US" dirty="0" smtClean="0"/>
+              <a:t>area</a:t>
+            </a:r>
+          </a:p>
+          <a:p>
+            <a:pPr lvl="2"/>
+            <a:r>
+              <a:rPr lang="en-US" dirty="0"/>
+              <a:t>Without deleted</a:t>
+            </a:r>
+          </a:p>
+          <a:p>
+            <a:pPr lvl="2"/>
+            <a:r>
+              <a:rPr lang="en-US" dirty="0"/>
+              <a:t>Without </a:t>
+            </a:r>
+            <a:r>
+              <a:rPr lang="en-US" dirty="0" smtClean="0"/>
+              <a:t>new</a:t>
+            </a:r>
+            <a:endParaRPr lang="en-US" dirty="0" smtClean="0"/>
           </a:p>
           <a:p>
             <a:pPr lvl="1"/>
@@ -4038,14 +4097,22 @@
             <a:pPr lvl="1"/>
             <a:r>
               <a:rPr lang="en-US" dirty="0" smtClean="0"/>
-              <a:t>Commits all staged files</a:t>
+              <a:t>Commits all staged </a:t>
+            </a:r>
+            <a:r>
+              <a:rPr lang="en-US" dirty="0" smtClean="0"/>
+              <a:t>files</a:t>
             </a:r>
           </a:p>
           <a:p>
             <a:pPr lvl="1"/>
             <a:r>
               <a:rPr lang="en-US" dirty="0" smtClean="0"/>
-              <a:t>Pushes the changes to GitHub</a:t>
+              <a:t>Pushes </a:t>
+            </a:r>
+            <a:r>
+              <a:rPr lang="en-US" dirty="0" smtClean="0"/>
+              <a:t>the changes to GitHub</a:t>
             </a:r>
           </a:p>
           <a:p>
@@ -4295,8 +4362,9 @@
             </a:r>
             <a:r>
               <a:rPr lang="en-US" dirty="0" smtClean="0"/>
-              <a:t> branch &lt;branch-Name&gt;</a:t>
-            </a:r>
+              <a:t> branch</a:t>
+            </a:r>
+            <a:endParaRPr lang="en-US" dirty="0" smtClean="0"/>
           </a:p>
           <a:p>
             <a:pPr lvl="1"/>
@@ -4306,7 +4374,11 @@
             </a:r>
             <a:r>
               <a:rPr lang="en-US" dirty="0" smtClean="0"/>
-              <a:t> checkout ‘branch-Name’</a:t>
+              <a:t> </a:t>
+            </a:r>
+            <a:r>
+              <a:rPr lang="en-US" dirty="0" smtClean="0"/>
+              <a:t>branch &lt;branch-Name&gt;</a:t>
             </a:r>
           </a:p>
           <a:p>
@@ -4317,7 +4389,7 @@
             </a:r>
             <a:r>
               <a:rPr lang="en-US" dirty="0" smtClean="0"/>
-              <a:t> branch -d &lt;branch-Name&gt;</a:t>
+              <a:t> checkout ‘branch-Name’</a:t>
             </a:r>
           </a:p>
           <a:p>
@@ -4328,6 +4400,17 @@
             </a:r>
             <a:r>
               <a:rPr lang="en-US" dirty="0" smtClean="0"/>
+              <a:t> branch -d &lt;branch-Name&gt;</a:t>
+            </a:r>
+          </a:p>
+          <a:p>
+            <a:pPr lvl="1"/>
+            <a:r>
+              <a:rPr lang="en-US" dirty="0" err="1" smtClean="0"/>
+              <a:t>git</a:t>
+            </a:r>
+            <a:r>
+              <a:rPr lang="en-US" dirty="0" smtClean="0"/>
               <a:t> branch –D &lt;branch-Name&gt;</a:t>
             </a:r>
             <a:endParaRPr lang="en-US" dirty="0"/>
@@ -4358,7 +4441,18 @@
             <a:pPr lvl="1"/>
             <a:r>
               <a:rPr lang="en-US" dirty="0" smtClean="0"/>
-              <a:t>Makes the new branch</a:t>
+              <a:t>List all branches</a:t>
+            </a:r>
+          </a:p>
+          <a:p>
+            <a:pPr lvl="1"/>
+            <a:r>
+              <a:rPr lang="en-US" dirty="0" smtClean="0"/>
+              <a:t>Makes </a:t>
+            </a:r>
+            <a:r>
+              <a:rPr lang="en-US" dirty="0" smtClean="0"/>
+              <a:t>the new branch</a:t>
             </a:r>
           </a:p>
           <a:p>
@@ -4627,6 +4721,224 @@
         </p:nvSpPr>
         <p:spPr/>
         <p:txBody>
+          <a:bodyPr/>
+          <a:lstStyle/>
+          <a:p>
+            <a:pPr algn="ctr"/>
+            <a:r>
+              <a:rPr lang="en-US" dirty="0" err="1" smtClean="0"/>
+              <a:t>Git</a:t>
+            </a:r>
+            <a:r>
+              <a:rPr lang="en-US" dirty="0" smtClean="0"/>
+              <a:t> </a:t>
+            </a:r>
+            <a:r>
+              <a:rPr lang="en-US" dirty="0" err="1" smtClean="0"/>
+              <a:t>Mergey</a:t>
+            </a:r>
+            <a:endParaRPr lang="en-US" dirty="0"/>
+          </a:p>
+        </p:txBody>
+      </p:sp>
+      <p:sp>
+        <p:nvSpPr>
+          <p:cNvPr id="3" name="Content Placeholder 2"/>
+          <p:cNvSpPr>
+            <a:spLocks noGrp="1"/>
+          </p:cNvSpPr>
+          <p:nvPr>
+            <p:ph sz="half" idx="1"/>
+          </p:nvPr>
+        </p:nvSpPr>
+        <p:spPr/>
+        <p:txBody>
+          <a:bodyPr/>
+          <a:lstStyle/>
+          <a:p>
+            <a:r>
+              <a:rPr lang="en-US" dirty="0" smtClean="0"/>
+              <a:t>Common </a:t>
+            </a:r>
+            <a:r>
+              <a:rPr lang="en-US" dirty="0" err="1" smtClean="0"/>
+              <a:t>Git</a:t>
+            </a:r>
+            <a:r>
+              <a:rPr lang="en-US" dirty="0" smtClean="0"/>
+              <a:t> Merge Commands </a:t>
+            </a:r>
+          </a:p>
+          <a:p>
+            <a:pPr lvl="1"/>
+            <a:r>
+              <a:rPr lang="en-US" dirty="0" err="1" smtClean="0"/>
+              <a:t>git</a:t>
+            </a:r>
+            <a:r>
+              <a:rPr lang="en-US" dirty="0" smtClean="0"/>
+              <a:t> branch</a:t>
+            </a:r>
+          </a:p>
+          <a:p>
+            <a:pPr lvl="1"/>
+            <a:r>
+              <a:rPr lang="en-US" dirty="0" err="1" smtClean="0"/>
+              <a:t>git</a:t>
+            </a:r>
+            <a:r>
+              <a:rPr lang="en-US" dirty="0" smtClean="0"/>
+              <a:t> branch &lt;branch-name&gt;</a:t>
+            </a:r>
+          </a:p>
+          <a:p>
+            <a:pPr lvl="1"/>
+            <a:r>
+              <a:rPr lang="en-US" dirty="0" err="1" smtClean="0"/>
+              <a:t>git</a:t>
+            </a:r>
+            <a:r>
+              <a:rPr lang="en-US" dirty="0" smtClean="0"/>
+              <a:t> merge </a:t>
+            </a:r>
+            <a:r>
+              <a:rPr lang="en-US" dirty="0"/>
+              <a:t>&lt;branch-name&gt;</a:t>
+            </a:r>
+          </a:p>
+          <a:p>
+            <a:pPr lvl="1"/>
+            <a:r>
+              <a:rPr lang="en-US" dirty="0" err="1"/>
+              <a:t>g</a:t>
+            </a:r>
+            <a:r>
+              <a:rPr lang="en-US" dirty="0" err="1" smtClean="0"/>
+              <a:t>it</a:t>
+            </a:r>
+            <a:r>
+              <a:rPr lang="en-US" dirty="0" smtClean="0"/>
+              <a:t> Status</a:t>
+            </a:r>
+          </a:p>
+          <a:p>
+            <a:pPr lvl="2"/>
+            <a:r>
+              <a:rPr lang="en-US" dirty="0" smtClean="0"/>
+              <a:t>Handy for dealing with conflicts</a:t>
+            </a:r>
+          </a:p>
+          <a:p>
+            <a:pPr lvl="1"/>
+            <a:endParaRPr lang="en-US" dirty="0" smtClean="0"/>
+          </a:p>
+        </p:txBody>
+      </p:sp>
+      <p:sp>
+        <p:nvSpPr>
+          <p:cNvPr id="4" name="Content Placeholder 3"/>
+          <p:cNvSpPr>
+            <a:spLocks noGrp="1"/>
+          </p:cNvSpPr>
+          <p:nvPr>
+            <p:ph sz="half" idx="2"/>
+          </p:nvPr>
+        </p:nvSpPr>
+        <p:spPr/>
+        <p:txBody>
+          <a:bodyPr/>
+          <a:lstStyle/>
+          <a:p>
+            <a:r>
+              <a:rPr lang="en-US" dirty="0" smtClean="0"/>
+              <a:t>What They Do</a:t>
+            </a:r>
+          </a:p>
+          <a:p>
+            <a:pPr lvl="1"/>
+            <a:r>
+              <a:rPr lang="en-US" dirty="0" smtClean="0"/>
+              <a:t>List all branches</a:t>
+            </a:r>
+          </a:p>
+          <a:p>
+            <a:pPr lvl="1"/>
+            <a:r>
+              <a:rPr lang="en-US" dirty="0" smtClean="0"/>
+              <a:t>Creates a new branch</a:t>
+            </a:r>
+          </a:p>
+          <a:p>
+            <a:pPr lvl="1"/>
+            <a:r>
+              <a:rPr lang="en-US" sz="1600" dirty="0" smtClean="0"/>
+              <a:t>Merges named branch to current  branch</a:t>
+            </a:r>
+          </a:p>
+          <a:p>
+            <a:pPr lvl="1"/>
+            <a:r>
+              <a:rPr lang="en-US" dirty="0" smtClean="0"/>
+              <a:t>Shows status of current branch</a:t>
+            </a:r>
+          </a:p>
+          <a:p>
+            <a:pPr marL="365760" lvl="1" indent="0">
+              <a:buNone/>
+            </a:pPr>
+            <a:endParaRPr lang="en-US" dirty="0"/>
+          </a:p>
+        </p:txBody>
+      </p:sp>
+    </p:spTree>
+    <p:extLst>
+      <p:ext uri="{BB962C8B-B14F-4D97-AF65-F5344CB8AC3E}">
+        <p14:creationId xmlns:p14="http://schemas.microsoft.com/office/powerpoint/2010/main" val="1466978023"/>
+      </p:ext>
+    </p:extLst>
+  </p:cSld>
+  <p:clrMapOvr>
+    <a:masterClrMapping/>
+  </p:clrMapOvr>
+  <p:timing>
+    <p:tnLst>
+      <p:par>
+        <p:cTn id="1" dur="indefinite" restart="never" nodeType="tmRoot"/>
+      </p:par>
+    </p:tnLst>
+  </p:timing>
+</p:sld>
+</file>
+
+<file path=ppt/slides/slide7.xml><?xml version="1.0" encoding="utf-8"?>
+<p:sld xmlns:a="http://schemas.openxmlformats.org/drawingml/2006/main" xmlns:r="http://schemas.openxmlformats.org/officeDocument/2006/relationships" xmlns:p="http://schemas.openxmlformats.org/presentationml/2006/main">
+  <p:cSld>
+    <p:spTree>
+      <p:nvGrpSpPr>
+        <p:cNvPr id="1" name=""/>
+        <p:cNvGrpSpPr/>
+        <p:nvPr/>
+      </p:nvGrpSpPr>
+      <p:grpSpPr>
+        <a:xfrm>
+          <a:off x="0" y="0"/>
+          <a:ext cx="0" cy="0"/>
+          <a:chOff x="0" y="0"/>
+          <a:chExt cx="0" cy="0"/>
+        </a:xfrm>
+      </p:grpSpPr>
+      <p:sp>
+        <p:nvSpPr>
+          <p:cNvPr id="2" name="Title 1"/>
+          <p:cNvSpPr>
+            <a:spLocks noGrp="1"/>
+          </p:cNvSpPr>
+          <p:nvPr>
+            <p:ph type="title"/>
+          </p:nvPr>
+        </p:nvSpPr>
+        <p:spPr/>
+        <p:txBody>
           <a:bodyPr>
             <a:normAutofit/>
           </a:bodyPr>
@@ -4717,7 +5029,7 @@
 </p:sld>
 </file>
 
-<file path=ppt/slides/slide7.xml><?xml version="1.0" encoding="utf-8"?>
+<file path=ppt/slides/slide8.xml><?xml version="1.0" encoding="utf-8"?>
 <p:sld xmlns:a="http://schemas.openxmlformats.org/drawingml/2006/main" xmlns:r="http://schemas.openxmlformats.org/officeDocument/2006/relationships" xmlns:p="http://schemas.openxmlformats.org/presentationml/2006/main">
   <p:cSld>
     <p:spTree>
@@ -5607,141 +5919,6 @@
 </file>
 
 <file path=customXml/item1.xml><?xml version="1.0" encoding="utf-8"?>
-<p:properties xmlns:p="http://schemas.microsoft.com/office/2006/metadata/properties" xmlns:xsi="http://www.w3.org/2001/XMLSchema-instance" xmlns:pc="http://schemas.microsoft.com/office/infopath/2007/PartnerControls">
-  <documentManagement>
-    <DirectSourceMarket xmlns="4873beb7-5857-4685-be1f-d57550cc96cc" xsi:nil="true"/>
-    <ApprovalStatus xmlns="4873beb7-5857-4685-be1f-d57550cc96cc">InProgress</ApprovalStatus>
-    <MarketSpecific xmlns="4873beb7-5857-4685-be1f-d57550cc96cc">false</MarketSpecific>
-    <LocComments xmlns="4873beb7-5857-4685-be1f-d57550cc96cc" xsi:nil="true"/>
-    <ThumbnailAssetId xmlns="4873beb7-5857-4685-be1f-d57550cc96cc" xsi:nil="true"/>
-    <PrimaryImageGen xmlns="4873beb7-5857-4685-be1f-d57550cc96cc">true</PrimaryImageGen>
-    <LegacyData xmlns="4873beb7-5857-4685-be1f-d57550cc96cc" xsi:nil="true"/>
-    <LocRecommendedHandoff xmlns="4873beb7-5857-4685-be1f-d57550cc96cc" xsi:nil="true"/>
-    <BusinessGroup xmlns="4873beb7-5857-4685-be1f-d57550cc96cc" xsi:nil="true"/>
-    <BlockPublish xmlns="4873beb7-5857-4685-be1f-d57550cc96cc">false</BlockPublish>
-    <TPFriendlyName xmlns="4873beb7-5857-4685-be1f-d57550cc96cc" xsi:nil="true"/>
-    <NumericId xmlns="4873beb7-5857-4685-be1f-d57550cc96cc" xsi:nil="true"/>
-    <APEditor xmlns="4873beb7-5857-4685-be1f-d57550cc96cc">
-      <UserInfo>
-        <DisplayName/>
-        <AccountId xsi:nil="true"/>
-        <AccountType/>
-      </UserInfo>
-    </APEditor>
-    <SourceTitle xmlns="4873beb7-5857-4685-be1f-d57550cc96cc" xsi:nil="true"/>
-    <OpenTemplate xmlns="4873beb7-5857-4685-be1f-d57550cc96cc">true</OpenTemplate>
-    <UALocComments xmlns="4873beb7-5857-4685-be1f-d57550cc96cc" xsi:nil="true"/>
-    <ParentAssetId xmlns="4873beb7-5857-4685-be1f-d57550cc96cc" xsi:nil="true"/>
-    <IntlLangReviewDate xmlns="4873beb7-5857-4685-be1f-d57550cc96cc" xsi:nil="true"/>
-    <FeatureTagsTaxHTField0 xmlns="4873beb7-5857-4685-be1f-d57550cc96cc">
-      <Terms xmlns="http://schemas.microsoft.com/office/infopath/2007/PartnerControls"/>
-    </FeatureTagsTaxHTField0>
-    <PublishStatusLookup xmlns="4873beb7-5857-4685-be1f-d57550cc96cc">
-      <Value>1566889</Value>
-    </PublishStatusLookup>
-    <Providers xmlns="4873beb7-5857-4685-be1f-d57550cc96cc" xsi:nil="true"/>
-    <MachineTranslated xmlns="4873beb7-5857-4685-be1f-d57550cc96cc">false</MachineTranslated>
-    <OriginalSourceMarket xmlns="4873beb7-5857-4685-be1f-d57550cc96cc" xsi:nil="true"/>
-    <APDescription xmlns="4873beb7-5857-4685-be1f-d57550cc96cc" xsi:nil="true"/>
-    <ClipArtFilename xmlns="4873beb7-5857-4685-be1f-d57550cc96cc" xsi:nil="true"/>
-    <ContentItem xmlns="4873beb7-5857-4685-be1f-d57550cc96cc" xsi:nil="true"/>
-    <TPInstallLocation xmlns="4873beb7-5857-4685-be1f-d57550cc96cc" xsi:nil="true"/>
-    <PublishTargets xmlns="4873beb7-5857-4685-be1f-d57550cc96cc">OfficeOnlineVNext</PublishTargets>
-    <TimesCloned xmlns="4873beb7-5857-4685-be1f-d57550cc96cc" xsi:nil="true"/>
-    <AssetStart xmlns="4873beb7-5857-4685-be1f-d57550cc96cc">2012-05-23T08:44:00+00:00</AssetStart>
-    <Provider xmlns="4873beb7-5857-4685-be1f-d57550cc96cc" xsi:nil="true"/>
-    <AcquiredFrom xmlns="4873beb7-5857-4685-be1f-d57550cc96cc">Internal MS</AcquiredFrom>
-    <FriendlyTitle xmlns="4873beb7-5857-4685-be1f-d57550cc96cc" xsi:nil="true"/>
-    <LastHandOff xmlns="4873beb7-5857-4685-be1f-d57550cc96cc" xsi:nil="true"/>
-    <TPClientViewer xmlns="4873beb7-5857-4685-be1f-d57550cc96cc" xsi:nil="true"/>
-    <UACurrentWords xmlns="4873beb7-5857-4685-be1f-d57550cc96cc" xsi:nil="true"/>
-    <ArtSampleDocs xmlns="4873beb7-5857-4685-be1f-d57550cc96cc" xsi:nil="true"/>
-    <UALocRecommendation xmlns="4873beb7-5857-4685-be1f-d57550cc96cc">Localize</UALocRecommendation>
-    <Manager xmlns="4873beb7-5857-4685-be1f-d57550cc96cc" xsi:nil="true"/>
-    <ShowIn xmlns="4873beb7-5857-4685-be1f-d57550cc96cc">Show everywhere</ShowIn>
-    <UANotes xmlns="4873beb7-5857-4685-be1f-d57550cc96cc" xsi:nil="true"/>
-    <TemplateStatus xmlns="4873beb7-5857-4685-be1f-d57550cc96cc">Complete</TemplateStatus>
-    <InternalTagsTaxHTField0 xmlns="4873beb7-5857-4685-be1f-d57550cc96cc">
-      <Terms xmlns="http://schemas.microsoft.com/office/infopath/2007/PartnerControls"/>
-    </InternalTagsTaxHTField0>
-    <CSXHash xmlns="4873beb7-5857-4685-be1f-d57550cc96cc" xsi:nil="true"/>
-    <Downloads xmlns="4873beb7-5857-4685-be1f-d57550cc96cc">0</Downloads>
-    <VoteCount xmlns="4873beb7-5857-4685-be1f-d57550cc96cc" xsi:nil="true"/>
-    <OOCacheId xmlns="4873beb7-5857-4685-be1f-d57550cc96cc" xsi:nil="true"/>
-    <IsDeleted xmlns="4873beb7-5857-4685-be1f-d57550cc96cc">false</IsDeleted>
-    <AssetExpire xmlns="4873beb7-5857-4685-be1f-d57550cc96cc">2029-01-01T08:00:00+00:00</AssetExpire>
-    <DSATActionTaken xmlns="4873beb7-5857-4685-be1f-d57550cc96cc" xsi:nil="true"/>
-    <CSXSubmissionMarket xmlns="4873beb7-5857-4685-be1f-d57550cc96cc" xsi:nil="true"/>
-    <TPExecutable xmlns="4873beb7-5857-4685-be1f-d57550cc96cc" xsi:nil="true"/>
-    <SubmitterId xmlns="4873beb7-5857-4685-be1f-d57550cc96cc" xsi:nil="true"/>
-    <EditorialTags xmlns="4873beb7-5857-4685-be1f-d57550cc96cc" xsi:nil="true"/>
-    <ApprovalLog xmlns="4873beb7-5857-4685-be1f-d57550cc96cc" xsi:nil="true"/>
-    <AssetType xmlns="4873beb7-5857-4685-be1f-d57550cc96cc">TP</AssetType>
-    <BugNumber xmlns="4873beb7-5857-4685-be1f-d57550cc96cc" xsi:nil="true"/>
-    <CSXSubmissionDate xmlns="4873beb7-5857-4685-be1f-d57550cc96cc" xsi:nil="true"/>
-    <CSXUpdate xmlns="4873beb7-5857-4685-be1f-d57550cc96cc">false</CSXUpdate>
-    <Milestone xmlns="4873beb7-5857-4685-be1f-d57550cc96cc" xsi:nil="true"/>
-    <RecommendationsModifier xmlns="4873beb7-5857-4685-be1f-d57550cc96cc" xsi:nil="true"/>
-    <OriginAsset xmlns="4873beb7-5857-4685-be1f-d57550cc96cc" xsi:nil="true"/>
-    <TPComponent xmlns="4873beb7-5857-4685-be1f-d57550cc96cc" xsi:nil="true"/>
-    <AssetId xmlns="4873beb7-5857-4685-be1f-d57550cc96cc">TP102901017</AssetId>
-    <IntlLocPriority xmlns="4873beb7-5857-4685-be1f-d57550cc96cc" xsi:nil="true"/>
-    <PolicheckWords xmlns="4873beb7-5857-4685-be1f-d57550cc96cc" xsi:nil="true"/>
-    <TPLaunchHelpLink xmlns="4873beb7-5857-4685-be1f-d57550cc96cc" xsi:nil="true"/>
-    <TPApplication xmlns="4873beb7-5857-4685-be1f-d57550cc96cc" xsi:nil="true"/>
-    <CrawlForDependencies xmlns="4873beb7-5857-4685-be1f-d57550cc96cc">false</CrawlForDependencies>
-    <HandoffToMSDN xmlns="4873beb7-5857-4685-be1f-d57550cc96cc" xsi:nil="true"/>
-    <PlannedPubDate xmlns="4873beb7-5857-4685-be1f-d57550cc96cc" xsi:nil="true"/>
-    <IntlLangReviewer xmlns="4873beb7-5857-4685-be1f-d57550cc96cc" xsi:nil="true"/>
-    <TrustLevel xmlns="4873beb7-5857-4685-be1f-d57550cc96cc">1 Microsoft Managed Content</TrustLevel>
-    <LocLastLocAttemptVersionLookup xmlns="4873beb7-5857-4685-be1f-d57550cc96cc">836753</LocLastLocAttemptVersionLookup>
-    <IsSearchable xmlns="4873beb7-5857-4685-be1f-d57550cc96cc">true</IsSearchable>
-    <TemplateTemplateType xmlns="4873beb7-5857-4685-be1f-d57550cc96cc">PowerPoint Design Template</TemplateTemplateType>
-    <CampaignTagsTaxHTField0 xmlns="4873beb7-5857-4685-be1f-d57550cc96cc">
-      <Terms xmlns="http://schemas.microsoft.com/office/infopath/2007/PartnerControls"/>
-    </CampaignTagsTaxHTField0>
-    <TPNamespace xmlns="4873beb7-5857-4685-be1f-d57550cc96cc" xsi:nil="true"/>
-    <TaxCatchAll xmlns="4873beb7-5857-4685-be1f-d57550cc96cc"/>
-    <Markets xmlns="4873beb7-5857-4685-be1f-d57550cc96cc"/>
-    <UAProjectedTotalWords xmlns="4873beb7-5857-4685-be1f-d57550cc96cc" xsi:nil="true"/>
-    <IntlLangReview xmlns="4873beb7-5857-4685-be1f-d57550cc96cc">false</IntlLangReview>
-    <OutputCachingOn xmlns="4873beb7-5857-4685-be1f-d57550cc96cc">false</OutputCachingOn>
-    <AverageRating xmlns="4873beb7-5857-4685-be1f-d57550cc96cc" xsi:nil="true"/>
-    <APAuthor xmlns="4873beb7-5857-4685-be1f-d57550cc96cc">
-      <UserInfo>
-        <DisplayName>REDMOND\v-anij</DisplayName>
-        <AccountId>2469</AccountId>
-        <AccountType/>
-      </UserInfo>
-    </APAuthor>
-    <LocManualTestRequired xmlns="4873beb7-5857-4685-be1f-d57550cc96cc">false</LocManualTestRequired>
-    <TPCommandLine xmlns="4873beb7-5857-4685-be1f-d57550cc96cc" xsi:nil="true"/>
-    <TPAppVersion xmlns="4873beb7-5857-4685-be1f-d57550cc96cc" xsi:nil="true"/>
-    <EditorialStatus xmlns="4873beb7-5857-4685-be1f-d57550cc96cc">Complete</EditorialStatus>
-    <LastModifiedDateTime xmlns="4873beb7-5857-4685-be1f-d57550cc96cc" xsi:nil="true"/>
-    <ScenarioTagsTaxHTField0 xmlns="4873beb7-5857-4685-be1f-d57550cc96cc">
-      <Terms xmlns="http://schemas.microsoft.com/office/infopath/2007/PartnerControls"/>
-    </ScenarioTagsTaxHTField0>
-    <OriginalRelease xmlns="4873beb7-5857-4685-be1f-d57550cc96cc">15</OriginalRelease>
-    <TPLaunchHelpLinkType xmlns="4873beb7-5857-4685-be1f-d57550cc96cc">Template</TPLaunchHelpLinkType>
-    <LocalizationTagsTaxHTField0 xmlns="4873beb7-5857-4685-be1f-d57550cc96cc">
-      <Terms xmlns="http://schemas.microsoft.com/office/infopath/2007/PartnerControls"/>
-    </LocalizationTagsTaxHTField0>
-    <LocMarketGroupTiers2 xmlns="4873beb7-5857-4685-be1f-d57550cc96cc" xsi:nil="true"/>
-  </documentManagement>
-</p:properties>
-</file>
-
-<file path=customXml/item2.xml><?xml version="1.0" encoding="utf-8"?>
-<?mso-contentType ?>
-<FormTemplates xmlns="http://schemas.microsoft.com/sharepoint/v3/contenttype/forms">
-  <Display>DocumentLibraryForm</Display>
-  <Edit>AssetEditForm</Edit>
-  <New>DocumentLibraryForm</New>
-</FormTemplates>
-</file>
-
-<file path=customXml/item3.xml><?xml version="1.0" encoding="utf-8"?>
 <ct:contentTypeSchema xmlns:ct="http://schemas.microsoft.com/office/2006/metadata/contentType" xmlns:ma="http://schemas.microsoft.com/office/2006/metadata/properties/metaAttributes" ct:_="" ma:_="" ma:contentTypeName="TemplateFile" ma:contentTypeID="0x0101006EDDDB5EE6D98C44930B742096920B300400F5B6D36B3EF94B4E9A635CDF2A18F5B8" ma:contentTypeVersion="72" ma:contentTypeDescription="Create a new document." ma:contentTypeScope="" ma:versionID="a23e56308344d904b51738559c3d67c9">
   <xsd:schema xmlns:xsd="http://www.w3.org/2001/XMLSchema" xmlns:xs="http://www.w3.org/2001/XMLSchema" xmlns:p="http://schemas.microsoft.com/office/2006/metadata/properties" xmlns:ns2="4873beb7-5857-4685-be1f-d57550cc96cc" targetNamespace="http://schemas.microsoft.com/office/2006/metadata/properties" ma:root="true" ma:fieldsID="cd0908cc4600e77bf5da051303e00c8d" ns2:_="">
     <xsd:import namespace="4873beb7-5857-4685-be1f-d57550cc96cc"/>
@@ -6781,31 +6958,142 @@
 </ct:contentTypeSchema>
 </file>
 
-<file path=customXml/itemProps1.xml><?xml version="1.0" encoding="utf-8"?>
-<ds:datastoreItem xmlns:ds="http://schemas.openxmlformats.org/officeDocument/2006/customXml" ds:itemID="{04098515-0C12-46CF-BC7C-69B4A13CD5FA}">
-  <ds:schemaRefs>
-    <ds:schemaRef ds:uri="http://schemas.microsoft.com/office/infopath/2007/PartnerControls"/>
-    <ds:schemaRef ds:uri="http://purl.org/dc/elements/1.1/"/>
-    <ds:schemaRef ds:uri="http://purl.org/dc/terms/"/>
-    <ds:schemaRef ds:uri="http://schemas.microsoft.com/office/2006/documentManagement/types"/>
-    <ds:schemaRef ds:uri="http://purl.org/dc/dcmitype/"/>
-    <ds:schemaRef ds:uri="4873beb7-5857-4685-be1f-d57550cc96cc"/>
-    <ds:schemaRef ds:uri="http://schemas.openxmlformats.org/package/2006/metadata/core-properties"/>
-    <ds:schemaRef ds:uri="http://schemas.microsoft.com/office/2006/metadata/properties"/>
-    <ds:schemaRef ds:uri="http://www.w3.org/XML/1998/namespace"/>
-  </ds:schemaRefs>
-</ds:datastoreItem>
+<file path=customXml/item2.xml><?xml version="1.0" encoding="utf-8"?>
+<?mso-contentType ?>
+<FormTemplates xmlns="http://schemas.microsoft.com/sharepoint/v3/contenttype/forms">
+  <Display>DocumentLibraryForm</Display>
+  <Edit>AssetEditForm</Edit>
+  <New>DocumentLibraryForm</New>
+</FormTemplates>
 </file>
 
-<file path=customXml/itemProps2.xml><?xml version="1.0" encoding="utf-8"?>
-<ds:datastoreItem xmlns:ds="http://schemas.openxmlformats.org/officeDocument/2006/customXml" ds:itemID="{746CFF6F-D9AA-4BC0-911A-0A1356771912}">
-  <ds:schemaRefs>
-    <ds:schemaRef ds:uri="http://schemas.microsoft.com/sharepoint/v3/contenttype/forms"/>
-  </ds:schemaRefs>
-</ds:datastoreItem>
+<file path=customXml/item3.xml><?xml version="1.0" encoding="utf-8"?>
+<p:properties xmlns:p="http://schemas.microsoft.com/office/2006/metadata/properties" xmlns:xsi="http://www.w3.org/2001/XMLSchema-instance" xmlns:pc="http://schemas.microsoft.com/office/infopath/2007/PartnerControls">
+  <documentManagement>
+    <DirectSourceMarket xmlns="4873beb7-5857-4685-be1f-d57550cc96cc" xsi:nil="true"/>
+    <ApprovalStatus xmlns="4873beb7-5857-4685-be1f-d57550cc96cc">InProgress</ApprovalStatus>
+    <MarketSpecific xmlns="4873beb7-5857-4685-be1f-d57550cc96cc">false</MarketSpecific>
+    <LocComments xmlns="4873beb7-5857-4685-be1f-d57550cc96cc" xsi:nil="true"/>
+    <ThumbnailAssetId xmlns="4873beb7-5857-4685-be1f-d57550cc96cc" xsi:nil="true"/>
+    <PrimaryImageGen xmlns="4873beb7-5857-4685-be1f-d57550cc96cc">true</PrimaryImageGen>
+    <LegacyData xmlns="4873beb7-5857-4685-be1f-d57550cc96cc" xsi:nil="true"/>
+    <LocRecommendedHandoff xmlns="4873beb7-5857-4685-be1f-d57550cc96cc" xsi:nil="true"/>
+    <BusinessGroup xmlns="4873beb7-5857-4685-be1f-d57550cc96cc" xsi:nil="true"/>
+    <BlockPublish xmlns="4873beb7-5857-4685-be1f-d57550cc96cc">false</BlockPublish>
+    <TPFriendlyName xmlns="4873beb7-5857-4685-be1f-d57550cc96cc" xsi:nil="true"/>
+    <NumericId xmlns="4873beb7-5857-4685-be1f-d57550cc96cc" xsi:nil="true"/>
+    <APEditor xmlns="4873beb7-5857-4685-be1f-d57550cc96cc">
+      <UserInfo>
+        <DisplayName/>
+        <AccountId xsi:nil="true"/>
+        <AccountType/>
+      </UserInfo>
+    </APEditor>
+    <SourceTitle xmlns="4873beb7-5857-4685-be1f-d57550cc96cc" xsi:nil="true"/>
+    <OpenTemplate xmlns="4873beb7-5857-4685-be1f-d57550cc96cc">true</OpenTemplate>
+    <UALocComments xmlns="4873beb7-5857-4685-be1f-d57550cc96cc" xsi:nil="true"/>
+    <ParentAssetId xmlns="4873beb7-5857-4685-be1f-d57550cc96cc" xsi:nil="true"/>
+    <IntlLangReviewDate xmlns="4873beb7-5857-4685-be1f-d57550cc96cc" xsi:nil="true"/>
+    <FeatureTagsTaxHTField0 xmlns="4873beb7-5857-4685-be1f-d57550cc96cc">
+      <Terms xmlns="http://schemas.microsoft.com/office/infopath/2007/PartnerControls"/>
+    </FeatureTagsTaxHTField0>
+    <PublishStatusLookup xmlns="4873beb7-5857-4685-be1f-d57550cc96cc">
+      <Value>1566889</Value>
+    </PublishStatusLookup>
+    <Providers xmlns="4873beb7-5857-4685-be1f-d57550cc96cc" xsi:nil="true"/>
+    <MachineTranslated xmlns="4873beb7-5857-4685-be1f-d57550cc96cc">false</MachineTranslated>
+    <OriginalSourceMarket xmlns="4873beb7-5857-4685-be1f-d57550cc96cc" xsi:nil="true"/>
+    <APDescription xmlns="4873beb7-5857-4685-be1f-d57550cc96cc" xsi:nil="true"/>
+    <ClipArtFilename xmlns="4873beb7-5857-4685-be1f-d57550cc96cc" xsi:nil="true"/>
+    <ContentItem xmlns="4873beb7-5857-4685-be1f-d57550cc96cc" xsi:nil="true"/>
+    <TPInstallLocation xmlns="4873beb7-5857-4685-be1f-d57550cc96cc" xsi:nil="true"/>
+    <PublishTargets xmlns="4873beb7-5857-4685-be1f-d57550cc96cc">OfficeOnlineVNext</PublishTargets>
+    <TimesCloned xmlns="4873beb7-5857-4685-be1f-d57550cc96cc" xsi:nil="true"/>
+    <AssetStart xmlns="4873beb7-5857-4685-be1f-d57550cc96cc">2012-05-23T08:44:00+00:00</AssetStart>
+    <Provider xmlns="4873beb7-5857-4685-be1f-d57550cc96cc" xsi:nil="true"/>
+    <AcquiredFrom xmlns="4873beb7-5857-4685-be1f-d57550cc96cc">Internal MS</AcquiredFrom>
+    <FriendlyTitle xmlns="4873beb7-5857-4685-be1f-d57550cc96cc" xsi:nil="true"/>
+    <LastHandOff xmlns="4873beb7-5857-4685-be1f-d57550cc96cc" xsi:nil="true"/>
+    <TPClientViewer xmlns="4873beb7-5857-4685-be1f-d57550cc96cc" xsi:nil="true"/>
+    <UACurrentWords xmlns="4873beb7-5857-4685-be1f-d57550cc96cc" xsi:nil="true"/>
+    <ArtSampleDocs xmlns="4873beb7-5857-4685-be1f-d57550cc96cc" xsi:nil="true"/>
+    <UALocRecommendation xmlns="4873beb7-5857-4685-be1f-d57550cc96cc">Localize</UALocRecommendation>
+    <Manager xmlns="4873beb7-5857-4685-be1f-d57550cc96cc" xsi:nil="true"/>
+    <ShowIn xmlns="4873beb7-5857-4685-be1f-d57550cc96cc">Show everywhere</ShowIn>
+    <UANotes xmlns="4873beb7-5857-4685-be1f-d57550cc96cc" xsi:nil="true"/>
+    <TemplateStatus xmlns="4873beb7-5857-4685-be1f-d57550cc96cc">Complete</TemplateStatus>
+    <InternalTagsTaxHTField0 xmlns="4873beb7-5857-4685-be1f-d57550cc96cc">
+      <Terms xmlns="http://schemas.microsoft.com/office/infopath/2007/PartnerControls"/>
+    </InternalTagsTaxHTField0>
+    <CSXHash xmlns="4873beb7-5857-4685-be1f-d57550cc96cc" xsi:nil="true"/>
+    <Downloads xmlns="4873beb7-5857-4685-be1f-d57550cc96cc">0</Downloads>
+    <VoteCount xmlns="4873beb7-5857-4685-be1f-d57550cc96cc" xsi:nil="true"/>
+    <OOCacheId xmlns="4873beb7-5857-4685-be1f-d57550cc96cc" xsi:nil="true"/>
+    <IsDeleted xmlns="4873beb7-5857-4685-be1f-d57550cc96cc">false</IsDeleted>
+    <AssetExpire xmlns="4873beb7-5857-4685-be1f-d57550cc96cc">2029-01-01T08:00:00+00:00</AssetExpire>
+    <DSATActionTaken xmlns="4873beb7-5857-4685-be1f-d57550cc96cc" xsi:nil="true"/>
+    <CSXSubmissionMarket xmlns="4873beb7-5857-4685-be1f-d57550cc96cc" xsi:nil="true"/>
+    <TPExecutable xmlns="4873beb7-5857-4685-be1f-d57550cc96cc" xsi:nil="true"/>
+    <SubmitterId xmlns="4873beb7-5857-4685-be1f-d57550cc96cc" xsi:nil="true"/>
+    <EditorialTags xmlns="4873beb7-5857-4685-be1f-d57550cc96cc" xsi:nil="true"/>
+    <ApprovalLog xmlns="4873beb7-5857-4685-be1f-d57550cc96cc" xsi:nil="true"/>
+    <AssetType xmlns="4873beb7-5857-4685-be1f-d57550cc96cc">TP</AssetType>
+    <BugNumber xmlns="4873beb7-5857-4685-be1f-d57550cc96cc" xsi:nil="true"/>
+    <CSXSubmissionDate xmlns="4873beb7-5857-4685-be1f-d57550cc96cc" xsi:nil="true"/>
+    <CSXUpdate xmlns="4873beb7-5857-4685-be1f-d57550cc96cc">false</CSXUpdate>
+    <Milestone xmlns="4873beb7-5857-4685-be1f-d57550cc96cc" xsi:nil="true"/>
+    <RecommendationsModifier xmlns="4873beb7-5857-4685-be1f-d57550cc96cc" xsi:nil="true"/>
+    <OriginAsset xmlns="4873beb7-5857-4685-be1f-d57550cc96cc" xsi:nil="true"/>
+    <TPComponent xmlns="4873beb7-5857-4685-be1f-d57550cc96cc" xsi:nil="true"/>
+    <AssetId xmlns="4873beb7-5857-4685-be1f-d57550cc96cc">TP102901017</AssetId>
+    <IntlLocPriority xmlns="4873beb7-5857-4685-be1f-d57550cc96cc" xsi:nil="true"/>
+    <PolicheckWords xmlns="4873beb7-5857-4685-be1f-d57550cc96cc" xsi:nil="true"/>
+    <TPLaunchHelpLink xmlns="4873beb7-5857-4685-be1f-d57550cc96cc" xsi:nil="true"/>
+    <TPApplication xmlns="4873beb7-5857-4685-be1f-d57550cc96cc" xsi:nil="true"/>
+    <CrawlForDependencies xmlns="4873beb7-5857-4685-be1f-d57550cc96cc">false</CrawlForDependencies>
+    <HandoffToMSDN xmlns="4873beb7-5857-4685-be1f-d57550cc96cc" xsi:nil="true"/>
+    <PlannedPubDate xmlns="4873beb7-5857-4685-be1f-d57550cc96cc" xsi:nil="true"/>
+    <IntlLangReviewer xmlns="4873beb7-5857-4685-be1f-d57550cc96cc" xsi:nil="true"/>
+    <TrustLevel xmlns="4873beb7-5857-4685-be1f-d57550cc96cc">1 Microsoft Managed Content</TrustLevel>
+    <LocLastLocAttemptVersionLookup xmlns="4873beb7-5857-4685-be1f-d57550cc96cc">836753</LocLastLocAttemptVersionLookup>
+    <IsSearchable xmlns="4873beb7-5857-4685-be1f-d57550cc96cc">true</IsSearchable>
+    <TemplateTemplateType xmlns="4873beb7-5857-4685-be1f-d57550cc96cc">PowerPoint Design Template</TemplateTemplateType>
+    <CampaignTagsTaxHTField0 xmlns="4873beb7-5857-4685-be1f-d57550cc96cc">
+      <Terms xmlns="http://schemas.microsoft.com/office/infopath/2007/PartnerControls"/>
+    </CampaignTagsTaxHTField0>
+    <TPNamespace xmlns="4873beb7-5857-4685-be1f-d57550cc96cc" xsi:nil="true"/>
+    <TaxCatchAll xmlns="4873beb7-5857-4685-be1f-d57550cc96cc"/>
+    <Markets xmlns="4873beb7-5857-4685-be1f-d57550cc96cc"/>
+    <UAProjectedTotalWords xmlns="4873beb7-5857-4685-be1f-d57550cc96cc" xsi:nil="true"/>
+    <IntlLangReview xmlns="4873beb7-5857-4685-be1f-d57550cc96cc">false</IntlLangReview>
+    <OutputCachingOn xmlns="4873beb7-5857-4685-be1f-d57550cc96cc">false</OutputCachingOn>
+    <AverageRating xmlns="4873beb7-5857-4685-be1f-d57550cc96cc" xsi:nil="true"/>
+    <APAuthor xmlns="4873beb7-5857-4685-be1f-d57550cc96cc">
+      <UserInfo>
+        <DisplayName>REDMOND\v-anij</DisplayName>
+        <AccountId>2469</AccountId>
+        <AccountType/>
+      </UserInfo>
+    </APAuthor>
+    <LocManualTestRequired xmlns="4873beb7-5857-4685-be1f-d57550cc96cc">false</LocManualTestRequired>
+    <TPCommandLine xmlns="4873beb7-5857-4685-be1f-d57550cc96cc" xsi:nil="true"/>
+    <TPAppVersion xmlns="4873beb7-5857-4685-be1f-d57550cc96cc" xsi:nil="true"/>
+    <EditorialStatus xmlns="4873beb7-5857-4685-be1f-d57550cc96cc">Complete</EditorialStatus>
+    <LastModifiedDateTime xmlns="4873beb7-5857-4685-be1f-d57550cc96cc" xsi:nil="true"/>
+    <ScenarioTagsTaxHTField0 xmlns="4873beb7-5857-4685-be1f-d57550cc96cc">
+      <Terms xmlns="http://schemas.microsoft.com/office/infopath/2007/PartnerControls"/>
+    </ScenarioTagsTaxHTField0>
+    <OriginalRelease xmlns="4873beb7-5857-4685-be1f-d57550cc96cc">15</OriginalRelease>
+    <TPLaunchHelpLinkType xmlns="4873beb7-5857-4685-be1f-d57550cc96cc">Template</TPLaunchHelpLinkType>
+    <LocalizationTagsTaxHTField0 xmlns="4873beb7-5857-4685-be1f-d57550cc96cc">
+      <Terms xmlns="http://schemas.microsoft.com/office/infopath/2007/PartnerControls"/>
+    </LocalizationTagsTaxHTField0>
+    <LocMarketGroupTiers2 xmlns="4873beb7-5857-4685-be1f-d57550cc96cc" xsi:nil="true"/>
+  </documentManagement>
+</p:properties>
 </file>
 
-<file path=customXml/itemProps3.xml><?xml version="1.0" encoding="utf-8"?>
+<file path=customXml/itemProps1.xml><?xml version="1.0" encoding="utf-8"?>
 <ds:datastoreItem xmlns:ds="http://schemas.openxmlformats.org/officeDocument/2006/customXml" ds:itemID="{0B5C6E15-39DC-470B-9445-F754B9458020}">
   <ds:schemaRefs>
     <ds:schemaRef ds:uri="http://schemas.microsoft.com/office/2006/metadata/contentType"/>
@@ -6821,4 +7109,28 @@
     <ds:schemaRef ds:uri="http://schemas.microsoft.com/internal/obd"/>
   </ds:schemaRefs>
 </ds:datastoreItem>
+</file>
+
+<file path=customXml/itemProps2.xml><?xml version="1.0" encoding="utf-8"?>
+<ds:datastoreItem xmlns:ds="http://schemas.openxmlformats.org/officeDocument/2006/customXml" ds:itemID="{746CFF6F-D9AA-4BC0-911A-0A1356771912}">
+  <ds:schemaRefs>
+    <ds:schemaRef ds:uri="http://schemas.microsoft.com/sharepoint/v3/contenttype/forms"/>
+  </ds:schemaRefs>
+</ds:datastoreItem>
+</file>
+
+<file path=customXml/itemProps3.xml><?xml version="1.0" encoding="utf-8"?>
+<ds:datastoreItem xmlns:ds="http://schemas.openxmlformats.org/officeDocument/2006/customXml" ds:itemID="{04098515-0C12-46CF-BC7C-69B4A13CD5FA}">
+  <ds:schemaRefs>
+    <ds:schemaRef ds:uri="http://schemas.microsoft.com/office/infopath/2007/PartnerControls"/>
+    <ds:schemaRef ds:uri="http://purl.org/dc/elements/1.1/"/>
+    <ds:schemaRef ds:uri="http://purl.org/dc/terms/"/>
+    <ds:schemaRef ds:uri="http://schemas.microsoft.com/office/2006/documentManagement/types"/>
+    <ds:schemaRef ds:uri="http://purl.org/dc/dcmitype/"/>
+    <ds:schemaRef ds:uri="4873beb7-5857-4685-be1f-d57550cc96cc"/>
+    <ds:schemaRef ds:uri="http://schemas.openxmlformats.org/package/2006/metadata/core-properties"/>
+    <ds:schemaRef ds:uri="http://schemas.microsoft.com/office/2006/metadata/properties"/>
+    <ds:schemaRef ds:uri="http://www.w3.org/XML/1998/namespace"/>
+  </ds:schemaRefs>
+</ds:datastoreItem>
 </file>
</xml_diff>

<commit_message>
added t o branch
</commit_message>
<xml_diff>
--- a/GIT HUB Branching & Merging.pptx
+++ b/GIT HUB Branching & Merging.pptx
@@ -5,10 +5,10 @@
     <p:sldMasterId id="2147483648" r:id="rId4"/>
   </p:sldMasterIdLst>
   <p:notesMasterIdLst>
-    <p:notesMasterId r:id="rId13"/>
+    <p:notesMasterId r:id="rId14"/>
   </p:notesMasterIdLst>
   <p:handoutMasterIdLst>
-    <p:handoutMasterId r:id="rId14"/>
+    <p:handoutMasterId r:id="rId15"/>
   </p:handoutMasterIdLst>
   <p:sldIdLst>
     <p:sldId id="256" r:id="rId5"/>
@@ -19,6 +19,7 @@
     <p:sldId id="264" r:id="rId10"/>
     <p:sldId id="259" r:id="rId11"/>
     <p:sldId id="260" r:id="rId12"/>
+    <p:sldId id="265" r:id="rId13"/>
   </p:sldIdLst>
   <p:sldSz cx="12192000" cy="6858000"/>
   <p:notesSz cx="6858000" cy="9144000"/>
@@ -3894,11 +3895,7 @@
             </a:r>
             <a:r>
               <a:rPr lang="en-US" dirty="0" smtClean="0"/>
-              <a:t> clone &lt;repo URL</a:t>
-            </a:r>
-            <a:r>
-              <a:rPr lang="en-US" dirty="0" smtClean="0"/>
-              <a:t>&gt;</a:t>
+              <a:t> clone &lt;repo URL&gt;</a:t>
             </a:r>
           </a:p>
           <a:p>
@@ -3911,7 +3908,6 @@
               <a:rPr lang="en-US" dirty="0" smtClean="0"/>
               <a:t> Status</a:t>
             </a:r>
-            <a:endParaRPr lang="en-US" dirty="0" smtClean="0"/>
           </a:p>
           <a:p>
             <a:pPr lvl="1"/>
@@ -3921,11 +3917,7 @@
             </a:r>
             <a:r>
               <a:rPr lang="en-US" dirty="0" smtClean="0"/>
-              <a:t> add </a:t>
-            </a:r>
-            <a:r>
-              <a:rPr lang="en-US" dirty="0" smtClean="0"/>
-              <a:t>–A</a:t>
+              <a:t> add –A</a:t>
             </a:r>
           </a:p>
           <a:p>
@@ -3953,7 +3945,6 @@
               <a:rPr lang="en-US" dirty="0" smtClean="0"/>
               <a:t> add -u</a:t>
             </a:r>
-            <a:endParaRPr lang="en-US" dirty="0" smtClean="0"/>
           </a:p>
           <a:p>
             <a:pPr lvl="1"/>
@@ -4041,11 +4032,7 @@
             <a:pPr lvl="1"/>
             <a:r>
               <a:rPr lang="en-US" dirty="0" smtClean="0"/>
-              <a:t>Clones the repo to a </a:t>
-            </a:r>
-            <a:r>
-              <a:rPr lang="en-US" dirty="0" smtClean="0"/>
-              <a:t>location</a:t>
+              <a:t>Clones the repo to a location</a:t>
             </a:r>
           </a:p>
           <a:p>
@@ -4054,17 +4041,12 @@
               <a:rPr lang="en-US" dirty="0" smtClean="0"/>
               <a:t>Gets the current branch status</a:t>
             </a:r>
-            <a:endParaRPr lang="en-US" dirty="0" smtClean="0"/>
           </a:p>
           <a:p>
             <a:pPr lvl="1"/>
             <a:r>
               <a:rPr lang="en-US" dirty="0" smtClean="0"/>
-              <a:t>Adds ALL files to the staging </a:t>
-            </a:r>
-            <a:r>
-              <a:rPr lang="en-US" dirty="0" smtClean="0"/>
-              <a:t>area</a:t>
+              <a:t>Adds ALL files to the staging area</a:t>
             </a:r>
           </a:p>
           <a:p>
@@ -4084,7 +4066,6 @@
               <a:rPr lang="en-US" dirty="0" smtClean="0"/>
               <a:t>new</a:t>
             </a:r>
-            <a:endParaRPr lang="en-US" dirty="0" smtClean="0"/>
           </a:p>
           <a:p>
             <a:pPr lvl="1"/>
@@ -4097,22 +4078,14 @@
             <a:pPr lvl="1"/>
             <a:r>
               <a:rPr lang="en-US" dirty="0" smtClean="0"/>
-              <a:t>Commits all staged </a:t>
-            </a:r>
+              <a:t>Commits all staged files</a:t>
+            </a:r>
+          </a:p>
+          <a:p>
+            <a:pPr lvl="1"/>
             <a:r>
               <a:rPr lang="en-US" dirty="0" smtClean="0"/>
-              <a:t>files</a:t>
-            </a:r>
-          </a:p>
-          <a:p>
-            <a:pPr lvl="1"/>
-            <a:r>
-              <a:rPr lang="en-US" dirty="0" smtClean="0"/>
-              <a:t>Pushes </a:t>
-            </a:r>
-            <a:r>
-              <a:rPr lang="en-US" dirty="0" smtClean="0"/>
-              <a:t>the changes to GitHub</a:t>
+              <a:t>Pushes the changes to GitHub</a:t>
             </a:r>
           </a:p>
           <a:p>
@@ -4364,7 +4337,6 @@
               <a:rPr lang="en-US" dirty="0" smtClean="0"/>
               <a:t> branch</a:t>
             </a:r>
-            <a:endParaRPr lang="en-US" dirty="0" smtClean="0"/>
           </a:p>
           <a:p>
             <a:pPr lvl="1"/>
@@ -4374,11 +4346,7 @@
             </a:r>
             <a:r>
               <a:rPr lang="en-US" dirty="0" smtClean="0"/>
-              <a:t> </a:t>
-            </a:r>
-            <a:r>
-              <a:rPr lang="en-US" dirty="0" smtClean="0"/>
-              <a:t>branch &lt;branch-Name&gt;</a:t>
+              <a:t> branch &lt;branch-Name&gt;</a:t>
             </a:r>
           </a:p>
           <a:p>
@@ -4448,11 +4416,7 @@
             <a:pPr lvl="1"/>
             <a:r>
               <a:rPr lang="en-US" dirty="0" smtClean="0"/>
-              <a:t>Makes </a:t>
-            </a:r>
-            <a:r>
-              <a:rPr lang="en-US" dirty="0" smtClean="0"/>
-              <a:t>the new branch</a:t>
+              <a:t>Makes the new branch</a:t>
             </a:r>
           </a:p>
           <a:p>
@@ -5119,6 +5083,220 @@
     <p:extLst>
       <p:ext uri="{BB962C8B-B14F-4D97-AF65-F5344CB8AC3E}">
         <p14:creationId xmlns:p14="http://schemas.microsoft.com/office/powerpoint/2010/main" val="3337304140"/>
+      </p:ext>
+    </p:extLst>
+  </p:cSld>
+  <p:clrMapOvr>
+    <a:masterClrMapping/>
+  </p:clrMapOvr>
+  <p:timing>
+    <p:tnLst>
+      <p:par>
+        <p:cTn id="1" dur="indefinite" restart="never" nodeType="tmRoot"/>
+      </p:par>
+    </p:tnLst>
+  </p:timing>
+</p:sld>
+</file>
+
+<file path=ppt/slides/slide9.xml><?xml version="1.0" encoding="utf-8"?>
+<p:sld xmlns:a="http://schemas.openxmlformats.org/drawingml/2006/main" xmlns:r="http://schemas.openxmlformats.org/officeDocument/2006/relationships" xmlns:p="http://schemas.openxmlformats.org/presentationml/2006/main">
+  <p:cSld>
+    <p:spTree>
+      <p:nvGrpSpPr>
+        <p:cNvPr id="1" name=""/>
+        <p:cNvGrpSpPr/>
+        <p:nvPr/>
+      </p:nvGrpSpPr>
+      <p:grpSpPr>
+        <a:xfrm>
+          <a:off x="0" y="0"/>
+          <a:ext cx="0" cy="0"/>
+          <a:chOff x="0" y="0"/>
+          <a:chExt cx="0" cy="0"/>
+        </a:xfrm>
+      </p:grpSpPr>
+      <p:sp>
+        <p:nvSpPr>
+          <p:cNvPr id="2" name="Title 1"/>
+          <p:cNvSpPr>
+            <a:spLocks noGrp="1"/>
+          </p:cNvSpPr>
+          <p:nvPr>
+            <p:ph type="title"/>
+          </p:nvPr>
+        </p:nvSpPr>
+        <p:spPr/>
+        <p:txBody>
+          <a:bodyPr>
+            <a:normAutofit fontScale="90000"/>
+          </a:bodyPr>
+          <a:lstStyle/>
+          <a:p>
+            <a:pPr algn="ctr"/>
+            <a:r>
+              <a:rPr lang="en-US" sz="6600" b="1" dirty="0" smtClean="0"/>
+              <a:t>Now Try it yourself!</a:t>
+            </a:r>
+            <a:endParaRPr lang="en-US" sz="6600" b="1" dirty="0"/>
+          </a:p>
+        </p:txBody>
+      </p:sp>
+      <p:sp>
+        <p:nvSpPr>
+          <p:cNvPr id="3" name="Content Placeholder 2"/>
+          <p:cNvSpPr>
+            <a:spLocks noGrp="1"/>
+          </p:cNvSpPr>
+          <p:nvPr>
+            <p:ph idx="1"/>
+          </p:nvPr>
+        </p:nvSpPr>
+        <p:spPr/>
+        <p:txBody>
+          <a:bodyPr>
+            <a:normAutofit/>
+          </a:bodyPr>
+          <a:lstStyle/>
+          <a:p>
+            <a:r>
+              <a:rPr lang="en-US" sz="1800" dirty="0">
+                <a:hlinkClick r:id="rId2"/>
+              </a:rPr>
+              <a:t>https://</a:t>
+            </a:r>
+            <a:r>
+              <a:rPr lang="en-US" sz="1800" dirty="0" smtClean="0">
+                <a:hlinkClick r:id="rId2"/>
+              </a:rPr>
+              <a:t>github.com/KalinBowden/BeDapperDesigns</a:t>
+            </a:r>
+            <a:endParaRPr lang="en-US" sz="1800" dirty="0" smtClean="0"/>
+          </a:p>
+          <a:p>
+            <a:r>
+              <a:rPr lang="en-US" sz="1800" dirty="0" smtClean="0"/>
+              <a:t>Open </a:t>
+            </a:r>
+            <a:r>
+              <a:rPr lang="en-US" sz="1800" dirty="0" err="1" smtClean="0"/>
+              <a:t>git</a:t>
+            </a:r>
+            <a:r>
+              <a:rPr lang="en-US" sz="1800" dirty="0" smtClean="0"/>
+              <a:t> Bash or </a:t>
+            </a:r>
+            <a:r>
+              <a:rPr lang="en-US" sz="1800" dirty="0" err="1" smtClean="0"/>
+              <a:t>git</a:t>
+            </a:r>
+            <a:r>
+              <a:rPr lang="en-US" sz="1800" dirty="0" smtClean="0"/>
+              <a:t> kraken</a:t>
+            </a:r>
+          </a:p>
+          <a:p>
+            <a:r>
+              <a:rPr lang="en-US" sz="1800" dirty="0" err="1" smtClean="0"/>
+              <a:t>git</a:t>
+            </a:r>
+            <a:r>
+              <a:rPr lang="en-US" sz="1800" dirty="0"/>
+              <a:t> clone </a:t>
+            </a:r>
+            <a:r>
+              <a:rPr lang="en-US" sz="1800" dirty="0">
+                <a:hlinkClick r:id="rId3"/>
+              </a:rPr>
+              <a:t>https://</a:t>
+            </a:r>
+            <a:r>
+              <a:rPr lang="en-US" sz="1800" dirty="0" smtClean="0">
+                <a:hlinkClick r:id="rId3"/>
+              </a:rPr>
+              <a:t>github.com/KalinBowden/BeDapperDesigns.git</a:t>
+            </a:r>
+            <a:endParaRPr lang="en-US" sz="1800" dirty="0" smtClean="0"/>
+          </a:p>
+          <a:p>
+            <a:r>
+              <a:rPr lang="en-US" sz="1800" dirty="0" err="1" smtClean="0"/>
+              <a:t>git</a:t>
+            </a:r>
+            <a:r>
+              <a:rPr lang="en-US" sz="1800" dirty="0" smtClean="0"/>
+              <a:t> branch</a:t>
+            </a:r>
+          </a:p>
+          <a:p>
+            <a:r>
+              <a:rPr lang="en-US" sz="1800" dirty="0" err="1" smtClean="0"/>
+              <a:t>git</a:t>
+            </a:r>
+            <a:r>
+              <a:rPr lang="en-US" sz="1800" dirty="0" smtClean="0"/>
+              <a:t> branch &lt;Pick any name&gt;</a:t>
+            </a:r>
+          </a:p>
+          <a:p>
+            <a:r>
+              <a:rPr lang="en-US" sz="1800" dirty="0" err="1"/>
+              <a:t>g</a:t>
+            </a:r>
+            <a:r>
+              <a:rPr lang="en-US" sz="1800" dirty="0" err="1" smtClean="0"/>
+              <a:t>it</a:t>
+            </a:r>
+            <a:r>
+              <a:rPr lang="en-US" sz="1800" dirty="0" smtClean="0"/>
+              <a:t> checkout </a:t>
+            </a:r>
+            <a:r>
+              <a:rPr lang="en-US" sz="1800" dirty="0" err="1" smtClean="0"/>
+              <a:t>yourBranchName</a:t>
+            </a:r>
+            <a:endParaRPr lang="en-US" sz="1800" dirty="0" smtClean="0"/>
+          </a:p>
+          <a:p>
+            <a:r>
+              <a:rPr lang="en-US" sz="1800" dirty="0" smtClean="0"/>
+              <a:t>Edit the Title tag in the head of index.html</a:t>
+            </a:r>
+          </a:p>
+          <a:p>
+            <a:r>
+              <a:rPr lang="en-US" sz="1800" dirty="0" err="1" smtClean="0"/>
+              <a:t>git</a:t>
+            </a:r>
+            <a:r>
+              <a:rPr lang="en-US" sz="1800" dirty="0" smtClean="0"/>
+              <a:t> add –A</a:t>
+            </a:r>
+          </a:p>
+          <a:p>
+            <a:r>
+              <a:rPr lang="en-US" sz="1800" dirty="0" err="1" smtClean="0"/>
+              <a:t>git</a:t>
+            </a:r>
+            <a:r>
+              <a:rPr lang="en-US" sz="1800" dirty="0" smtClean="0"/>
+              <a:t> commit –</a:t>
+            </a:r>
+            <a:r>
+              <a:rPr lang="en-US" sz="1800" dirty="0" err="1" smtClean="0"/>
+              <a:t>m’Some</a:t>
+            </a:r>
+            <a:r>
+              <a:rPr lang="en-US" sz="1800" dirty="0" smtClean="0"/>
+              <a:t> comment’</a:t>
+            </a:r>
+          </a:p>
+        </p:txBody>
+      </p:sp>
+    </p:spTree>
+    <p:extLst>
+      <p:ext uri="{BB962C8B-B14F-4D97-AF65-F5344CB8AC3E}">
+        <p14:creationId xmlns:p14="http://schemas.microsoft.com/office/powerpoint/2010/main" val="4213753423"/>
       </p:ext>
     </p:extLst>
   </p:cSld>
@@ -6959,15 +7137,6 @@
 </file>
 
 <file path=customXml/item2.xml><?xml version="1.0" encoding="utf-8"?>
-<?mso-contentType ?>
-<FormTemplates xmlns="http://schemas.microsoft.com/sharepoint/v3/contenttype/forms">
-  <Display>DocumentLibraryForm</Display>
-  <Edit>AssetEditForm</Edit>
-  <New>DocumentLibraryForm</New>
-</FormTemplates>
-</file>
-
-<file path=customXml/item3.xml><?xml version="1.0" encoding="utf-8"?>
 <p:properties xmlns:p="http://schemas.microsoft.com/office/2006/metadata/properties" xmlns:xsi="http://www.w3.org/2001/XMLSchema-instance" xmlns:pc="http://schemas.microsoft.com/office/infopath/2007/PartnerControls">
   <documentManagement>
     <DirectSourceMarket xmlns="4873beb7-5857-4685-be1f-d57550cc96cc" xsi:nil="true"/>
@@ -7093,6 +7262,15 @@
 </p:properties>
 </file>
 
+<file path=customXml/item3.xml><?xml version="1.0" encoding="utf-8"?>
+<?mso-contentType ?>
+<FormTemplates xmlns="http://schemas.microsoft.com/sharepoint/v3/contenttype/forms">
+  <Display>DocumentLibraryForm</Display>
+  <Edit>AssetEditForm</Edit>
+  <New>DocumentLibraryForm</New>
+</FormTemplates>
+</file>
+
 <file path=customXml/itemProps1.xml><?xml version="1.0" encoding="utf-8"?>
 <ds:datastoreItem xmlns:ds="http://schemas.openxmlformats.org/officeDocument/2006/customXml" ds:itemID="{0B5C6E15-39DC-470B-9445-F754B9458020}">
   <ds:schemaRefs>
@@ -7112,14 +7290,6 @@
 </file>
 
 <file path=customXml/itemProps2.xml><?xml version="1.0" encoding="utf-8"?>
-<ds:datastoreItem xmlns:ds="http://schemas.openxmlformats.org/officeDocument/2006/customXml" ds:itemID="{746CFF6F-D9AA-4BC0-911A-0A1356771912}">
-  <ds:schemaRefs>
-    <ds:schemaRef ds:uri="http://schemas.microsoft.com/sharepoint/v3/contenttype/forms"/>
-  </ds:schemaRefs>
-</ds:datastoreItem>
-</file>
-
-<file path=customXml/itemProps3.xml><?xml version="1.0" encoding="utf-8"?>
 <ds:datastoreItem xmlns:ds="http://schemas.openxmlformats.org/officeDocument/2006/customXml" ds:itemID="{04098515-0C12-46CF-BC7C-69B4A13CD5FA}">
   <ds:schemaRefs>
     <ds:schemaRef ds:uri="http://schemas.microsoft.com/office/infopath/2007/PartnerControls"/>
@@ -7133,4 +7303,12 @@
     <ds:schemaRef ds:uri="http://www.w3.org/XML/1998/namespace"/>
   </ds:schemaRefs>
 </ds:datastoreItem>
+</file>
+
+<file path=customXml/itemProps3.xml><?xml version="1.0" encoding="utf-8"?>
+<ds:datastoreItem xmlns:ds="http://schemas.openxmlformats.org/officeDocument/2006/customXml" ds:itemID="{746CFF6F-D9AA-4BC0-911A-0A1356771912}">
+  <ds:schemaRefs>
+    <ds:schemaRef ds:uri="http://schemas.microsoft.com/sharepoint/v3/contenttype/forms"/>
+  </ds:schemaRefs>
+</ds:datastoreItem>
 </file>
</xml_diff>

<commit_message>
Updated PowerPoint Added GitKraken Branching
</commit_message>
<xml_diff>
--- a/GIT HUB Branching & Merging.pptx
+++ b/GIT HUB Branching & Merging.pptx
@@ -5,10 +5,10 @@
     <p:sldMasterId id="2147483648" r:id="rId4"/>
   </p:sldMasterIdLst>
   <p:notesMasterIdLst>
-    <p:notesMasterId r:id="rId11"/>
+    <p:notesMasterId r:id="rId12"/>
   </p:notesMasterIdLst>
   <p:handoutMasterIdLst>
-    <p:handoutMasterId r:id="rId12"/>
+    <p:handoutMasterId r:id="rId13"/>
   </p:handoutMasterIdLst>
   <p:sldIdLst>
     <p:sldId id="256" r:id="rId5"/>
@@ -17,6 +17,7 @@
     <p:sldId id="261" r:id="rId8"/>
     <p:sldId id="258" r:id="rId9"/>
     <p:sldId id="264" r:id="rId10"/>
+    <p:sldId id="265" r:id="rId11"/>
   </p:sldIdLst>
   <p:sldSz cx="12192000" cy="6858000"/>
   <p:notesSz cx="6858000" cy="9144000"/>
@@ -3775,13 +3776,13 @@
   <p:clrMapOvr>
     <a:masterClrMapping/>
   </p:clrMapOvr>
-  <mc:AlternateContent xmlns:mc="http://schemas.openxmlformats.org/markup-compatibility/2006">
-    <mc:Choice xmlns:p14="http://schemas.microsoft.com/office/powerpoint/2010/main" Requires="p14">
+  <mc:AlternateContent xmlns:mc="http://schemas.openxmlformats.org/markup-compatibility/2006" xmlns:p14="http://schemas.microsoft.com/office/powerpoint/2010/main">
+    <mc:Choice Requires="p14">
       <p:transition spd="slow" p14:dur="1200">
         <p:dissolve/>
       </p:transition>
     </mc:Choice>
-    <mc:Fallback>
+    <mc:Fallback xmlns="">
       <p:transition spd="slow">
         <p:dissolve/>
       </p:transition>
@@ -4089,13 +4090,13 @@
   <p:clrMapOvr>
     <a:masterClrMapping/>
   </p:clrMapOvr>
-  <mc:AlternateContent xmlns:mc="http://schemas.openxmlformats.org/markup-compatibility/2006">
-    <mc:Choice xmlns:p14="http://schemas.microsoft.com/office/powerpoint/2010/main" Requires="p14">
+  <mc:AlternateContent xmlns:mc="http://schemas.openxmlformats.org/markup-compatibility/2006" xmlns:p14="http://schemas.microsoft.com/office/powerpoint/2010/main">
+    <mc:Choice Requires="p14">
       <p:transition spd="slow" p14:dur="1200">
         <p:dissolve/>
       </p:transition>
     </mc:Choice>
-    <mc:Fallback>
+    <mc:Fallback xmlns="">
       <p:transition spd="slow">
         <p:dissolve/>
       </p:transition>
@@ -4229,13 +4230,13 @@
   <p:clrMapOvr>
     <a:masterClrMapping/>
   </p:clrMapOvr>
-  <mc:AlternateContent xmlns:mc="http://schemas.openxmlformats.org/markup-compatibility/2006">
-    <mc:Choice xmlns:p14="http://schemas.microsoft.com/office/powerpoint/2010/main" Requires="p14">
+  <mc:AlternateContent xmlns:mc="http://schemas.openxmlformats.org/markup-compatibility/2006" xmlns:p14="http://schemas.microsoft.com/office/powerpoint/2010/main">
+    <mc:Choice Requires="p14">
       <p:transition spd="slow" p14:dur="1200">
         <p:dissolve/>
       </p:transition>
     </mc:Choice>
-    <mc:Fallback>
+    <mc:Fallback xmlns="">
       <p:transition spd="slow">
         <p:dissolve/>
       </p:transition>
@@ -4447,13 +4448,13 @@
   <p:clrMapOvr>
     <a:masterClrMapping/>
   </p:clrMapOvr>
-  <mc:AlternateContent xmlns:mc="http://schemas.openxmlformats.org/markup-compatibility/2006">
-    <mc:Choice xmlns:p14="http://schemas.microsoft.com/office/powerpoint/2010/main" Requires="p14">
+  <mc:AlternateContent xmlns:mc="http://schemas.openxmlformats.org/markup-compatibility/2006" xmlns:p14="http://schemas.microsoft.com/office/powerpoint/2010/main">
+    <mc:Choice Requires="p14">
       <p:transition spd="slow" p14:dur="1200">
         <p:dissolve/>
       </p:transition>
     </mc:Choice>
-    <mc:Fallback>
+    <mc:Fallback xmlns="">
       <p:transition spd="slow">
         <p:dissolve/>
       </p:transition>
@@ -4602,13 +4603,13 @@
   <p:clrMapOvr>
     <a:masterClrMapping/>
   </p:clrMapOvr>
-  <mc:AlternateContent xmlns:mc="http://schemas.openxmlformats.org/markup-compatibility/2006">
-    <mc:Choice xmlns:p14="http://schemas.microsoft.com/office/powerpoint/2010/main" Requires="p14">
+  <mc:AlternateContent xmlns:mc="http://schemas.openxmlformats.org/markup-compatibility/2006" xmlns:p14="http://schemas.microsoft.com/office/powerpoint/2010/main">
+    <mc:Choice Requires="p14">
       <p:transition spd="slow" p14:dur="1200">
         <p:dissolve/>
       </p:transition>
     </mc:Choice>
-    <mc:Fallback>
+    <mc:Fallback xmlns="">
       <p:transition spd="slow">
         <p:dissolve/>
       </p:transition>
@@ -4817,18 +4818,175 @@
   <p:clrMapOvr>
     <a:masterClrMapping/>
   </p:clrMapOvr>
-  <mc:AlternateContent xmlns:mc="http://schemas.openxmlformats.org/markup-compatibility/2006">
-    <mc:Choice xmlns:p14="http://schemas.microsoft.com/office/powerpoint/2010/main" Requires="p14">
+  <mc:AlternateContent xmlns:mc="http://schemas.openxmlformats.org/markup-compatibility/2006" xmlns:p14="http://schemas.microsoft.com/office/powerpoint/2010/main">
+    <mc:Choice Requires="p14">
       <p:transition spd="slow" p14:dur="1200">
         <p:dissolve/>
       </p:transition>
     </mc:Choice>
-    <mc:Fallback>
+    <mc:Fallback xmlns="">
       <p:transition spd="slow">
         <p:dissolve/>
       </p:transition>
     </mc:Fallback>
   </mc:AlternateContent>
+</p:sld>
+</file>
+
+<file path=ppt/slides/slide7.xml><?xml version="1.0" encoding="utf-8"?>
+<p:sld xmlns:a="http://schemas.openxmlformats.org/drawingml/2006/main" xmlns:r="http://schemas.openxmlformats.org/officeDocument/2006/relationships" xmlns:p="http://schemas.openxmlformats.org/presentationml/2006/main">
+  <p:cSld>
+    <p:spTree>
+      <p:nvGrpSpPr>
+        <p:cNvPr id="1" name=""/>
+        <p:cNvGrpSpPr/>
+        <p:nvPr/>
+      </p:nvGrpSpPr>
+      <p:grpSpPr>
+        <a:xfrm>
+          <a:off x="0" y="0"/>
+          <a:ext cx="0" cy="0"/>
+          <a:chOff x="0" y="0"/>
+          <a:chExt cx="0" cy="0"/>
+        </a:xfrm>
+      </p:grpSpPr>
+      <p:sp>
+        <p:nvSpPr>
+          <p:cNvPr id="2" name="Title 1">
+            <a:extLst>
+              <a:ext uri="{FF2B5EF4-FFF2-40B4-BE49-F238E27FC236}">
+                <a16:creationId xmlns:a16="http://schemas.microsoft.com/office/drawing/2014/main" id="{D6B89BEA-673C-4237-A362-AB3450DDA8C9}"/>
+              </a:ext>
+            </a:extLst>
+          </p:cNvPr>
+          <p:cNvSpPr>
+            <a:spLocks noGrp="1"/>
+          </p:cNvSpPr>
+          <p:nvPr>
+            <p:ph type="title"/>
+          </p:nvPr>
+        </p:nvSpPr>
+        <p:spPr/>
+        <p:txBody>
+          <a:bodyPr/>
+          <a:lstStyle/>
+          <a:p>
+            <a:pPr algn="ctr"/>
+            <a:r>
+              <a:rPr lang="en-US" dirty="0"/>
+              <a:t>Branching with </a:t>
+            </a:r>
+            <a:r>
+              <a:rPr lang="en-US" dirty="0" err="1"/>
+              <a:t>GitKraken</a:t>
+            </a:r>
+            <a:endParaRPr lang="en-US" dirty="0"/>
+          </a:p>
+        </p:txBody>
+      </p:sp>
+      <p:sp>
+        <p:nvSpPr>
+          <p:cNvPr id="3" name="Content Placeholder 2">
+            <a:extLst>
+              <a:ext uri="{FF2B5EF4-FFF2-40B4-BE49-F238E27FC236}">
+                <a16:creationId xmlns:a16="http://schemas.microsoft.com/office/drawing/2014/main" id="{9CF2DC6F-E2AE-46EE-BEC4-CF2F6CB9D20A}"/>
+              </a:ext>
+            </a:extLst>
+          </p:cNvPr>
+          <p:cNvSpPr>
+            <a:spLocks noGrp="1"/>
+          </p:cNvSpPr>
+          <p:nvPr>
+            <p:ph sz="half" idx="1"/>
+          </p:nvPr>
+        </p:nvSpPr>
+        <p:spPr>
+          <a:xfrm>
+            <a:off x="457200" y="1825625"/>
+            <a:ext cx="5410200" cy="4270375"/>
+          </a:xfrm>
+        </p:spPr>
+        <p:txBody>
+          <a:bodyPr/>
+          <a:lstStyle/>
+          <a:p>
+            <a:r>
+              <a:rPr lang="en-US" dirty="0"/>
+              <a:t>Simply right click on your local </a:t>
+            </a:r>
+            <a:r>
+              <a:rPr lang="en-US" i="1" dirty="0"/>
+              <a:t>master</a:t>
+            </a:r>
+            <a:r>
+              <a:rPr lang="en-US" dirty="0"/>
+              <a:t> branch and select  ‘</a:t>
+            </a:r>
+            <a:r>
+              <a:rPr lang="en-US" i="1" dirty="0"/>
+              <a:t>Create branch here</a:t>
+            </a:r>
+            <a:r>
+              <a:rPr lang="en-US" dirty="0"/>
+              <a:t>‘.</a:t>
+            </a:r>
+          </a:p>
+          <a:p>
+            <a:r>
+              <a:rPr lang="en-US"/>
+              <a:t>Type the name of your new branch when prompted to do so.</a:t>
+            </a:r>
+          </a:p>
+          <a:p>
+            <a:endParaRPr lang="en-US" dirty="0"/>
+          </a:p>
+        </p:txBody>
+      </p:sp>
+      <p:pic>
+        <p:nvPicPr>
+          <p:cNvPr id="6" name="Content Placeholder 5">
+            <a:extLst>
+              <a:ext uri="{FF2B5EF4-FFF2-40B4-BE49-F238E27FC236}">
+                <a16:creationId xmlns:a16="http://schemas.microsoft.com/office/drawing/2014/main" id="{966D58C5-771D-4327-8AD7-4FFD159DC567}"/>
+              </a:ext>
+            </a:extLst>
+          </p:cNvPr>
+          <p:cNvPicPr>
+            <a:picLocks noGrp="1" noChangeAspect="1"/>
+          </p:cNvPicPr>
+          <p:nvPr>
+            <p:ph sz="half" idx="2"/>
+          </p:nvPr>
+        </p:nvPicPr>
+        <p:blipFill>
+          <a:blip r:embed="rId2">
+            <a:extLst>
+              <a:ext uri="{28A0092B-C50C-407E-A947-70E740481C1C}">
+                <a14:useLocalDpi xmlns:a14="http://schemas.microsoft.com/office/drawing/2010/main" val="0"/>
+              </a:ext>
+            </a:extLst>
+          </a:blip>
+          <a:stretch>
+            <a:fillRect/>
+          </a:stretch>
+        </p:blipFill>
+        <p:spPr>
+          <a:xfrm>
+            <a:off x="6589882" y="1825625"/>
+            <a:ext cx="5144917" cy="4270375"/>
+          </a:xfrm>
+        </p:spPr>
+      </p:pic>
+    </p:spTree>
+    <p:extLst>
+      <p:ext uri="{BB962C8B-B14F-4D97-AF65-F5344CB8AC3E}">
+        <p14:creationId xmlns:p14="http://schemas.microsoft.com/office/powerpoint/2010/main" val="426922392"/>
+      </p:ext>
+    </p:extLst>
+  </p:cSld>
+  <p:clrMapOvr>
+    <a:masterClrMapping/>
+  </p:clrMapOvr>
 </p:sld>
 </file>
 
@@ -5616,6 +5774,141 @@
 </file>
 
 <file path=customXml/item1.xml><?xml version="1.0" encoding="utf-8"?>
+<?mso-contentType ?>
+<FormTemplates xmlns="http://schemas.microsoft.com/sharepoint/v3/contenttype/forms">
+  <Display>DocumentLibraryForm</Display>
+  <Edit>AssetEditForm</Edit>
+  <New>DocumentLibraryForm</New>
+</FormTemplates>
+</file>
+
+<file path=customXml/item2.xml><?xml version="1.0" encoding="utf-8"?>
+<p:properties xmlns:p="http://schemas.microsoft.com/office/2006/metadata/properties" xmlns:xsi="http://www.w3.org/2001/XMLSchema-instance" xmlns:pc="http://schemas.microsoft.com/office/infopath/2007/PartnerControls">
+  <documentManagement>
+    <DirectSourceMarket xmlns="4873beb7-5857-4685-be1f-d57550cc96cc" xsi:nil="true"/>
+    <ApprovalStatus xmlns="4873beb7-5857-4685-be1f-d57550cc96cc">InProgress</ApprovalStatus>
+    <MarketSpecific xmlns="4873beb7-5857-4685-be1f-d57550cc96cc">false</MarketSpecific>
+    <LocComments xmlns="4873beb7-5857-4685-be1f-d57550cc96cc" xsi:nil="true"/>
+    <ThumbnailAssetId xmlns="4873beb7-5857-4685-be1f-d57550cc96cc" xsi:nil="true"/>
+    <PrimaryImageGen xmlns="4873beb7-5857-4685-be1f-d57550cc96cc">true</PrimaryImageGen>
+    <LegacyData xmlns="4873beb7-5857-4685-be1f-d57550cc96cc" xsi:nil="true"/>
+    <LocRecommendedHandoff xmlns="4873beb7-5857-4685-be1f-d57550cc96cc" xsi:nil="true"/>
+    <BusinessGroup xmlns="4873beb7-5857-4685-be1f-d57550cc96cc" xsi:nil="true"/>
+    <BlockPublish xmlns="4873beb7-5857-4685-be1f-d57550cc96cc">false</BlockPublish>
+    <TPFriendlyName xmlns="4873beb7-5857-4685-be1f-d57550cc96cc" xsi:nil="true"/>
+    <NumericId xmlns="4873beb7-5857-4685-be1f-d57550cc96cc" xsi:nil="true"/>
+    <APEditor xmlns="4873beb7-5857-4685-be1f-d57550cc96cc">
+      <UserInfo>
+        <DisplayName/>
+        <AccountId xsi:nil="true"/>
+        <AccountType/>
+      </UserInfo>
+    </APEditor>
+    <SourceTitle xmlns="4873beb7-5857-4685-be1f-d57550cc96cc" xsi:nil="true"/>
+    <OpenTemplate xmlns="4873beb7-5857-4685-be1f-d57550cc96cc">true</OpenTemplate>
+    <UALocComments xmlns="4873beb7-5857-4685-be1f-d57550cc96cc" xsi:nil="true"/>
+    <ParentAssetId xmlns="4873beb7-5857-4685-be1f-d57550cc96cc" xsi:nil="true"/>
+    <IntlLangReviewDate xmlns="4873beb7-5857-4685-be1f-d57550cc96cc" xsi:nil="true"/>
+    <FeatureTagsTaxHTField0 xmlns="4873beb7-5857-4685-be1f-d57550cc96cc">
+      <Terms xmlns="http://schemas.microsoft.com/office/infopath/2007/PartnerControls"/>
+    </FeatureTagsTaxHTField0>
+    <PublishStatusLookup xmlns="4873beb7-5857-4685-be1f-d57550cc96cc">
+      <Value>1566889</Value>
+    </PublishStatusLookup>
+    <Providers xmlns="4873beb7-5857-4685-be1f-d57550cc96cc" xsi:nil="true"/>
+    <MachineTranslated xmlns="4873beb7-5857-4685-be1f-d57550cc96cc">false</MachineTranslated>
+    <OriginalSourceMarket xmlns="4873beb7-5857-4685-be1f-d57550cc96cc" xsi:nil="true"/>
+    <APDescription xmlns="4873beb7-5857-4685-be1f-d57550cc96cc" xsi:nil="true"/>
+    <ClipArtFilename xmlns="4873beb7-5857-4685-be1f-d57550cc96cc" xsi:nil="true"/>
+    <ContentItem xmlns="4873beb7-5857-4685-be1f-d57550cc96cc" xsi:nil="true"/>
+    <TPInstallLocation xmlns="4873beb7-5857-4685-be1f-d57550cc96cc" xsi:nil="true"/>
+    <PublishTargets xmlns="4873beb7-5857-4685-be1f-d57550cc96cc">OfficeOnlineVNext</PublishTargets>
+    <TimesCloned xmlns="4873beb7-5857-4685-be1f-d57550cc96cc" xsi:nil="true"/>
+    <AssetStart xmlns="4873beb7-5857-4685-be1f-d57550cc96cc">2012-05-23T08:44:00+00:00</AssetStart>
+    <Provider xmlns="4873beb7-5857-4685-be1f-d57550cc96cc" xsi:nil="true"/>
+    <AcquiredFrom xmlns="4873beb7-5857-4685-be1f-d57550cc96cc">Internal MS</AcquiredFrom>
+    <FriendlyTitle xmlns="4873beb7-5857-4685-be1f-d57550cc96cc" xsi:nil="true"/>
+    <LastHandOff xmlns="4873beb7-5857-4685-be1f-d57550cc96cc" xsi:nil="true"/>
+    <TPClientViewer xmlns="4873beb7-5857-4685-be1f-d57550cc96cc" xsi:nil="true"/>
+    <UACurrentWords xmlns="4873beb7-5857-4685-be1f-d57550cc96cc" xsi:nil="true"/>
+    <ArtSampleDocs xmlns="4873beb7-5857-4685-be1f-d57550cc96cc" xsi:nil="true"/>
+    <UALocRecommendation xmlns="4873beb7-5857-4685-be1f-d57550cc96cc">Localize</UALocRecommendation>
+    <Manager xmlns="4873beb7-5857-4685-be1f-d57550cc96cc" xsi:nil="true"/>
+    <ShowIn xmlns="4873beb7-5857-4685-be1f-d57550cc96cc">Show everywhere</ShowIn>
+    <UANotes xmlns="4873beb7-5857-4685-be1f-d57550cc96cc" xsi:nil="true"/>
+    <TemplateStatus xmlns="4873beb7-5857-4685-be1f-d57550cc96cc">Complete</TemplateStatus>
+    <InternalTagsTaxHTField0 xmlns="4873beb7-5857-4685-be1f-d57550cc96cc">
+      <Terms xmlns="http://schemas.microsoft.com/office/infopath/2007/PartnerControls"/>
+    </InternalTagsTaxHTField0>
+    <CSXHash xmlns="4873beb7-5857-4685-be1f-d57550cc96cc" xsi:nil="true"/>
+    <Downloads xmlns="4873beb7-5857-4685-be1f-d57550cc96cc">0</Downloads>
+    <VoteCount xmlns="4873beb7-5857-4685-be1f-d57550cc96cc" xsi:nil="true"/>
+    <OOCacheId xmlns="4873beb7-5857-4685-be1f-d57550cc96cc" xsi:nil="true"/>
+    <IsDeleted xmlns="4873beb7-5857-4685-be1f-d57550cc96cc">false</IsDeleted>
+    <AssetExpire xmlns="4873beb7-5857-4685-be1f-d57550cc96cc">2029-01-01T08:00:00+00:00</AssetExpire>
+    <DSATActionTaken xmlns="4873beb7-5857-4685-be1f-d57550cc96cc" xsi:nil="true"/>
+    <CSXSubmissionMarket xmlns="4873beb7-5857-4685-be1f-d57550cc96cc" xsi:nil="true"/>
+    <TPExecutable xmlns="4873beb7-5857-4685-be1f-d57550cc96cc" xsi:nil="true"/>
+    <SubmitterId xmlns="4873beb7-5857-4685-be1f-d57550cc96cc" xsi:nil="true"/>
+    <EditorialTags xmlns="4873beb7-5857-4685-be1f-d57550cc96cc" xsi:nil="true"/>
+    <ApprovalLog xmlns="4873beb7-5857-4685-be1f-d57550cc96cc" xsi:nil="true"/>
+    <AssetType xmlns="4873beb7-5857-4685-be1f-d57550cc96cc">TP</AssetType>
+    <BugNumber xmlns="4873beb7-5857-4685-be1f-d57550cc96cc" xsi:nil="true"/>
+    <CSXSubmissionDate xmlns="4873beb7-5857-4685-be1f-d57550cc96cc" xsi:nil="true"/>
+    <CSXUpdate xmlns="4873beb7-5857-4685-be1f-d57550cc96cc">false</CSXUpdate>
+    <Milestone xmlns="4873beb7-5857-4685-be1f-d57550cc96cc" xsi:nil="true"/>
+    <RecommendationsModifier xmlns="4873beb7-5857-4685-be1f-d57550cc96cc" xsi:nil="true"/>
+    <OriginAsset xmlns="4873beb7-5857-4685-be1f-d57550cc96cc" xsi:nil="true"/>
+    <TPComponent xmlns="4873beb7-5857-4685-be1f-d57550cc96cc" xsi:nil="true"/>
+    <AssetId xmlns="4873beb7-5857-4685-be1f-d57550cc96cc">TP102901017</AssetId>
+    <IntlLocPriority xmlns="4873beb7-5857-4685-be1f-d57550cc96cc" xsi:nil="true"/>
+    <PolicheckWords xmlns="4873beb7-5857-4685-be1f-d57550cc96cc" xsi:nil="true"/>
+    <TPLaunchHelpLink xmlns="4873beb7-5857-4685-be1f-d57550cc96cc" xsi:nil="true"/>
+    <TPApplication xmlns="4873beb7-5857-4685-be1f-d57550cc96cc" xsi:nil="true"/>
+    <CrawlForDependencies xmlns="4873beb7-5857-4685-be1f-d57550cc96cc">false</CrawlForDependencies>
+    <HandoffToMSDN xmlns="4873beb7-5857-4685-be1f-d57550cc96cc" xsi:nil="true"/>
+    <PlannedPubDate xmlns="4873beb7-5857-4685-be1f-d57550cc96cc" xsi:nil="true"/>
+    <IntlLangReviewer xmlns="4873beb7-5857-4685-be1f-d57550cc96cc" xsi:nil="true"/>
+    <TrustLevel xmlns="4873beb7-5857-4685-be1f-d57550cc96cc">1 Microsoft Managed Content</TrustLevel>
+    <LocLastLocAttemptVersionLookup xmlns="4873beb7-5857-4685-be1f-d57550cc96cc">836753</LocLastLocAttemptVersionLookup>
+    <IsSearchable xmlns="4873beb7-5857-4685-be1f-d57550cc96cc">true</IsSearchable>
+    <TemplateTemplateType xmlns="4873beb7-5857-4685-be1f-d57550cc96cc">PowerPoint Design Template</TemplateTemplateType>
+    <CampaignTagsTaxHTField0 xmlns="4873beb7-5857-4685-be1f-d57550cc96cc">
+      <Terms xmlns="http://schemas.microsoft.com/office/infopath/2007/PartnerControls"/>
+    </CampaignTagsTaxHTField0>
+    <TPNamespace xmlns="4873beb7-5857-4685-be1f-d57550cc96cc" xsi:nil="true"/>
+    <TaxCatchAll xmlns="4873beb7-5857-4685-be1f-d57550cc96cc"/>
+    <Markets xmlns="4873beb7-5857-4685-be1f-d57550cc96cc"/>
+    <UAProjectedTotalWords xmlns="4873beb7-5857-4685-be1f-d57550cc96cc" xsi:nil="true"/>
+    <IntlLangReview xmlns="4873beb7-5857-4685-be1f-d57550cc96cc">false</IntlLangReview>
+    <OutputCachingOn xmlns="4873beb7-5857-4685-be1f-d57550cc96cc">false</OutputCachingOn>
+    <AverageRating xmlns="4873beb7-5857-4685-be1f-d57550cc96cc" xsi:nil="true"/>
+    <APAuthor xmlns="4873beb7-5857-4685-be1f-d57550cc96cc">
+      <UserInfo>
+        <DisplayName>REDMOND\v-anij</DisplayName>
+        <AccountId>2469</AccountId>
+        <AccountType/>
+      </UserInfo>
+    </APAuthor>
+    <LocManualTestRequired xmlns="4873beb7-5857-4685-be1f-d57550cc96cc">false</LocManualTestRequired>
+    <TPCommandLine xmlns="4873beb7-5857-4685-be1f-d57550cc96cc" xsi:nil="true"/>
+    <TPAppVersion xmlns="4873beb7-5857-4685-be1f-d57550cc96cc" xsi:nil="true"/>
+    <EditorialStatus xmlns="4873beb7-5857-4685-be1f-d57550cc96cc">Complete</EditorialStatus>
+    <LastModifiedDateTime xmlns="4873beb7-5857-4685-be1f-d57550cc96cc" xsi:nil="true"/>
+    <ScenarioTagsTaxHTField0 xmlns="4873beb7-5857-4685-be1f-d57550cc96cc">
+      <Terms xmlns="http://schemas.microsoft.com/office/infopath/2007/PartnerControls"/>
+    </ScenarioTagsTaxHTField0>
+    <OriginalRelease xmlns="4873beb7-5857-4685-be1f-d57550cc96cc">15</OriginalRelease>
+    <TPLaunchHelpLinkType xmlns="4873beb7-5857-4685-be1f-d57550cc96cc">Template</TPLaunchHelpLinkType>
+    <LocalizationTagsTaxHTField0 xmlns="4873beb7-5857-4685-be1f-d57550cc96cc">
+      <Terms xmlns="http://schemas.microsoft.com/office/infopath/2007/PartnerControls"/>
+    </LocalizationTagsTaxHTField0>
+    <LocMarketGroupTiers2 xmlns="4873beb7-5857-4685-be1f-d57550cc96cc" xsi:nil="true"/>
+  </documentManagement>
+</p:properties>
+</file>
+
+<file path=customXml/item3.xml><?xml version="1.0" encoding="utf-8"?>
 <ct:contentTypeSchema xmlns:ct="http://schemas.microsoft.com/office/2006/metadata/contentType" xmlns:ma="http://schemas.microsoft.com/office/2006/metadata/properties/metaAttributes" ct:_="" ma:_="" ma:contentTypeName="TemplateFile" ma:contentTypeID="0x0101006EDDDB5EE6D98C44930B742096920B300400F5B6D36B3EF94B4E9A635CDF2A18F5B8" ma:contentTypeVersion="72" ma:contentTypeDescription="Create a new document." ma:contentTypeScope="" ma:versionID="a23e56308344d904b51738559c3d67c9">
   <xsd:schema xmlns:xsd="http://www.w3.org/2001/XMLSchema" xmlns:xs="http://www.w3.org/2001/XMLSchema" xmlns:p="http://schemas.microsoft.com/office/2006/metadata/properties" xmlns:ns2="4873beb7-5857-4685-be1f-d57550cc96cc" targetNamespace="http://schemas.microsoft.com/office/2006/metadata/properties" ma:root="true" ma:fieldsID="cd0908cc4600e77bf5da051303e00c8d" ns2:_="">
     <xsd:import namespace="4873beb7-5857-4685-be1f-d57550cc96cc"/>
@@ -6655,155 +6948,10 @@
 </ct:contentTypeSchema>
 </file>
 
-<file path=customXml/item2.xml><?xml version="1.0" encoding="utf-8"?>
-<p:properties xmlns:p="http://schemas.microsoft.com/office/2006/metadata/properties" xmlns:xsi="http://www.w3.org/2001/XMLSchema-instance" xmlns:pc="http://schemas.microsoft.com/office/infopath/2007/PartnerControls">
-  <documentManagement>
-    <DirectSourceMarket xmlns="4873beb7-5857-4685-be1f-d57550cc96cc" xsi:nil="true"/>
-    <ApprovalStatus xmlns="4873beb7-5857-4685-be1f-d57550cc96cc">InProgress</ApprovalStatus>
-    <MarketSpecific xmlns="4873beb7-5857-4685-be1f-d57550cc96cc">false</MarketSpecific>
-    <LocComments xmlns="4873beb7-5857-4685-be1f-d57550cc96cc" xsi:nil="true"/>
-    <ThumbnailAssetId xmlns="4873beb7-5857-4685-be1f-d57550cc96cc" xsi:nil="true"/>
-    <PrimaryImageGen xmlns="4873beb7-5857-4685-be1f-d57550cc96cc">true</PrimaryImageGen>
-    <LegacyData xmlns="4873beb7-5857-4685-be1f-d57550cc96cc" xsi:nil="true"/>
-    <LocRecommendedHandoff xmlns="4873beb7-5857-4685-be1f-d57550cc96cc" xsi:nil="true"/>
-    <BusinessGroup xmlns="4873beb7-5857-4685-be1f-d57550cc96cc" xsi:nil="true"/>
-    <BlockPublish xmlns="4873beb7-5857-4685-be1f-d57550cc96cc">false</BlockPublish>
-    <TPFriendlyName xmlns="4873beb7-5857-4685-be1f-d57550cc96cc" xsi:nil="true"/>
-    <NumericId xmlns="4873beb7-5857-4685-be1f-d57550cc96cc" xsi:nil="true"/>
-    <APEditor xmlns="4873beb7-5857-4685-be1f-d57550cc96cc">
-      <UserInfo>
-        <DisplayName/>
-        <AccountId xsi:nil="true"/>
-        <AccountType/>
-      </UserInfo>
-    </APEditor>
-    <SourceTitle xmlns="4873beb7-5857-4685-be1f-d57550cc96cc" xsi:nil="true"/>
-    <OpenTemplate xmlns="4873beb7-5857-4685-be1f-d57550cc96cc">true</OpenTemplate>
-    <UALocComments xmlns="4873beb7-5857-4685-be1f-d57550cc96cc" xsi:nil="true"/>
-    <ParentAssetId xmlns="4873beb7-5857-4685-be1f-d57550cc96cc" xsi:nil="true"/>
-    <IntlLangReviewDate xmlns="4873beb7-5857-4685-be1f-d57550cc96cc" xsi:nil="true"/>
-    <FeatureTagsTaxHTField0 xmlns="4873beb7-5857-4685-be1f-d57550cc96cc">
-      <Terms xmlns="http://schemas.microsoft.com/office/infopath/2007/PartnerControls"/>
-    </FeatureTagsTaxHTField0>
-    <PublishStatusLookup xmlns="4873beb7-5857-4685-be1f-d57550cc96cc">
-      <Value>1566889</Value>
-    </PublishStatusLookup>
-    <Providers xmlns="4873beb7-5857-4685-be1f-d57550cc96cc" xsi:nil="true"/>
-    <MachineTranslated xmlns="4873beb7-5857-4685-be1f-d57550cc96cc">false</MachineTranslated>
-    <OriginalSourceMarket xmlns="4873beb7-5857-4685-be1f-d57550cc96cc" xsi:nil="true"/>
-    <APDescription xmlns="4873beb7-5857-4685-be1f-d57550cc96cc" xsi:nil="true"/>
-    <ClipArtFilename xmlns="4873beb7-5857-4685-be1f-d57550cc96cc" xsi:nil="true"/>
-    <ContentItem xmlns="4873beb7-5857-4685-be1f-d57550cc96cc" xsi:nil="true"/>
-    <TPInstallLocation xmlns="4873beb7-5857-4685-be1f-d57550cc96cc" xsi:nil="true"/>
-    <PublishTargets xmlns="4873beb7-5857-4685-be1f-d57550cc96cc">OfficeOnlineVNext</PublishTargets>
-    <TimesCloned xmlns="4873beb7-5857-4685-be1f-d57550cc96cc" xsi:nil="true"/>
-    <AssetStart xmlns="4873beb7-5857-4685-be1f-d57550cc96cc">2012-05-23T08:44:00+00:00</AssetStart>
-    <Provider xmlns="4873beb7-5857-4685-be1f-d57550cc96cc" xsi:nil="true"/>
-    <AcquiredFrom xmlns="4873beb7-5857-4685-be1f-d57550cc96cc">Internal MS</AcquiredFrom>
-    <FriendlyTitle xmlns="4873beb7-5857-4685-be1f-d57550cc96cc" xsi:nil="true"/>
-    <LastHandOff xmlns="4873beb7-5857-4685-be1f-d57550cc96cc" xsi:nil="true"/>
-    <TPClientViewer xmlns="4873beb7-5857-4685-be1f-d57550cc96cc" xsi:nil="true"/>
-    <UACurrentWords xmlns="4873beb7-5857-4685-be1f-d57550cc96cc" xsi:nil="true"/>
-    <ArtSampleDocs xmlns="4873beb7-5857-4685-be1f-d57550cc96cc" xsi:nil="true"/>
-    <UALocRecommendation xmlns="4873beb7-5857-4685-be1f-d57550cc96cc">Localize</UALocRecommendation>
-    <Manager xmlns="4873beb7-5857-4685-be1f-d57550cc96cc" xsi:nil="true"/>
-    <ShowIn xmlns="4873beb7-5857-4685-be1f-d57550cc96cc">Show everywhere</ShowIn>
-    <UANotes xmlns="4873beb7-5857-4685-be1f-d57550cc96cc" xsi:nil="true"/>
-    <TemplateStatus xmlns="4873beb7-5857-4685-be1f-d57550cc96cc">Complete</TemplateStatus>
-    <InternalTagsTaxHTField0 xmlns="4873beb7-5857-4685-be1f-d57550cc96cc">
-      <Terms xmlns="http://schemas.microsoft.com/office/infopath/2007/PartnerControls"/>
-    </InternalTagsTaxHTField0>
-    <CSXHash xmlns="4873beb7-5857-4685-be1f-d57550cc96cc" xsi:nil="true"/>
-    <Downloads xmlns="4873beb7-5857-4685-be1f-d57550cc96cc">0</Downloads>
-    <VoteCount xmlns="4873beb7-5857-4685-be1f-d57550cc96cc" xsi:nil="true"/>
-    <OOCacheId xmlns="4873beb7-5857-4685-be1f-d57550cc96cc" xsi:nil="true"/>
-    <IsDeleted xmlns="4873beb7-5857-4685-be1f-d57550cc96cc">false</IsDeleted>
-    <AssetExpire xmlns="4873beb7-5857-4685-be1f-d57550cc96cc">2029-01-01T08:00:00+00:00</AssetExpire>
-    <DSATActionTaken xmlns="4873beb7-5857-4685-be1f-d57550cc96cc" xsi:nil="true"/>
-    <CSXSubmissionMarket xmlns="4873beb7-5857-4685-be1f-d57550cc96cc" xsi:nil="true"/>
-    <TPExecutable xmlns="4873beb7-5857-4685-be1f-d57550cc96cc" xsi:nil="true"/>
-    <SubmitterId xmlns="4873beb7-5857-4685-be1f-d57550cc96cc" xsi:nil="true"/>
-    <EditorialTags xmlns="4873beb7-5857-4685-be1f-d57550cc96cc" xsi:nil="true"/>
-    <ApprovalLog xmlns="4873beb7-5857-4685-be1f-d57550cc96cc" xsi:nil="true"/>
-    <AssetType xmlns="4873beb7-5857-4685-be1f-d57550cc96cc">TP</AssetType>
-    <BugNumber xmlns="4873beb7-5857-4685-be1f-d57550cc96cc" xsi:nil="true"/>
-    <CSXSubmissionDate xmlns="4873beb7-5857-4685-be1f-d57550cc96cc" xsi:nil="true"/>
-    <CSXUpdate xmlns="4873beb7-5857-4685-be1f-d57550cc96cc">false</CSXUpdate>
-    <Milestone xmlns="4873beb7-5857-4685-be1f-d57550cc96cc" xsi:nil="true"/>
-    <RecommendationsModifier xmlns="4873beb7-5857-4685-be1f-d57550cc96cc" xsi:nil="true"/>
-    <OriginAsset xmlns="4873beb7-5857-4685-be1f-d57550cc96cc" xsi:nil="true"/>
-    <TPComponent xmlns="4873beb7-5857-4685-be1f-d57550cc96cc" xsi:nil="true"/>
-    <AssetId xmlns="4873beb7-5857-4685-be1f-d57550cc96cc">TP102901017</AssetId>
-    <IntlLocPriority xmlns="4873beb7-5857-4685-be1f-d57550cc96cc" xsi:nil="true"/>
-    <PolicheckWords xmlns="4873beb7-5857-4685-be1f-d57550cc96cc" xsi:nil="true"/>
-    <TPLaunchHelpLink xmlns="4873beb7-5857-4685-be1f-d57550cc96cc" xsi:nil="true"/>
-    <TPApplication xmlns="4873beb7-5857-4685-be1f-d57550cc96cc" xsi:nil="true"/>
-    <CrawlForDependencies xmlns="4873beb7-5857-4685-be1f-d57550cc96cc">false</CrawlForDependencies>
-    <HandoffToMSDN xmlns="4873beb7-5857-4685-be1f-d57550cc96cc" xsi:nil="true"/>
-    <PlannedPubDate xmlns="4873beb7-5857-4685-be1f-d57550cc96cc" xsi:nil="true"/>
-    <IntlLangReviewer xmlns="4873beb7-5857-4685-be1f-d57550cc96cc" xsi:nil="true"/>
-    <TrustLevel xmlns="4873beb7-5857-4685-be1f-d57550cc96cc">1 Microsoft Managed Content</TrustLevel>
-    <LocLastLocAttemptVersionLookup xmlns="4873beb7-5857-4685-be1f-d57550cc96cc">836753</LocLastLocAttemptVersionLookup>
-    <IsSearchable xmlns="4873beb7-5857-4685-be1f-d57550cc96cc">true</IsSearchable>
-    <TemplateTemplateType xmlns="4873beb7-5857-4685-be1f-d57550cc96cc">PowerPoint Design Template</TemplateTemplateType>
-    <CampaignTagsTaxHTField0 xmlns="4873beb7-5857-4685-be1f-d57550cc96cc">
-      <Terms xmlns="http://schemas.microsoft.com/office/infopath/2007/PartnerControls"/>
-    </CampaignTagsTaxHTField0>
-    <TPNamespace xmlns="4873beb7-5857-4685-be1f-d57550cc96cc" xsi:nil="true"/>
-    <TaxCatchAll xmlns="4873beb7-5857-4685-be1f-d57550cc96cc"/>
-    <Markets xmlns="4873beb7-5857-4685-be1f-d57550cc96cc"/>
-    <UAProjectedTotalWords xmlns="4873beb7-5857-4685-be1f-d57550cc96cc" xsi:nil="true"/>
-    <IntlLangReview xmlns="4873beb7-5857-4685-be1f-d57550cc96cc">false</IntlLangReview>
-    <OutputCachingOn xmlns="4873beb7-5857-4685-be1f-d57550cc96cc">false</OutputCachingOn>
-    <AverageRating xmlns="4873beb7-5857-4685-be1f-d57550cc96cc" xsi:nil="true"/>
-    <APAuthor xmlns="4873beb7-5857-4685-be1f-d57550cc96cc">
-      <UserInfo>
-        <DisplayName>REDMOND\v-anij</DisplayName>
-        <AccountId>2469</AccountId>
-        <AccountType/>
-      </UserInfo>
-    </APAuthor>
-    <LocManualTestRequired xmlns="4873beb7-5857-4685-be1f-d57550cc96cc">false</LocManualTestRequired>
-    <TPCommandLine xmlns="4873beb7-5857-4685-be1f-d57550cc96cc" xsi:nil="true"/>
-    <TPAppVersion xmlns="4873beb7-5857-4685-be1f-d57550cc96cc" xsi:nil="true"/>
-    <EditorialStatus xmlns="4873beb7-5857-4685-be1f-d57550cc96cc">Complete</EditorialStatus>
-    <LastModifiedDateTime xmlns="4873beb7-5857-4685-be1f-d57550cc96cc" xsi:nil="true"/>
-    <ScenarioTagsTaxHTField0 xmlns="4873beb7-5857-4685-be1f-d57550cc96cc">
-      <Terms xmlns="http://schemas.microsoft.com/office/infopath/2007/PartnerControls"/>
-    </ScenarioTagsTaxHTField0>
-    <OriginalRelease xmlns="4873beb7-5857-4685-be1f-d57550cc96cc">15</OriginalRelease>
-    <TPLaunchHelpLinkType xmlns="4873beb7-5857-4685-be1f-d57550cc96cc">Template</TPLaunchHelpLinkType>
-    <LocalizationTagsTaxHTField0 xmlns="4873beb7-5857-4685-be1f-d57550cc96cc">
-      <Terms xmlns="http://schemas.microsoft.com/office/infopath/2007/PartnerControls"/>
-    </LocalizationTagsTaxHTField0>
-    <LocMarketGroupTiers2 xmlns="4873beb7-5857-4685-be1f-d57550cc96cc" xsi:nil="true"/>
-  </documentManagement>
-</p:properties>
-</file>
-
-<file path=customXml/item3.xml><?xml version="1.0" encoding="utf-8"?>
-<?mso-contentType ?>
-<FormTemplates xmlns="http://schemas.microsoft.com/sharepoint/v3/contenttype/forms">
-  <Display>DocumentLibraryForm</Display>
-  <Edit>AssetEditForm</Edit>
-  <New>DocumentLibraryForm</New>
-</FormTemplates>
-</file>
-
 <file path=customXml/itemProps1.xml><?xml version="1.0" encoding="utf-8"?>
-<ds:datastoreItem xmlns:ds="http://schemas.openxmlformats.org/officeDocument/2006/customXml" ds:itemID="{0B5C6E15-39DC-470B-9445-F754B9458020}">
+<ds:datastoreItem xmlns:ds="http://schemas.openxmlformats.org/officeDocument/2006/customXml" ds:itemID="{746CFF6F-D9AA-4BC0-911A-0A1356771912}">
   <ds:schemaRefs>
-    <ds:schemaRef ds:uri="http://schemas.microsoft.com/office/2006/metadata/contentType"/>
-    <ds:schemaRef ds:uri="http://schemas.microsoft.com/office/2006/metadata/properties/metaAttributes"/>
-    <ds:schemaRef ds:uri="http://www.w3.org/2001/XMLSchema"/>
-    <ds:schemaRef ds:uri="http://schemas.microsoft.com/office/2006/metadata/properties"/>
-    <ds:schemaRef ds:uri="4873beb7-5857-4685-be1f-d57550cc96cc"/>
-    <ds:schemaRef ds:uri="http://schemas.microsoft.com/office/2006/documentManagement/types"/>
-    <ds:schemaRef ds:uri="http://schemas.microsoft.com/office/infopath/2007/PartnerControls"/>
-    <ds:schemaRef ds:uri="http://schemas.openxmlformats.org/package/2006/metadata/core-properties"/>
-    <ds:schemaRef ds:uri="http://purl.org/dc/elements/1.1/"/>
-    <ds:schemaRef ds:uri="http://purl.org/dc/terms/"/>
-    <ds:schemaRef ds:uri="http://schemas.microsoft.com/internal/obd"/>
+    <ds:schemaRef ds:uri="http://schemas.microsoft.com/sharepoint/v3/contenttype/forms"/>
   </ds:schemaRefs>
 </ds:datastoreItem>
 </file>
@@ -6825,9 +6973,19 @@
 </file>
 
 <file path=customXml/itemProps3.xml><?xml version="1.0" encoding="utf-8"?>
-<ds:datastoreItem xmlns:ds="http://schemas.openxmlformats.org/officeDocument/2006/customXml" ds:itemID="{746CFF6F-D9AA-4BC0-911A-0A1356771912}">
+<ds:datastoreItem xmlns:ds="http://schemas.openxmlformats.org/officeDocument/2006/customXml" ds:itemID="{0B5C6E15-39DC-470B-9445-F754B9458020}">
   <ds:schemaRefs>
-    <ds:schemaRef ds:uri="http://schemas.microsoft.com/sharepoint/v3/contenttype/forms"/>
+    <ds:schemaRef ds:uri="http://schemas.microsoft.com/office/2006/metadata/contentType"/>
+    <ds:schemaRef ds:uri="http://schemas.microsoft.com/office/2006/metadata/properties/metaAttributes"/>
+    <ds:schemaRef ds:uri="http://www.w3.org/2001/XMLSchema"/>
+    <ds:schemaRef ds:uri="http://schemas.microsoft.com/office/2006/metadata/properties"/>
+    <ds:schemaRef ds:uri="4873beb7-5857-4685-be1f-d57550cc96cc"/>
+    <ds:schemaRef ds:uri="http://schemas.microsoft.com/office/2006/documentManagement/types"/>
+    <ds:schemaRef ds:uri="http://schemas.microsoft.com/office/infopath/2007/PartnerControls"/>
+    <ds:schemaRef ds:uri="http://schemas.openxmlformats.org/package/2006/metadata/core-properties"/>
+    <ds:schemaRef ds:uri="http://purl.org/dc/elements/1.1/"/>
+    <ds:schemaRef ds:uri="http://purl.org/dc/terms/"/>
+    <ds:schemaRef ds:uri="http://schemas.microsoft.com/internal/obd"/>
   </ds:schemaRefs>
 </ds:datastoreItem>
 </file>
</xml_diff>

<commit_message>
Updated PP Added More GitKraken Content
</commit_message>
<xml_diff>
--- a/GIT HUB Branching & Merging.pptx
+++ b/GIT HUB Branching & Merging.pptx
@@ -4933,11 +4933,19 @@
           </a:p>
           <a:p>
             <a:r>
+              <a:rPr lang="en-US" dirty="0"/>
+              <a:t>Type the name of your new branch when prompted to do so.</a:t>
+            </a:r>
+          </a:p>
+          <a:p>
+            <a:r>
+              <a:rPr lang="en-US" dirty="0"/>
+              <a:t>You can now begin working on your branch files just as you would the master. As you add or change your files you can stage and commit your changes to </a:t>
+            </a:r>
+            <a:r>
               <a:rPr lang="en-US"/>
-              <a:t>Type the name of your new branch when prompted to do so.</a:t>
-            </a:r>
-          </a:p>
-          <a:p>
+              <a:t>your branch.</a:t>
+            </a:r>
             <a:endParaRPr lang="en-US" dirty="0"/>
           </a:p>
         </p:txBody>
@@ -5783,132 +5791,6 @@
 </file>
 
 <file path=customXml/item2.xml><?xml version="1.0" encoding="utf-8"?>
-<p:properties xmlns:p="http://schemas.microsoft.com/office/2006/metadata/properties" xmlns:xsi="http://www.w3.org/2001/XMLSchema-instance" xmlns:pc="http://schemas.microsoft.com/office/infopath/2007/PartnerControls">
-  <documentManagement>
-    <DirectSourceMarket xmlns="4873beb7-5857-4685-be1f-d57550cc96cc" xsi:nil="true"/>
-    <ApprovalStatus xmlns="4873beb7-5857-4685-be1f-d57550cc96cc">InProgress</ApprovalStatus>
-    <MarketSpecific xmlns="4873beb7-5857-4685-be1f-d57550cc96cc">false</MarketSpecific>
-    <LocComments xmlns="4873beb7-5857-4685-be1f-d57550cc96cc" xsi:nil="true"/>
-    <ThumbnailAssetId xmlns="4873beb7-5857-4685-be1f-d57550cc96cc" xsi:nil="true"/>
-    <PrimaryImageGen xmlns="4873beb7-5857-4685-be1f-d57550cc96cc">true</PrimaryImageGen>
-    <LegacyData xmlns="4873beb7-5857-4685-be1f-d57550cc96cc" xsi:nil="true"/>
-    <LocRecommendedHandoff xmlns="4873beb7-5857-4685-be1f-d57550cc96cc" xsi:nil="true"/>
-    <BusinessGroup xmlns="4873beb7-5857-4685-be1f-d57550cc96cc" xsi:nil="true"/>
-    <BlockPublish xmlns="4873beb7-5857-4685-be1f-d57550cc96cc">false</BlockPublish>
-    <TPFriendlyName xmlns="4873beb7-5857-4685-be1f-d57550cc96cc" xsi:nil="true"/>
-    <NumericId xmlns="4873beb7-5857-4685-be1f-d57550cc96cc" xsi:nil="true"/>
-    <APEditor xmlns="4873beb7-5857-4685-be1f-d57550cc96cc">
-      <UserInfo>
-        <DisplayName/>
-        <AccountId xsi:nil="true"/>
-        <AccountType/>
-      </UserInfo>
-    </APEditor>
-    <SourceTitle xmlns="4873beb7-5857-4685-be1f-d57550cc96cc" xsi:nil="true"/>
-    <OpenTemplate xmlns="4873beb7-5857-4685-be1f-d57550cc96cc">true</OpenTemplate>
-    <UALocComments xmlns="4873beb7-5857-4685-be1f-d57550cc96cc" xsi:nil="true"/>
-    <ParentAssetId xmlns="4873beb7-5857-4685-be1f-d57550cc96cc" xsi:nil="true"/>
-    <IntlLangReviewDate xmlns="4873beb7-5857-4685-be1f-d57550cc96cc" xsi:nil="true"/>
-    <FeatureTagsTaxHTField0 xmlns="4873beb7-5857-4685-be1f-d57550cc96cc">
-      <Terms xmlns="http://schemas.microsoft.com/office/infopath/2007/PartnerControls"/>
-    </FeatureTagsTaxHTField0>
-    <PublishStatusLookup xmlns="4873beb7-5857-4685-be1f-d57550cc96cc">
-      <Value>1566889</Value>
-    </PublishStatusLookup>
-    <Providers xmlns="4873beb7-5857-4685-be1f-d57550cc96cc" xsi:nil="true"/>
-    <MachineTranslated xmlns="4873beb7-5857-4685-be1f-d57550cc96cc">false</MachineTranslated>
-    <OriginalSourceMarket xmlns="4873beb7-5857-4685-be1f-d57550cc96cc" xsi:nil="true"/>
-    <APDescription xmlns="4873beb7-5857-4685-be1f-d57550cc96cc" xsi:nil="true"/>
-    <ClipArtFilename xmlns="4873beb7-5857-4685-be1f-d57550cc96cc" xsi:nil="true"/>
-    <ContentItem xmlns="4873beb7-5857-4685-be1f-d57550cc96cc" xsi:nil="true"/>
-    <TPInstallLocation xmlns="4873beb7-5857-4685-be1f-d57550cc96cc" xsi:nil="true"/>
-    <PublishTargets xmlns="4873beb7-5857-4685-be1f-d57550cc96cc">OfficeOnlineVNext</PublishTargets>
-    <TimesCloned xmlns="4873beb7-5857-4685-be1f-d57550cc96cc" xsi:nil="true"/>
-    <AssetStart xmlns="4873beb7-5857-4685-be1f-d57550cc96cc">2012-05-23T08:44:00+00:00</AssetStart>
-    <Provider xmlns="4873beb7-5857-4685-be1f-d57550cc96cc" xsi:nil="true"/>
-    <AcquiredFrom xmlns="4873beb7-5857-4685-be1f-d57550cc96cc">Internal MS</AcquiredFrom>
-    <FriendlyTitle xmlns="4873beb7-5857-4685-be1f-d57550cc96cc" xsi:nil="true"/>
-    <LastHandOff xmlns="4873beb7-5857-4685-be1f-d57550cc96cc" xsi:nil="true"/>
-    <TPClientViewer xmlns="4873beb7-5857-4685-be1f-d57550cc96cc" xsi:nil="true"/>
-    <UACurrentWords xmlns="4873beb7-5857-4685-be1f-d57550cc96cc" xsi:nil="true"/>
-    <ArtSampleDocs xmlns="4873beb7-5857-4685-be1f-d57550cc96cc" xsi:nil="true"/>
-    <UALocRecommendation xmlns="4873beb7-5857-4685-be1f-d57550cc96cc">Localize</UALocRecommendation>
-    <Manager xmlns="4873beb7-5857-4685-be1f-d57550cc96cc" xsi:nil="true"/>
-    <ShowIn xmlns="4873beb7-5857-4685-be1f-d57550cc96cc">Show everywhere</ShowIn>
-    <UANotes xmlns="4873beb7-5857-4685-be1f-d57550cc96cc" xsi:nil="true"/>
-    <TemplateStatus xmlns="4873beb7-5857-4685-be1f-d57550cc96cc">Complete</TemplateStatus>
-    <InternalTagsTaxHTField0 xmlns="4873beb7-5857-4685-be1f-d57550cc96cc">
-      <Terms xmlns="http://schemas.microsoft.com/office/infopath/2007/PartnerControls"/>
-    </InternalTagsTaxHTField0>
-    <CSXHash xmlns="4873beb7-5857-4685-be1f-d57550cc96cc" xsi:nil="true"/>
-    <Downloads xmlns="4873beb7-5857-4685-be1f-d57550cc96cc">0</Downloads>
-    <VoteCount xmlns="4873beb7-5857-4685-be1f-d57550cc96cc" xsi:nil="true"/>
-    <OOCacheId xmlns="4873beb7-5857-4685-be1f-d57550cc96cc" xsi:nil="true"/>
-    <IsDeleted xmlns="4873beb7-5857-4685-be1f-d57550cc96cc">false</IsDeleted>
-    <AssetExpire xmlns="4873beb7-5857-4685-be1f-d57550cc96cc">2029-01-01T08:00:00+00:00</AssetExpire>
-    <DSATActionTaken xmlns="4873beb7-5857-4685-be1f-d57550cc96cc" xsi:nil="true"/>
-    <CSXSubmissionMarket xmlns="4873beb7-5857-4685-be1f-d57550cc96cc" xsi:nil="true"/>
-    <TPExecutable xmlns="4873beb7-5857-4685-be1f-d57550cc96cc" xsi:nil="true"/>
-    <SubmitterId xmlns="4873beb7-5857-4685-be1f-d57550cc96cc" xsi:nil="true"/>
-    <EditorialTags xmlns="4873beb7-5857-4685-be1f-d57550cc96cc" xsi:nil="true"/>
-    <ApprovalLog xmlns="4873beb7-5857-4685-be1f-d57550cc96cc" xsi:nil="true"/>
-    <AssetType xmlns="4873beb7-5857-4685-be1f-d57550cc96cc">TP</AssetType>
-    <BugNumber xmlns="4873beb7-5857-4685-be1f-d57550cc96cc" xsi:nil="true"/>
-    <CSXSubmissionDate xmlns="4873beb7-5857-4685-be1f-d57550cc96cc" xsi:nil="true"/>
-    <CSXUpdate xmlns="4873beb7-5857-4685-be1f-d57550cc96cc">false</CSXUpdate>
-    <Milestone xmlns="4873beb7-5857-4685-be1f-d57550cc96cc" xsi:nil="true"/>
-    <RecommendationsModifier xmlns="4873beb7-5857-4685-be1f-d57550cc96cc" xsi:nil="true"/>
-    <OriginAsset xmlns="4873beb7-5857-4685-be1f-d57550cc96cc" xsi:nil="true"/>
-    <TPComponent xmlns="4873beb7-5857-4685-be1f-d57550cc96cc" xsi:nil="true"/>
-    <AssetId xmlns="4873beb7-5857-4685-be1f-d57550cc96cc">TP102901017</AssetId>
-    <IntlLocPriority xmlns="4873beb7-5857-4685-be1f-d57550cc96cc" xsi:nil="true"/>
-    <PolicheckWords xmlns="4873beb7-5857-4685-be1f-d57550cc96cc" xsi:nil="true"/>
-    <TPLaunchHelpLink xmlns="4873beb7-5857-4685-be1f-d57550cc96cc" xsi:nil="true"/>
-    <TPApplication xmlns="4873beb7-5857-4685-be1f-d57550cc96cc" xsi:nil="true"/>
-    <CrawlForDependencies xmlns="4873beb7-5857-4685-be1f-d57550cc96cc">false</CrawlForDependencies>
-    <HandoffToMSDN xmlns="4873beb7-5857-4685-be1f-d57550cc96cc" xsi:nil="true"/>
-    <PlannedPubDate xmlns="4873beb7-5857-4685-be1f-d57550cc96cc" xsi:nil="true"/>
-    <IntlLangReviewer xmlns="4873beb7-5857-4685-be1f-d57550cc96cc" xsi:nil="true"/>
-    <TrustLevel xmlns="4873beb7-5857-4685-be1f-d57550cc96cc">1 Microsoft Managed Content</TrustLevel>
-    <LocLastLocAttemptVersionLookup xmlns="4873beb7-5857-4685-be1f-d57550cc96cc">836753</LocLastLocAttemptVersionLookup>
-    <IsSearchable xmlns="4873beb7-5857-4685-be1f-d57550cc96cc">true</IsSearchable>
-    <TemplateTemplateType xmlns="4873beb7-5857-4685-be1f-d57550cc96cc">PowerPoint Design Template</TemplateTemplateType>
-    <CampaignTagsTaxHTField0 xmlns="4873beb7-5857-4685-be1f-d57550cc96cc">
-      <Terms xmlns="http://schemas.microsoft.com/office/infopath/2007/PartnerControls"/>
-    </CampaignTagsTaxHTField0>
-    <TPNamespace xmlns="4873beb7-5857-4685-be1f-d57550cc96cc" xsi:nil="true"/>
-    <TaxCatchAll xmlns="4873beb7-5857-4685-be1f-d57550cc96cc"/>
-    <Markets xmlns="4873beb7-5857-4685-be1f-d57550cc96cc"/>
-    <UAProjectedTotalWords xmlns="4873beb7-5857-4685-be1f-d57550cc96cc" xsi:nil="true"/>
-    <IntlLangReview xmlns="4873beb7-5857-4685-be1f-d57550cc96cc">false</IntlLangReview>
-    <OutputCachingOn xmlns="4873beb7-5857-4685-be1f-d57550cc96cc">false</OutputCachingOn>
-    <AverageRating xmlns="4873beb7-5857-4685-be1f-d57550cc96cc" xsi:nil="true"/>
-    <APAuthor xmlns="4873beb7-5857-4685-be1f-d57550cc96cc">
-      <UserInfo>
-        <DisplayName>REDMOND\v-anij</DisplayName>
-        <AccountId>2469</AccountId>
-        <AccountType/>
-      </UserInfo>
-    </APAuthor>
-    <LocManualTestRequired xmlns="4873beb7-5857-4685-be1f-d57550cc96cc">false</LocManualTestRequired>
-    <TPCommandLine xmlns="4873beb7-5857-4685-be1f-d57550cc96cc" xsi:nil="true"/>
-    <TPAppVersion xmlns="4873beb7-5857-4685-be1f-d57550cc96cc" xsi:nil="true"/>
-    <EditorialStatus xmlns="4873beb7-5857-4685-be1f-d57550cc96cc">Complete</EditorialStatus>
-    <LastModifiedDateTime xmlns="4873beb7-5857-4685-be1f-d57550cc96cc" xsi:nil="true"/>
-    <ScenarioTagsTaxHTField0 xmlns="4873beb7-5857-4685-be1f-d57550cc96cc">
-      <Terms xmlns="http://schemas.microsoft.com/office/infopath/2007/PartnerControls"/>
-    </ScenarioTagsTaxHTField0>
-    <OriginalRelease xmlns="4873beb7-5857-4685-be1f-d57550cc96cc">15</OriginalRelease>
-    <TPLaunchHelpLinkType xmlns="4873beb7-5857-4685-be1f-d57550cc96cc">Template</TPLaunchHelpLinkType>
-    <LocalizationTagsTaxHTField0 xmlns="4873beb7-5857-4685-be1f-d57550cc96cc">
-      <Terms xmlns="http://schemas.microsoft.com/office/infopath/2007/PartnerControls"/>
-    </LocalizationTagsTaxHTField0>
-    <LocMarketGroupTiers2 xmlns="4873beb7-5857-4685-be1f-d57550cc96cc" xsi:nil="true"/>
-  </documentManagement>
-</p:properties>
-</file>
-
-<file path=customXml/item3.xml><?xml version="1.0" encoding="utf-8"?>
 <ct:contentTypeSchema xmlns:ct="http://schemas.microsoft.com/office/2006/metadata/contentType" xmlns:ma="http://schemas.microsoft.com/office/2006/metadata/properties/metaAttributes" ct:_="" ma:_="" ma:contentTypeName="TemplateFile" ma:contentTypeID="0x0101006EDDDB5EE6D98C44930B742096920B300400F5B6D36B3EF94B4E9A635CDF2A18F5B8" ma:contentTypeVersion="72" ma:contentTypeDescription="Create a new document." ma:contentTypeScope="" ma:versionID="a23e56308344d904b51738559c3d67c9">
   <xsd:schema xmlns:xsd="http://www.w3.org/2001/XMLSchema" xmlns:xs="http://www.w3.org/2001/XMLSchema" xmlns:p="http://schemas.microsoft.com/office/2006/metadata/properties" xmlns:ns2="4873beb7-5857-4685-be1f-d57550cc96cc" targetNamespace="http://schemas.microsoft.com/office/2006/metadata/properties" ma:root="true" ma:fieldsID="cd0908cc4600e77bf5da051303e00c8d" ns2:_="">
     <xsd:import namespace="4873beb7-5857-4685-be1f-d57550cc96cc"/>
@@ -6948,6 +6830,132 @@
 </ct:contentTypeSchema>
 </file>
 
+<file path=customXml/item3.xml><?xml version="1.0" encoding="utf-8"?>
+<p:properties xmlns:p="http://schemas.microsoft.com/office/2006/metadata/properties" xmlns:xsi="http://www.w3.org/2001/XMLSchema-instance" xmlns:pc="http://schemas.microsoft.com/office/infopath/2007/PartnerControls">
+  <documentManagement>
+    <DirectSourceMarket xmlns="4873beb7-5857-4685-be1f-d57550cc96cc" xsi:nil="true"/>
+    <ApprovalStatus xmlns="4873beb7-5857-4685-be1f-d57550cc96cc">InProgress</ApprovalStatus>
+    <MarketSpecific xmlns="4873beb7-5857-4685-be1f-d57550cc96cc">false</MarketSpecific>
+    <LocComments xmlns="4873beb7-5857-4685-be1f-d57550cc96cc" xsi:nil="true"/>
+    <ThumbnailAssetId xmlns="4873beb7-5857-4685-be1f-d57550cc96cc" xsi:nil="true"/>
+    <PrimaryImageGen xmlns="4873beb7-5857-4685-be1f-d57550cc96cc">true</PrimaryImageGen>
+    <LegacyData xmlns="4873beb7-5857-4685-be1f-d57550cc96cc" xsi:nil="true"/>
+    <LocRecommendedHandoff xmlns="4873beb7-5857-4685-be1f-d57550cc96cc" xsi:nil="true"/>
+    <BusinessGroup xmlns="4873beb7-5857-4685-be1f-d57550cc96cc" xsi:nil="true"/>
+    <BlockPublish xmlns="4873beb7-5857-4685-be1f-d57550cc96cc">false</BlockPublish>
+    <TPFriendlyName xmlns="4873beb7-5857-4685-be1f-d57550cc96cc" xsi:nil="true"/>
+    <NumericId xmlns="4873beb7-5857-4685-be1f-d57550cc96cc" xsi:nil="true"/>
+    <APEditor xmlns="4873beb7-5857-4685-be1f-d57550cc96cc">
+      <UserInfo>
+        <DisplayName/>
+        <AccountId xsi:nil="true"/>
+        <AccountType/>
+      </UserInfo>
+    </APEditor>
+    <SourceTitle xmlns="4873beb7-5857-4685-be1f-d57550cc96cc" xsi:nil="true"/>
+    <OpenTemplate xmlns="4873beb7-5857-4685-be1f-d57550cc96cc">true</OpenTemplate>
+    <UALocComments xmlns="4873beb7-5857-4685-be1f-d57550cc96cc" xsi:nil="true"/>
+    <ParentAssetId xmlns="4873beb7-5857-4685-be1f-d57550cc96cc" xsi:nil="true"/>
+    <IntlLangReviewDate xmlns="4873beb7-5857-4685-be1f-d57550cc96cc" xsi:nil="true"/>
+    <FeatureTagsTaxHTField0 xmlns="4873beb7-5857-4685-be1f-d57550cc96cc">
+      <Terms xmlns="http://schemas.microsoft.com/office/infopath/2007/PartnerControls"/>
+    </FeatureTagsTaxHTField0>
+    <PublishStatusLookup xmlns="4873beb7-5857-4685-be1f-d57550cc96cc">
+      <Value>1566889</Value>
+    </PublishStatusLookup>
+    <Providers xmlns="4873beb7-5857-4685-be1f-d57550cc96cc" xsi:nil="true"/>
+    <MachineTranslated xmlns="4873beb7-5857-4685-be1f-d57550cc96cc">false</MachineTranslated>
+    <OriginalSourceMarket xmlns="4873beb7-5857-4685-be1f-d57550cc96cc" xsi:nil="true"/>
+    <APDescription xmlns="4873beb7-5857-4685-be1f-d57550cc96cc" xsi:nil="true"/>
+    <ClipArtFilename xmlns="4873beb7-5857-4685-be1f-d57550cc96cc" xsi:nil="true"/>
+    <ContentItem xmlns="4873beb7-5857-4685-be1f-d57550cc96cc" xsi:nil="true"/>
+    <TPInstallLocation xmlns="4873beb7-5857-4685-be1f-d57550cc96cc" xsi:nil="true"/>
+    <PublishTargets xmlns="4873beb7-5857-4685-be1f-d57550cc96cc">OfficeOnlineVNext</PublishTargets>
+    <TimesCloned xmlns="4873beb7-5857-4685-be1f-d57550cc96cc" xsi:nil="true"/>
+    <AssetStart xmlns="4873beb7-5857-4685-be1f-d57550cc96cc">2012-05-23T08:44:00+00:00</AssetStart>
+    <Provider xmlns="4873beb7-5857-4685-be1f-d57550cc96cc" xsi:nil="true"/>
+    <AcquiredFrom xmlns="4873beb7-5857-4685-be1f-d57550cc96cc">Internal MS</AcquiredFrom>
+    <FriendlyTitle xmlns="4873beb7-5857-4685-be1f-d57550cc96cc" xsi:nil="true"/>
+    <LastHandOff xmlns="4873beb7-5857-4685-be1f-d57550cc96cc" xsi:nil="true"/>
+    <TPClientViewer xmlns="4873beb7-5857-4685-be1f-d57550cc96cc" xsi:nil="true"/>
+    <UACurrentWords xmlns="4873beb7-5857-4685-be1f-d57550cc96cc" xsi:nil="true"/>
+    <ArtSampleDocs xmlns="4873beb7-5857-4685-be1f-d57550cc96cc" xsi:nil="true"/>
+    <UALocRecommendation xmlns="4873beb7-5857-4685-be1f-d57550cc96cc">Localize</UALocRecommendation>
+    <Manager xmlns="4873beb7-5857-4685-be1f-d57550cc96cc" xsi:nil="true"/>
+    <ShowIn xmlns="4873beb7-5857-4685-be1f-d57550cc96cc">Show everywhere</ShowIn>
+    <UANotes xmlns="4873beb7-5857-4685-be1f-d57550cc96cc" xsi:nil="true"/>
+    <TemplateStatus xmlns="4873beb7-5857-4685-be1f-d57550cc96cc">Complete</TemplateStatus>
+    <InternalTagsTaxHTField0 xmlns="4873beb7-5857-4685-be1f-d57550cc96cc">
+      <Terms xmlns="http://schemas.microsoft.com/office/infopath/2007/PartnerControls"/>
+    </InternalTagsTaxHTField0>
+    <CSXHash xmlns="4873beb7-5857-4685-be1f-d57550cc96cc" xsi:nil="true"/>
+    <Downloads xmlns="4873beb7-5857-4685-be1f-d57550cc96cc">0</Downloads>
+    <VoteCount xmlns="4873beb7-5857-4685-be1f-d57550cc96cc" xsi:nil="true"/>
+    <OOCacheId xmlns="4873beb7-5857-4685-be1f-d57550cc96cc" xsi:nil="true"/>
+    <IsDeleted xmlns="4873beb7-5857-4685-be1f-d57550cc96cc">false</IsDeleted>
+    <AssetExpire xmlns="4873beb7-5857-4685-be1f-d57550cc96cc">2029-01-01T08:00:00+00:00</AssetExpire>
+    <DSATActionTaken xmlns="4873beb7-5857-4685-be1f-d57550cc96cc" xsi:nil="true"/>
+    <CSXSubmissionMarket xmlns="4873beb7-5857-4685-be1f-d57550cc96cc" xsi:nil="true"/>
+    <TPExecutable xmlns="4873beb7-5857-4685-be1f-d57550cc96cc" xsi:nil="true"/>
+    <SubmitterId xmlns="4873beb7-5857-4685-be1f-d57550cc96cc" xsi:nil="true"/>
+    <EditorialTags xmlns="4873beb7-5857-4685-be1f-d57550cc96cc" xsi:nil="true"/>
+    <ApprovalLog xmlns="4873beb7-5857-4685-be1f-d57550cc96cc" xsi:nil="true"/>
+    <AssetType xmlns="4873beb7-5857-4685-be1f-d57550cc96cc">TP</AssetType>
+    <BugNumber xmlns="4873beb7-5857-4685-be1f-d57550cc96cc" xsi:nil="true"/>
+    <CSXSubmissionDate xmlns="4873beb7-5857-4685-be1f-d57550cc96cc" xsi:nil="true"/>
+    <CSXUpdate xmlns="4873beb7-5857-4685-be1f-d57550cc96cc">false</CSXUpdate>
+    <Milestone xmlns="4873beb7-5857-4685-be1f-d57550cc96cc" xsi:nil="true"/>
+    <RecommendationsModifier xmlns="4873beb7-5857-4685-be1f-d57550cc96cc" xsi:nil="true"/>
+    <OriginAsset xmlns="4873beb7-5857-4685-be1f-d57550cc96cc" xsi:nil="true"/>
+    <TPComponent xmlns="4873beb7-5857-4685-be1f-d57550cc96cc" xsi:nil="true"/>
+    <AssetId xmlns="4873beb7-5857-4685-be1f-d57550cc96cc">TP102901017</AssetId>
+    <IntlLocPriority xmlns="4873beb7-5857-4685-be1f-d57550cc96cc" xsi:nil="true"/>
+    <PolicheckWords xmlns="4873beb7-5857-4685-be1f-d57550cc96cc" xsi:nil="true"/>
+    <TPLaunchHelpLink xmlns="4873beb7-5857-4685-be1f-d57550cc96cc" xsi:nil="true"/>
+    <TPApplication xmlns="4873beb7-5857-4685-be1f-d57550cc96cc" xsi:nil="true"/>
+    <CrawlForDependencies xmlns="4873beb7-5857-4685-be1f-d57550cc96cc">false</CrawlForDependencies>
+    <HandoffToMSDN xmlns="4873beb7-5857-4685-be1f-d57550cc96cc" xsi:nil="true"/>
+    <PlannedPubDate xmlns="4873beb7-5857-4685-be1f-d57550cc96cc" xsi:nil="true"/>
+    <IntlLangReviewer xmlns="4873beb7-5857-4685-be1f-d57550cc96cc" xsi:nil="true"/>
+    <TrustLevel xmlns="4873beb7-5857-4685-be1f-d57550cc96cc">1 Microsoft Managed Content</TrustLevel>
+    <LocLastLocAttemptVersionLookup xmlns="4873beb7-5857-4685-be1f-d57550cc96cc">836753</LocLastLocAttemptVersionLookup>
+    <IsSearchable xmlns="4873beb7-5857-4685-be1f-d57550cc96cc">true</IsSearchable>
+    <TemplateTemplateType xmlns="4873beb7-5857-4685-be1f-d57550cc96cc">PowerPoint Design Template</TemplateTemplateType>
+    <CampaignTagsTaxHTField0 xmlns="4873beb7-5857-4685-be1f-d57550cc96cc">
+      <Terms xmlns="http://schemas.microsoft.com/office/infopath/2007/PartnerControls"/>
+    </CampaignTagsTaxHTField0>
+    <TPNamespace xmlns="4873beb7-5857-4685-be1f-d57550cc96cc" xsi:nil="true"/>
+    <TaxCatchAll xmlns="4873beb7-5857-4685-be1f-d57550cc96cc"/>
+    <Markets xmlns="4873beb7-5857-4685-be1f-d57550cc96cc"/>
+    <UAProjectedTotalWords xmlns="4873beb7-5857-4685-be1f-d57550cc96cc" xsi:nil="true"/>
+    <IntlLangReview xmlns="4873beb7-5857-4685-be1f-d57550cc96cc">false</IntlLangReview>
+    <OutputCachingOn xmlns="4873beb7-5857-4685-be1f-d57550cc96cc">false</OutputCachingOn>
+    <AverageRating xmlns="4873beb7-5857-4685-be1f-d57550cc96cc" xsi:nil="true"/>
+    <APAuthor xmlns="4873beb7-5857-4685-be1f-d57550cc96cc">
+      <UserInfo>
+        <DisplayName>REDMOND\v-anij</DisplayName>
+        <AccountId>2469</AccountId>
+        <AccountType/>
+      </UserInfo>
+    </APAuthor>
+    <LocManualTestRequired xmlns="4873beb7-5857-4685-be1f-d57550cc96cc">false</LocManualTestRequired>
+    <TPCommandLine xmlns="4873beb7-5857-4685-be1f-d57550cc96cc" xsi:nil="true"/>
+    <TPAppVersion xmlns="4873beb7-5857-4685-be1f-d57550cc96cc" xsi:nil="true"/>
+    <EditorialStatus xmlns="4873beb7-5857-4685-be1f-d57550cc96cc">Complete</EditorialStatus>
+    <LastModifiedDateTime xmlns="4873beb7-5857-4685-be1f-d57550cc96cc" xsi:nil="true"/>
+    <ScenarioTagsTaxHTField0 xmlns="4873beb7-5857-4685-be1f-d57550cc96cc">
+      <Terms xmlns="http://schemas.microsoft.com/office/infopath/2007/PartnerControls"/>
+    </ScenarioTagsTaxHTField0>
+    <OriginalRelease xmlns="4873beb7-5857-4685-be1f-d57550cc96cc">15</OriginalRelease>
+    <TPLaunchHelpLinkType xmlns="4873beb7-5857-4685-be1f-d57550cc96cc">Template</TPLaunchHelpLinkType>
+    <LocalizationTagsTaxHTField0 xmlns="4873beb7-5857-4685-be1f-d57550cc96cc">
+      <Terms xmlns="http://schemas.microsoft.com/office/infopath/2007/PartnerControls"/>
+    </LocalizationTagsTaxHTField0>
+    <LocMarketGroupTiers2 xmlns="4873beb7-5857-4685-be1f-d57550cc96cc" xsi:nil="true"/>
+  </documentManagement>
+</p:properties>
+</file>
+
 <file path=customXml/itemProps1.xml><?xml version="1.0" encoding="utf-8"?>
 <ds:datastoreItem xmlns:ds="http://schemas.openxmlformats.org/officeDocument/2006/customXml" ds:itemID="{746CFF6F-D9AA-4BC0-911A-0A1356771912}">
   <ds:schemaRefs>
@@ -6957,22 +6965,6 @@
 </file>
 
 <file path=customXml/itemProps2.xml><?xml version="1.0" encoding="utf-8"?>
-<ds:datastoreItem xmlns:ds="http://schemas.openxmlformats.org/officeDocument/2006/customXml" ds:itemID="{04098515-0C12-46CF-BC7C-69B4A13CD5FA}">
-  <ds:schemaRefs>
-    <ds:schemaRef ds:uri="http://schemas.microsoft.com/office/infopath/2007/PartnerControls"/>
-    <ds:schemaRef ds:uri="http://purl.org/dc/elements/1.1/"/>
-    <ds:schemaRef ds:uri="http://purl.org/dc/terms/"/>
-    <ds:schemaRef ds:uri="http://schemas.microsoft.com/office/2006/documentManagement/types"/>
-    <ds:schemaRef ds:uri="http://purl.org/dc/dcmitype/"/>
-    <ds:schemaRef ds:uri="4873beb7-5857-4685-be1f-d57550cc96cc"/>
-    <ds:schemaRef ds:uri="http://schemas.openxmlformats.org/package/2006/metadata/core-properties"/>
-    <ds:schemaRef ds:uri="http://schemas.microsoft.com/office/2006/metadata/properties"/>
-    <ds:schemaRef ds:uri="http://www.w3.org/XML/1998/namespace"/>
-  </ds:schemaRefs>
-</ds:datastoreItem>
-</file>
-
-<file path=customXml/itemProps3.xml><?xml version="1.0" encoding="utf-8"?>
 <ds:datastoreItem xmlns:ds="http://schemas.openxmlformats.org/officeDocument/2006/customXml" ds:itemID="{0B5C6E15-39DC-470B-9445-F754B9458020}">
   <ds:schemaRefs>
     <ds:schemaRef ds:uri="http://schemas.microsoft.com/office/2006/metadata/contentType"/>
@@ -6988,4 +6980,20 @@
     <ds:schemaRef ds:uri="http://schemas.microsoft.com/internal/obd"/>
   </ds:schemaRefs>
 </ds:datastoreItem>
+</file>
+
+<file path=customXml/itemProps3.xml><?xml version="1.0" encoding="utf-8"?>
+<ds:datastoreItem xmlns:ds="http://schemas.openxmlformats.org/officeDocument/2006/customXml" ds:itemID="{04098515-0C12-46CF-BC7C-69B4A13CD5FA}">
+  <ds:schemaRefs>
+    <ds:schemaRef ds:uri="http://schemas.microsoft.com/office/infopath/2007/PartnerControls"/>
+    <ds:schemaRef ds:uri="http://purl.org/dc/elements/1.1/"/>
+    <ds:schemaRef ds:uri="http://purl.org/dc/terms/"/>
+    <ds:schemaRef ds:uri="http://schemas.microsoft.com/office/2006/documentManagement/types"/>
+    <ds:schemaRef ds:uri="http://purl.org/dc/dcmitype/"/>
+    <ds:schemaRef ds:uri="4873beb7-5857-4685-be1f-d57550cc96cc"/>
+    <ds:schemaRef ds:uri="http://schemas.openxmlformats.org/package/2006/metadata/core-properties"/>
+    <ds:schemaRef ds:uri="http://schemas.microsoft.com/office/2006/metadata/properties"/>
+    <ds:schemaRef ds:uri="http://www.w3.org/XML/1998/namespace"/>
+  </ds:schemaRefs>
+</ds:datastoreItem>
 </file>
</xml_diff>

<commit_message>
Updated PP GitKraken Commit
</commit_message>
<xml_diff>
--- a/GIT HUB Branching & Merging.pptx
+++ b/GIT HUB Branching & Merging.pptx
@@ -5,10 +5,10 @@
     <p:sldMasterId id="2147483648" r:id="rId4"/>
   </p:sldMasterIdLst>
   <p:notesMasterIdLst>
-    <p:notesMasterId r:id="rId12"/>
+    <p:notesMasterId r:id="rId13"/>
   </p:notesMasterIdLst>
   <p:handoutMasterIdLst>
-    <p:handoutMasterId r:id="rId13"/>
+    <p:handoutMasterId r:id="rId14"/>
   </p:handoutMasterIdLst>
   <p:sldIdLst>
     <p:sldId id="256" r:id="rId5"/>
@@ -18,6 +18,7 @@
     <p:sldId id="258" r:id="rId9"/>
     <p:sldId id="264" r:id="rId10"/>
     <p:sldId id="265" r:id="rId11"/>
+    <p:sldId id="266" r:id="rId12"/>
   </p:sldIdLst>
   <p:sldSz cx="12192000" cy="6858000"/>
   <p:notesSz cx="6858000" cy="9144000"/>
@@ -4989,6 +4990,94 @@
     <p:extLst>
       <p:ext uri="{BB962C8B-B14F-4D97-AF65-F5344CB8AC3E}">
         <p14:creationId xmlns:p14="http://schemas.microsoft.com/office/powerpoint/2010/main" val="426922392"/>
+      </p:ext>
+    </p:extLst>
+  </p:cSld>
+  <p:clrMapOvr>
+    <a:masterClrMapping/>
+  </p:clrMapOvr>
+</p:sld>
+</file>
+
+<file path=ppt/slides/slide8.xml><?xml version="1.0" encoding="utf-8"?>
+<p:sld xmlns:a="http://schemas.openxmlformats.org/drawingml/2006/main" xmlns:r="http://schemas.openxmlformats.org/officeDocument/2006/relationships" xmlns:p="http://schemas.openxmlformats.org/presentationml/2006/main">
+  <p:cSld>
+    <p:spTree>
+      <p:nvGrpSpPr>
+        <p:cNvPr id="1" name=""/>
+        <p:cNvGrpSpPr/>
+        <p:nvPr/>
+      </p:nvGrpSpPr>
+      <p:grpSpPr>
+        <a:xfrm>
+          <a:off x="0" y="0"/>
+          <a:ext cx="0" cy="0"/>
+          <a:chOff x="0" y="0"/>
+          <a:chExt cx="0" cy="0"/>
+        </a:xfrm>
+      </p:grpSpPr>
+      <p:sp>
+        <p:nvSpPr>
+          <p:cNvPr id="2" name="Title 1">
+            <a:extLst>
+              <a:ext uri="{FF2B5EF4-FFF2-40B4-BE49-F238E27FC236}">
+                <a16:creationId xmlns:a16="http://schemas.microsoft.com/office/drawing/2014/main" id="{305057D4-F8FE-49B9-BF36-356CD974A360}"/>
+              </a:ext>
+            </a:extLst>
+          </p:cNvPr>
+          <p:cNvSpPr>
+            <a:spLocks noGrp="1"/>
+          </p:cNvSpPr>
+          <p:nvPr>
+            <p:ph type="title"/>
+          </p:nvPr>
+        </p:nvSpPr>
+        <p:spPr/>
+        <p:txBody>
+          <a:bodyPr/>
+          <a:lstStyle/>
+          <a:p>
+            <a:pPr algn="ctr"/>
+            <a:r>
+              <a:rPr lang="en-US" dirty="0" err="1"/>
+              <a:t>GitKraken</a:t>
+            </a:r>
+            <a:r>
+              <a:rPr lang="en-US" dirty="0"/>
+              <a:t> Graphical View</a:t>
+            </a:r>
+          </a:p>
+        </p:txBody>
+      </p:sp>
+      <p:sp>
+        <p:nvSpPr>
+          <p:cNvPr id="7" name="Content Placeholder 6">
+            <a:extLst>
+              <a:ext uri="{FF2B5EF4-FFF2-40B4-BE49-F238E27FC236}">
+                <a16:creationId xmlns:a16="http://schemas.microsoft.com/office/drawing/2014/main" id="{284A6674-E1D2-4B92-943F-0B0053C38578}"/>
+              </a:ext>
+            </a:extLst>
+          </p:cNvPr>
+          <p:cNvSpPr>
+            <a:spLocks noGrp="1"/>
+          </p:cNvSpPr>
+          <p:nvPr>
+            <p:ph idx="1"/>
+          </p:nvPr>
+        </p:nvSpPr>
+        <p:spPr/>
+        <p:txBody>
+          <a:bodyPr/>
+          <a:lstStyle/>
+          <a:p>
+            <a:endParaRPr lang="en-US"/>
+          </a:p>
+        </p:txBody>
+      </p:sp>
+    </p:spTree>
+    <p:extLst>
+      <p:ext uri="{BB962C8B-B14F-4D97-AF65-F5344CB8AC3E}">
+        <p14:creationId xmlns:p14="http://schemas.microsoft.com/office/powerpoint/2010/main" val="252953982"/>
       </p:ext>
     </p:extLst>
   </p:cSld>
@@ -5791,6 +5880,132 @@
 </file>
 
 <file path=customXml/item2.xml><?xml version="1.0" encoding="utf-8"?>
+<p:properties xmlns:p="http://schemas.microsoft.com/office/2006/metadata/properties" xmlns:xsi="http://www.w3.org/2001/XMLSchema-instance" xmlns:pc="http://schemas.microsoft.com/office/infopath/2007/PartnerControls">
+  <documentManagement>
+    <DirectSourceMarket xmlns="4873beb7-5857-4685-be1f-d57550cc96cc" xsi:nil="true"/>
+    <ApprovalStatus xmlns="4873beb7-5857-4685-be1f-d57550cc96cc">InProgress</ApprovalStatus>
+    <MarketSpecific xmlns="4873beb7-5857-4685-be1f-d57550cc96cc">false</MarketSpecific>
+    <LocComments xmlns="4873beb7-5857-4685-be1f-d57550cc96cc" xsi:nil="true"/>
+    <ThumbnailAssetId xmlns="4873beb7-5857-4685-be1f-d57550cc96cc" xsi:nil="true"/>
+    <PrimaryImageGen xmlns="4873beb7-5857-4685-be1f-d57550cc96cc">true</PrimaryImageGen>
+    <LegacyData xmlns="4873beb7-5857-4685-be1f-d57550cc96cc" xsi:nil="true"/>
+    <LocRecommendedHandoff xmlns="4873beb7-5857-4685-be1f-d57550cc96cc" xsi:nil="true"/>
+    <BusinessGroup xmlns="4873beb7-5857-4685-be1f-d57550cc96cc" xsi:nil="true"/>
+    <BlockPublish xmlns="4873beb7-5857-4685-be1f-d57550cc96cc">false</BlockPublish>
+    <TPFriendlyName xmlns="4873beb7-5857-4685-be1f-d57550cc96cc" xsi:nil="true"/>
+    <NumericId xmlns="4873beb7-5857-4685-be1f-d57550cc96cc" xsi:nil="true"/>
+    <APEditor xmlns="4873beb7-5857-4685-be1f-d57550cc96cc">
+      <UserInfo>
+        <DisplayName/>
+        <AccountId xsi:nil="true"/>
+        <AccountType/>
+      </UserInfo>
+    </APEditor>
+    <SourceTitle xmlns="4873beb7-5857-4685-be1f-d57550cc96cc" xsi:nil="true"/>
+    <OpenTemplate xmlns="4873beb7-5857-4685-be1f-d57550cc96cc">true</OpenTemplate>
+    <UALocComments xmlns="4873beb7-5857-4685-be1f-d57550cc96cc" xsi:nil="true"/>
+    <ParentAssetId xmlns="4873beb7-5857-4685-be1f-d57550cc96cc" xsi:nil="true"/>
+    <IntlLangReviewDate xmlns="4873beb7-5857-4685-be1f-d57550cc96cc" xsi:nil="true"/>
+    <FeatureTagsTaxHTField0 xmlns="4873beb7-5857-4685-be1f-d57550cc96cc">
+      <Terms xmlns="http://schemas.microsoft.com/office/infopath/2007/PartnerControls"/>
+    </FeatureTagsTaxHTField0>
+    <PublishStatusLookup xmlns="4873beb7-5857-4685-be1f-d57550cc96cc">
+      <Value>1566889</Value>
+    </PublishStatusLookup>
+    <Providers xmlns="4873beb7-5857-4685-be1f-d57550cc96cc" xsi:nil="true"/>
+    <MachineTranslated xmlns="4873beb7-5857-4685-be1f-d57550cc96cc">false</MachineTranslated>
+    <OriginalSourceMarket xmlns="4873beb7-5857-4685-be1f-d57550cc96cc" xsi:nil="true"/>
+    <APDescription xmlns="4873beb7-5857-4685-be1f-d57550cc96cc" xsi:nil="true"/>
+    <ClipArtFilename xmlns="4873beb7-5857-4685-be1f-d57550cc96cc" xsi:nil="true"/>
+    <ContentItem xmlns="4873beb7-5857-4685-be1f-d57550cc96cc" xsi:nil="true"/>
+    <TPInstallLocation xmlns="4873beb7-5857-4685-be1f-d57550cc96cc" xsi:nil="true"/>
+    <PublishTargets xmlns="4873beb7-5857-4685-be1f-d57550cc96cc">OfficeOnlineVNext</PublishTargets>
+    <TimesCloned xmlns="4873beb7-5857-4685-be1f-d57550cc96cc" xsi:nil="true"/>
+    <AssetStart xmlns="4873beb7-5857-4685-be1f-d57550cc96cc">2012-05-23T08:44:00+00:00</AssetStart>
+    <Provider xmlns="4873beb7-5857-4685-be1f-d57550cc96cc" xsi:nil="true"/>
+    <AcquiredFrom xmlns="4873beb7-5857-4685-be1f-d57550cc96cc">Internal MS</AcquiredFrom>
+    <FriendlyTitle xmlns="4873beb7-5857-4685-be1f-d57550cc96cc" xsi:nil="true"/>
+    <LastHandOff xmlns="4873beb7-5857-4685-be1f-d57550cc96cc" xsi:nil="true"/>
+    <TPClientViewer xmlns="4873beb7-5857-4685-be1f-d57550cc96cc" xsi:nil="true"/>
+    <UACurrentWords xmlns="4873beb7-5857-4685-be1f-d57550cc96cc" xsi:nil="true"/>
+    <ArtSampleDocs xmlns="4873beb7-5857-4685-be1f-d57550cc96cc" xsi:nil="true"/>
+    <UALocRecommendation xmlns="4873beb7-5857-4685-be1f-d57550cc96cc">Localize</UALocRecommendation>
+    <Manager xmlns="4873beb7-5857-4685-be1f-d57550cc96cc" xsi:nil="true"/>
+    <ShowIn xmlns="4873beb7-5857-4685-be1f-d57550cc96cc">Show everywhere</ShowIn>
+    <UANotes xmlns="4873beb7-5857-4685-be1f-d57550cc96cc" xsi:nil="true"/>
+    <TemplateStatus xmlns="4873beb7-5857-4685-be1f-d57550cc96cc">Complete</TemplateStatus>
+    <InternalTagsTaxHTField0 xmlns="4873beb7-5857-4685-be1f-d57550cc96cc">
+      <Terms xmlns="http://schemas.microsoft.com/office/infopath/2007/PartnerControls"/>
+    </InternalTagsTaxHTField0>
+    <CSXHash xmlns="4873beb7-5857-4685-be1f-d57550cc96cc" xsi:nil="true"/>
+    <Downloads xmlns="4873beb7-5857-4685-be1f-d57550cc96cc">0</Downloads>
+    <VoteCount xmlns="4873beb7-5857-4685-be1f-d57550cc96cc" xsi:nil="true"/>
+    <OOCacheId xmlns="4873beb7-5857-4685-be1f-d57550cc96cc" xsi:nil="true"/>
+    <IsDeleted xmlns="4873beb7-5857-4685-be1f-d57550cc96cc">false</IsDeleted>
+    <AssetExpire xmlns="4873beb7-5857-4685-be1f-d57550cc96cc">2029-01-01T08:00:00+00:00</AssetExpire>
+    <DSATActionTaken xmlns="4873beb7-5857-4685-be1f-d57550cc96cc" xsi:nil="true"/>
+    <CSXSubmissionMarket xmlns="4873beb7-5857-4685-be1f-d57550cc96cc" xsi:nil="true"/>
+    <TPExecutable xmlns="4873beb7-5857-4685-be1f-d57550cc96cc" xsi:nil="true"/>
+    <SubmitterId xmlns="4873beb7-5857-4685-be1f-d57550cc96cc" xsi:nil="true"/>
+    <EditorialTags xmlns="4873beb7-5857-4685-be1f-d57550cc96cc" xsi:nil="true"/>
+    <ApprovalLog xmlns="4873beb7-5857-4685-be1f-d57550cc96cc" xsi:nil="true"/>
+    <AssetType xmlns="4873beb7-5857-4685-be1f-d57550cc96cc">TP</AssetType>
+    <BugNumber xmlns="4873beb7-5857-4685-be1f-d57550cc96cc" xsi:nil="true"/>
+    <CSXSubmissionDate xmlns="4873beb7-5857-4685-be1f-d57550cc96cc" xsi:nil="true"/>
+    <CSXUpdate xmlns="4873beb7-5857-4685-be1f-d57550cc96cc">false</CSXUpdate>
+    <Milestone xmlns="4873beb7-5857-4685-be1f-d57550cc96cc" xsi:nil="true"/>
+    <RecommendationsModifier xmlns="4873beb7-5857-4685-be1f-d57550cc96cc" xsi:nil="true"/>
+    <OriginAsset xmlns="4873beb7-5857-4685-be1f-d57550cc96cc" xsi:nil="true"/>
+    <TPComponent xmlns="4873beb7-5857-4685-be1f-d57550cc96cc" xsi:nil="true"/>
+    <AssetId xmlns="4873beb7-5857-4685-be1f-d57550cc96cc">TP102901017</AssetId>
+    <IntlLocPriority xmlns="4873beb7-5857-4685-be1f-d57550cc96cc" xsi:nil="true"/>
+    <PolicheckWords xmlns="4873beb7-5857-4685-be1f-d57550cc96cc" xsi:nil="true"/>
+    <TPLaunchHelpLink xmlns="4873beb7-5857-4685-be1f-d57550cc96cc" xsi:nil="true"/>
+    <TPApplication xmlns="4873beb7-5857-4685-be1f-d57550cc96cc" xsi:nil="true"/>
+    <CrawlForDependencies xmlns="4873beb7-5857-4685-be1f-d57550cc96cc">false</CrawlForDependencies>
+    <HandoffToMSDN xmlns="4873beb7-5857-4685-be1f-d57550cc96cc" xsi:nil="true"/>
+    <PlannedPubDate xmlns="4873beb7-5857-4685-be1f-d57550cc96cc" xsi:nil="true"/>
+    <IntlLangReviewer xmlns="4873beb7-5857-4685-be1f-d57550cc96cc" xsi:nil="true"/>
+    <TrustLevel xmlns="4873beb7-5857-4685-be1f-d57550cc96cc">1 Microsoft Managed Content</TrustLevel>
+    <LocLastLocAttemptVersionLookup xmlns="4873beb7-5857-4685-be1f-d57550cc96cc">836753</LocLastLocAttemptVersionLookup>
+    <IsSearchable xmlns="4873beb7-5857-4685-be1f-d57550cc96cc">true</IsSearchable>
+    <TemplateTemplateType xmlns="4873beb7-5857-4685-be1f-d57550cc96cc">PowerPoint Design Template</TemplateTemplateType>
+    <CampaignTagsTaxHTField0 xmlns="4873beb7-5857-4685-be1f-d57550cc96cc">
+      <Terms xmlns="http://schemas.microsoft.com/office/infopath/2007/PartnerControls"/>
+    </CampaignTagsTaxHTField0>
+    <TPNamespace xmlns="4873beb7-5857-4685-be1f-d57550cc96cc" xsi:nil="true"/>
+    <TaxCatchAll xmlns="4873beb7-5857-4685-be1f-d57550cc96cc"/>
+    <Markets xmlns="4873beb7-5857-4685-be1f-d57550cc96cc"/>
+    <UAProjectedTotalWords xmlns="4873beb7-5857-4685-be1f-d57550cc96cc" xsi:nil="true"/>
+    <IntlLangReview xmlns="4873beb7-5857-4685-be1f-d57550cc96cc">false</IntlLangReview>
+    <OutputCachingOn xmlns="4873beb7-5857-4685-be1f-d57550cc96cc">false</OutputCachingOn>
+    <AverageRating xmlns="4873beb7-5857-4685-be1f-d57550cc96cc" xsi:nil="true"/>
+    <APAuthor xmlns="4873beb7-5857-4685-be1f-d57550cc96cc">
+      <UserInfo>
+        <DisplayName>REDMOND\v-anij</DisplayName>
+        <AccountId>2469</AccountId>
+        <AccountType/>
+      </UserInfo>
+    </APAuthor>
+    <LocManualTestRequired xmlns="4873beb7-5857-4685-be1f-d57550cc96cc">false</LocManualTestRequired>
+    <TPCommandLine xmlns="4873beb7-5857-4685-be1f-d57550cc96cc" xsi:nil="true"/>
+    <TPAppVersion xmlns="4873beb7-5857-4685-be1f-d57550cc96cc" xsi:nil="true"/>
+    <EditorialStatus xmlns="4873beb7-5857-4685-be1f-d57550cc96cc">Complete</EditorialStatus>
+    <LastModifiedDateTime xmlns="4873beb7-5857-4685-be1f-d57550cc96cc" xsi:nil="true"/>
+    <ScenarioTagsTaxHTField0 xmlns="4873beb7-5857-4685-be1f-d57550cc96cc">
+      <Terms xmlns="http://schemas.microsoft.com/office/infopath/2007/PartnerControls"/>
+    </ScenarioTagsTaxHTField0>
+    <OriginalRelease xmlns="4873beb7-5857-4685-be1f-d57550cc96cc">15</OriginalRelease>
+    <TPLaunchHelpLinkType xmlns="4873beb7-5857-4685-be1f-d57550cc96cc">Template</TPLaunchHelpLinkType>
+    <LocalizationTagsTaxHTField0 xmlns="4873beb7-5857-4685-be1f-d57550cc96cc">
+      <Terms xmlns="http://schemas.microsoft.com/office/infopath/2007/PartnerControls"/>
+    </LocalizationTagsTaxHTField0>
+    <LocMarketGroupTiers2 xmlns="4873beb7-5857-4685-be1f-d57550cc96cc" xsi:nil="true"/>
+  </documentManagement>
+</p:properties>
+</file>
+
+<file path=customXml/item3.xml><?xml version="1.0" encoding="utf-8"?>
 <ct:contentTypeSchema xmlns:ct="http://schemas.microsoft.com/office/2006/metadata/contentType" xmlns:ma="http://schemas.microsoft.com/office/2006/metadata/properties/metaAttributes" ct:_="" ma:_="" ma:contentTypeName="TemplateFile" ma:contentTypeID="0x0101006EDDDB5EE6D98C44930B742096920B300400F5B6D36B3EF94B4E9A635CDF2A18F5B8" ma:contentTypeVersion="72" ma:contentTypeDescription="Create a new document." ma:contentTypeScope="" ma:versionID="a23e56308344d904b51738559c3d67c9">
   <xsd:schema xmlns:xsd="http://www.w3.org/2001/XMLSchema" xmlns:xs="http://www.w3.org/2001/XMLSchema" xmlns:p="http://schemas.microsoft.com/office/2006/metadata/properties" xmlns:ns2="4873beb7-5857-4685-be1f-d57550cc96cc" targetNamespace="http://schemas.microsoft.com/office/2006/metadata/properties" ma:root="true" ma:fieldsID="cd0908cc4600e77bf5da051303e00c8d" ns2:_="">
     <xsd:import namespace="4873beb7-5857-4685-be1f-d57550cc96cc"/>
@@ -6830,132 +7045,6 @@
 </ct:contentTypeSchema>
 </file>
 
-<file path=customXml/item3.xml><?xml version="1.0" encoding="utf-8"?>
-<p:properties xmlns:p="http://schemas.microsoft.com/office/2006/metadata/properties" xmlns:xsi="http://www.w3.org/2001/XMLSchema-instance" xmlns:pc="http://schemas.microsoft.com/office/infopath/2007/PartnerControls">
-  <documentManagement>
-    <DirectSourceMarket xmlns="4873beb7-5857-4685-be1f-d57550cc96cc" xsi:nil="true"/>
-    <ApprovalStatus xmlns="4873beb7-5857-4685-be1f-d57550cc96cc">InProgress</ApprovalStatus>
-    <MarketSpecific xmlns="4873beb7-5857-4685-be1f-d57550cc96cc">false</MarketSpecific>
-    <LocComments xmlns="4873beb7-5857-4685-be1f-d57550cc96cc" xsi:nil="true"/>
-    <ThumbnailAssetId xmlns="4873beb7-5857-4685-be1f-d57550cc96cc" xsi:nil="true"/>
-    <PrimaryImageGen xmlns="4873beb7-5857-4685-be1f-d57550cc96cc">true</PrimaryImageGen>
-    <LegacyData xmlns="4873beb7-5857-4685-be1f-d57550cc96cc" xsi:nil="true"/>
-    <LocRecommendedHandoff xmlns="4873beb7-5857-4685-be1f-d57550cc96cc" xsi:nil="true"/>
-    <BusinessGroup xmlns="4873beb7-5857-4685-be1f-d57550cc96cc" xsi:nil="true"/>
-    <BlockPublish xmlns="4873beb7-5857-4685-be1f-d57550cc96cc">false</BlockPublish>
-    <TPFriendlyName xmlns="4873beb7-5857-4685-be1f-d57550cc96cc" xsi:nil="true"/>
-    <NumericId xmlns="4873beb7-5857-4685-be1f-d57550cc96cc" xsi:nil="true"/>
-    <APEditor xmlns="4873beb7-5857-4685-be1f-d57550cc96cc">
-      <UserInfo>
-        <DisplayName/>
-        <AccountId xsi:nil="true"/>
-        <AccountType/>
-      </UserInfo>
-    </APEditor>
-    <SourceTitle xmlns="4873beb7-5857-4685-be1f-d57550cc96cc" xsi:nil="true"/>
-    <OpenTemplate xmlns="4873beb7-5857-4685-be1f-d57550cc96cc">true</OpenTemplate>
-    <UALocComments xmlns="4873beb7-5857-4685-be1f-d57550cc96cc" xsi:nil="true"/>
-    <ParentAssetId xmlns="4873beb7-5857-4685-be1f-d57550cc96cc" xsi:nil="true"/>
-    <IntlLangReviewDate xmlns="4873beb7-5857-4685-be1f-d57550cc96cc" xsi:nil="true"/>
-    <FeatureTagsTaxHTField0 xmlns="4873beb7-5857-4685-be1f-d57550cc96cc">
-      <Terms xmlns="http://schemas.microsoft.com/office/infopath/2007/PartnerControls"/>
-    </FeatureTagsTaxHTField0>
-    <PublishStatusLookup xmlns="4873beb7-5857-4685-be1f-d57550cc96cc">
-      <Value>1566889</Value>
-    </PublishStatusLookup>
-    <Providers xmlns="4873beb7-5857-4685-be1f-d57550cc96cc" xsi:nil="true"/>
-    <MachineTranslated xmlns="4873beb7-5857-4685-be1f-d57550cc96cc">false</MachineTranslated>
-    <OriginalSourceMarket xmlns="4873beb7-5857-4685-be1f-d57550cc96cc" xsi:nil="true"/>
-    <APDescription xmlns="4873beb7-5857-4685-be1f-d57550cc96cc" xsi:nil="true"/>
-    <ClipArtFilename xmlns="4873beb7-5857-4685-be1f-d57550cc96cc" xsi:nil="true"/>
-    <ContentItem xmlns="4873beb7-5857-4685-be1f-d57550cc96cc" xsi:nil="true"/>
-    <TPInstallLocation xmlns="4873beb7-5857-4685-be1f-d57550cc96cc" xsi:nil="true"/>
-    <PublishTargets xmlns="4873beb7-5857-4685-be1f-d57550cc96cc">OfficeOnlineVNext</PublishTargets>
-    <TimesCloned xmlns="4873beb7-5857-4685-be1f-d57550cc96cc" xsi:nil="true"/>
-    <AssetStart xmlns="4873beb7-5857-4685-be1f-d57550cc96cc">2012-05-23T08:44:00+00:00</AssetStart>
-    <Provider xmlns="4873beb7-5857-4685-be1f-d57550cc96cc" xsi:nil="true"/>
-    <AcquiredFrom xmlns="4873beb7-5857-4685-be1f-d57550cc96cc">Internal MS</AcquiredFrom>
-    <FriendlyTitle xmlns="4873beb7-5857-4685-be1f-d57550cc96cc" xsi:nil="true"/>
-    <LastHandOff xmlns="4873beb7-5857-4685-be1f-d57550cc96cc" xsi:nil="true"/>
-    <TPClientViewer xmlns="4873beb7-5857-4685-be1f-d57550cc96cc" xsi:nil="true"/>
-    <UACurrentWords xmlns="4873beb7-5857-4685-be1f-d57550cc96cc" xsi:nil="true"/>
-    <ArtSampleDocs xmlns="4873beb7-5857-4685-be1f-d57550cc96cc" xsi:nil="true"/>
-    <UALocRecommendation xmlns="4873beb7-5857-4685-be1f-d57550cc96cc">Localize</UALocRecommendation>
-    <Manager xmlns="4873beb7-5857-4685-be1f-d57550cc96cc" xsi:nil="true"/>
-    <ShowIn xmlns="4873beb7-5857-4685-be1f-d57550cc96cc">Show everywhere</ShowIn>
-    <UANotes xmlns="4873beb7-5857-4685-be1f-d57550cc96cc" xsi:nil="true"/>
-    <TemplateStatus xmlns="4873beb7-5857-4685-be1f-d57550cc96cc">Complete</TemplateStatus>
-    <InternalTagsTaxHTField0 xmlns="4873beb7-5857-4685-be1f-d57550cc96cc">
-      <Terms xmlns="http://schemas.microsoft.com/office/infopath/2007/PartnerControls"/>
-    </InternalTagsTaxHTField0>
-    <CSXHash xmlns="4873beb7-5857-4685-be1f-d57550cc96cc" xsi:nil="true"/>
-    <Downloads xmlns="4873beb7-5857-4685-be1f-d57550cc96cc">0</Downloads>
-    <VoteCount xmlns="4873beb7-5857-4685-be1f-d57550cc96cc" xsi:nil="true"/>
-    <OOCacheId xmlns="4873beb7-5857-4685-be1f-d57550cc96cc" xsi:nil="true"/>
-    <IsDeleted xmlns="4873beb7-5857-4685-be1f-d57550cc96cc">false</IsDeleted>
-    <AssetExpire xmlns="4873beb7-5857-4685-be1f-d57550cc96cc">2029-01-01T08:00:00+00:00</AssetExpire>
-    <DSATActionTaken xmlns="4873beb7-5857-4685-be1f-d57550cc96cc" xsi:nil="true"/>
-    <CSXSubmissionMarket xmlns="4873beb7-5857-4685-be1f-d57550cc96cc" xsi:nil="true"/>
-    <TPExecutable xmlns="4873beb7-5857-4685-be1f-d57550cc96cc" xsi:nil="true"/>
-    <SubmitterId xmlns="4873beb7-5857-4685-be1f-d57550cc96cc" xsi:nil="true"/>
-    <EditorialTags xmlns="4873beb7-5857-4685-be1f-d57550cc96cc" xsi:nil="true"/>
-    <ApprovalLog xmlns="4873beb7-5857-4685-be1f-d57550cc96cc" xsi:nil="true"/>
-    <AssetType xmlns="4873beb7-5857-4685-be1f-d57550cc96cc">TP</AssetType>
-    <BugNumber xmlns="4873beb7-5857-4685-be1f-d57550cc96cc" xsi:nil="true"/>
-    <CSXSubmissionDate xmlns="4873beb7-5857-4685-be1f-d57550cc96cc" xsi:nil="true"/>
-    <CSXUpdate xmlns="4873beb7-5857-4685-be1f-d57550cc96cc">false</CSXUpdate>
-    <Milestone xmlns="4873beb7-5857-4685-be1f-d57550cc96cc" xsi:nil="true"/>
-    <RecommendationsModifier xmlns="4873beb7-5857-4685-be1f-d57550cc96cc" xsi:nil="true"/>
-    <OriginAsset xmlns="4873beb7-5857-4685-be1f-d57550cc96cc" xsi:nil="true"/>
-    <TPComponent xmlns="4873beb7-5857-4685-be1f-d57550cc96cc" xsi:nil="true"/>
-    <AssetId xmlns="4873beb7-5857-4685-be1f-d57550cc96cc">TP102901017</AssetId>
-    <IntlLocPriority xmlns="4873beb7-5857-4685-be1f-d57550cc96cc" xsi:nil="true"/>
-    <PolicheckWords xmlns="4873beb7-5857-4685-be1f-d57550cc96cc" xsi:nil="true"/>
-    <TPLaunchHelpLink xmlns="4873beb7-5857-4685-be1f-d57550cc96cc" xsi:nil="true"/>
-    <TPApplication xmlns="4873beb7-5857-4685-be1f-d57550cc96cc" xsi:nil="true"/>
-    <CrawlForDependencies xmlns="4873beb7-5857-4685-be1f-d57550cc96cc">false</CrawlForDependencies>
-    <HandoffToMSDN xmlns="4873beb7-5857-4685-be1f-d57550cc96cc" xsi:nil="true"/>
-    <PlannedPubDate xmlns="4873beb7-5857-4685-be1f-d57550cc96cc" xsi:nil="true"/>
-    <IntlLangReviewer xmlns="4873beb7-5857-4685-be1f-d57550cc96cc" xsi:nil="true"/>
-    <TrustLevel xmlns="4873beb7-5857-4685-be1f-d57550cc96cc">1 Microsoft Managed Content</TrustLevel>
-    <LocLastLocAttemptVersionLookup xmlns="4873beb7-5857-4685-be1f-d57550cc96cc">836753</LocLastLocAttemptVersionLookup>
-    <IsSearchable xmlns="4873beb7-5857-4685-be1f-d57550cc96cc">true</IsSearchable>
-    <TemplateTemplateType xmlns="4873beb7-5857-4685-be1f-d57550cc96cc">PowerPoint Design Template</TemplateTemplateType>
-    <CampaignTagsTaxHTField0 xmlns="4873beb7-5857-4685-be1f-d57550cc96cc">
-      <Terms xmlns="http://schemas.microsoft.com/office/infopath/2007/PartnerControls"/>
-    </CampaignTagsTaxHTField0>
-    <TPNamespace xmlns="4873beb7-5857-4685-be1f-d57550cc96cc" xsi:nil="true"/>
-    <TaxCatchAll xmlns="4873beb7-5857-4685-be1f-d57550cc96cc"/>
-    <Markets xmlns="4873beb7-5857-4685-be1f-d57550cc96cc"/>
-    <UAProjectedTotalWords xmlns="4873beb7-5857-4685-be1f-d57550cc96cc" xsi:nil="true"/>
-    <IntlLangReview xmlns="4873beb7-5857-4685-be1f-d57550cc96cc">false</IntlLangReview>
-    <OutputCachingOn xmlns="4873beb7-5857-4685-be1f-d57550cc96cc">false</OutputCachingOn>
-    <AverageRating xmlns="4873beb7-5857-4685-be1f-d57550cc96cc" xsi:nil="true"/>
-    <APAuthor xmlns="4873beb7-5857-4685-be1f-d57550cc96cc">
-      <UserInfo>
-        <DisplayName>REDMOND\v-anij</DisplayName>
-        <AccountId>2469</AccountId>
-        <AccountType/>
-      </UserInfo>
-    </APAuthor>
-    <LocManualTestRequired xmlns="4873beb7-5857-4685-be1f-d57550cc96cc">false</LocManualTestRequired>
-    <TPCommandLine xmlns="4873beb7-5857-4685-be1f-d57550cc96cc" xsi:nil="true"/>
-    <TPAppVersion xmlns="4873beb7-5857-4685-be1f-d57550cc96cc" xsi:nil="true"/>
-    <EditorialStatus xmlns="4873beb7-5857-4685-be1f-d57550cc96cc">Complete</EditorialStatus>
-    <LastModifiedDateTime xmlns="4873beb7-5857-4685-be1f-d57550cc96cc" xsi:nil="true"/>
-    <ScenarioTagsTaxHTField0 xmlns="4873beb7-5857-4685-be1f-d57550cc96cc">
-      <Terms xmlns="http://schemas.microsoft.com/office/infopath/2007/PartnerControls"/>
-    </ScenarioTagsTaxHTField0>
-    <OriginalRelease xmlns="4873beb7-5857-4685-be1f-d57550cc96cc">15</OriginalRelease>
-    <TPLaunchHelpLinkType xmlns="4873beb7-5857-4685-be1f-d57550cc96cc">Template</TPLaunchHelpLinkType>
-    <LocalizationTagsTaxHTField0 xmlns="4873beb7-5857-4685-be1f-d57550cc96cc">
-      <Terms xmlns="http://schemas.microsoft.com/office/infopath/2007/PartnerControls"/>
-    </LocalizationTagsTaxHTField0>
-    <LocMarketGroupTiers2 xmlns="4873beb7-5857-4685-be1f-d57550cc96cc" xsi:nil="true"/>
-  </documentManagement>
-</p:properties>
-</file>
-
 <file path=customXml/itemProps1.xml><?xml version="1.0" encoding="utf-8"?>
 <ds:datastoreItem xmlns:ds="http://schemas.openxmlformats.org/officeDocument/2006/customXml" ds:itemID="{746CFF6F-D9AA-4BC0-911A-0A1356771912}">
   <ds:schemaRefs>
@@ -6965,6 +7054,22 @@
 </file>
 
 <file path=customXml/itemProps2.xml><?xml version="1.0" encoding="utf-8"?>
+<ds:datastoreItem xmlns:ds="http://schemas.openxmlformats.org/officeDocument/2006/customXml" ds:itemID="{04098515-0C12-46CF-BC7C-69B4A13CD5FA}">
+  <ds:schemaRefs>
+    <ds:schemaRef ds:uri="http://schemas.microsoft.com/office/infopath/2007/PartnerControls"/>
+    <ds:schemaRef ds:uri="http://purl.org/dc/elements/1.1/"/>
+    <ds:schemaRef ds:uri="http://purl.org/dc/terms/"/>
+    <ds:schemaRef ds:uri="http://schemas.microsoft.com/office/2006/documentManagement/types"/>
+    <ds:schemaRef ds:uri="http://purl.org/dc/dcmitype/"/>
+    <ds:schemaRef ds:uri="4873beb7-5857-4685-be1f-d57550cc96cc"/>
+    <ds:schemaRef ds:uri="http://schemas.openxmlformats.org/package/2006/metadata/core-properties"/>
+    <ds:schemaRef ds:uri="http://schemas.microsoft.com/office/2006/metadata/properties"/>
+    <ds:schemaRef ds:uri="http://www.w3.org/XML/1998/namespace"/>
+  </ds:schemaRefs>
+</ds:datastoreItem>
+</file>
+
+<file path=customXml/itemProps3.xml><?xml version="1.0" encoding="utf-8"?>
 <ds:datastoreItem xmlns:ds="http://schemas.openxmlformats.org/officeDocument/2006/customXml" ds:itemID="{0B5C6E15-39DC-470B-9445-F754B9458020}">
   <ds:schemaRefs>
     <ds:schemaRef ds:uri="http://schemas.microsoft.com/office/2006/metadata/contentType"/>
@@ -6980,20 +7085,4 @@
     <ds:schemaRef ds:uri="http://schemas.microsoft.com/internal/obd"/>
   </ds:schemaRefs>
 </ds:datastoreItem>
-</file>
-
-<file path=customXml/itemProps3.xml><?xml version="1.0" encoding="utf-8"?>
-<ds:datastoreItem xmlns:ds="http://schemas.openxmlformats.org/officeDocument/2006/customXml" ds:itemID="{04098515-0C12-46CF-BC7C-69B4A13CD5FA}">
-  <ds:schemaRefs>
-    <ds:schemaRef ds:uri="http://schemas.microsoft.com/office/infopath/2007/PartnerControls"/>
-    <ds:schemaRef ds:uri="http://purl.org/dc/elements/1.1/"/>
-    <ds:schemaRef ds:uri="http://purl.org/dc/terms/"/>
-    <ds:schemaRef ds:uri="http://schemas.microsoft.com/office/2006/documentManagement/types"/>
-    <ds:schemaRef ds:uri="http://purl.org/dc/dcmitype/"/>
-    <ds:schemaRef ds:uri="4873beb7-5857-4685-be1f-d57550cc96cc"/>
-    <ds:schemaRef ds:uri="http://schemas.openxmlformats.org/package/2006/metadata/core-properties"/>
-    <ds:schemaRef ds:uri="http://schemas.microsoft.com/office/2006/metadata/properties"/>
-    <ds:schemaRef ds:uri="http://www.w3.org/XML/1998/namespace"/>
-  </ds:schemaRefs>
-</ds:datastoreItem>
 </file>
</xml_diff>

<commit_message>
Updated PP GitKraken Merging
</commit_message>
<xml_diff>
--- a/GIT HUB Branching & Merging.pptx
+++ b/GIT HUB Branching & Merging.pptx
@@ -5,10 +5,10 @@
     <p:sldMasterId id="2147483648" r:id="rId4"/>
   </p:sldMasterIdLst>
   <p:notesMasterIdLst>
-    <p:notesMasterId r:id="rId13"/>
+    <p:notesMasterId r:id="rId14"/>
   </p:notesMasterIdLst>
   <p:handoutMasterIdLst>
-    <p:handoutMasterId r:id="rId14"/>
+    <p:handoutMasterId r:id="rId15"/>
   </p:handoutMasterIdLst>
   <p:sldIdLst>
     <p:sldId id="256" r:id="rId5"/>
@@ -19,6 +19,7 @@
     <p:sldId id="264" r:id="rId10"/>
     <p:sldId id="265" r:id="rId11"/>
     <p:sldId id="266" r:id="rId12"/>
+    <p:sldId id="267" r:id="rId13"/>
   </p:sldIdLst>
   <p:sldSz cx="12192000" cy="6858000"/>
   <p:notesSz cx="6858000" cy="9144000"/>
@@ -4941,13 +4942,8 @@
           <a:p>
             <a:r>
               <a:rPr lang="en-US" dirty="0"/>
-              <a:t>You can now begin working on your branch files just as you would the master. As you add or change your files you can stage and commit your changes to </a:t>
-            </a:r>
-            <a:r>
-              <a:rPr lang="en-US"/>
-              <a:t>your branch.</a:t>
-            </a:r>
-            <a:endParaRPr lang="en-US" dirty="0"/>
+              <a:t>You can now begin working on your branch files just as you would the master. As you add or change your files you can stage, commit, and push the changes.</a:t>
+            </a:r>
           </a:p>
         </p:txBody>
       </p:sp>
@@ -5032,9 +5028,16 @@
             <p:ph type="title"/>
           </p:nvPr>
         </p:nvSpPr>
-        <p:spPr/>
-        <p:txBody>
-          <a:bodyPr/>
+        <p:spPr>
+          <a:xfrm>
+            <a:off x="1524000" y="457200"/>
+            <a:ext cx="9144000" cy="1447800"/>
+          </a:xfrm>
+        </p:spPr>
+        <p:txBody>
+          <a:bodyPr>
+            <a:normAutofit fontScale="90000"/>
+          </a:bodyPr>
           <a:lstStyle/>
           <a:p>
             <a:pPr algn="ctr"/>
@@ -5046,38 +5049,233 @@
               <a:rPr lang="en-US" dirty="0"/>
               <a:t> Graphical View</a:t>
             </a:r>
-          </a:p>
-        </p:txBody>
-      </p:sp>
-      <p:sp>
-        <p:nvSpPr>
-          <p:cNvPr id="7" name="Content Placeholder 6">
+            <a:br>
+              <a:rPr lang="en-US" dirty="0"/>
+            </a:br>
+            <a:br>
+              <a:rPr lang="en-US" dirty="0"/>
+            </a:br>
+            <a:r>
+              <a:rPr lang="en-US" sz="2200" dirty="0"/>
+              <a:t>(What you are seeing is </a:t>
+            </a:r>
+            <a:r>
+              <a:rPr lang="en-US" sz="2200" dirty="0" err="1"/>
+              <a:t>Adam’sPPEdits</a:t>
+            </a:r>
+            <a:r>
+              <a:rPr lang="en-US" sz="2200" dirty="0"/>
+              <a:t> branch and the 3 commits I have made since I branched off of the master.)</a:t>
+            </a:r>
+          </a:p>
+        </p:txBody>
+      </p:sp>
+      <p:pic>
+        <p:nvPicPr>
+          <p:cNvPr id="4" name="Content Placeholder 3">
             <a:extLst>
               <a:ext uri="{FF2B5EF4-FFF2-40B4-BE49-F238E27FC236}">
-                <a16:creationId xmlns:a16="http://schemas.microsoft.com/office/drawing/2014/main" id="{284A6674-E1D2-4B92-943F-0B0053C38578}"/>
+                <a16:creationId xmlns:a16="http://schemas.microsoft.com/office/drawing/2014/main" id="{33C60259-C6EC-4CBD-9D06-1667A0B47C47}"/>
               </a:ext>
             </a:extLst>
           </p:cNvPr>
-          <p:cNvSpPr>
-            <a:spLocks noGrp="1"/>
-          </p:cNvSpPr>
+          <p:cNvPicPr>
+            <a:picLocks noGrp="1" noChangeAspect="1"/>
+          </p:cNvPicPr>
           <p:nvPr>
             <p:ph idx="1"/>
           </p:nvPr>
-        </p:nvSpPr>
-        <p:spPr/>
-        <p:txBody>
-          <a:bodyPr/>
-          <a:lstStyle/>
-          <a:p>
-            <a:endParaRPr lang="en-US"/>
-          </a:p>
-        </p:txBody>
-      </p:sp>
+        </p:nvPicPr>
+        <p:blipFill>
+          <a:blip r:embed="rId2">
+            <a:extLst>
+              <a:ext uri="{28A0092B-C50C-407E-A947-70E740481C1C}">
+                <a14:useLocalDpi xmlns:a14="http://schemas.microsoft.com/office/drawing/2010/main" val="0"/>
+              </a:ext>
+            </a:extLst>
+          </a:blip>
+          <a:stretch>
+            <a:fillRect/>
+          </a:stretch>
+        </p:blipFill>
+        <p:spPr>
+          <a:xfrm>
+            <a:off x="1524000" y="2052692"/>
+            <a:ext cx="9144000" cy="4271908"/>
+          </a:xfrm>
+        </p:spPr>
+      </p:pic>
     </p:spTree>
     <p:extLst>
       <p:ext uri="{BB962C8B-B14F-4D97-AF65-F5344CB8AC3E}">
         <p14:creationId xmlns:p14="http://schemas.microsoft.com/office/powerpoint/2010/main" val="252953982"/>
+      </p:ext>
+    </p:extLst>
+  </p:cSld>
+  <p:clrMapOvr>
+    <a:masterClrMapping/>
+  </p:clrMapOvr>
+</p:sld>
+</file>
+
+<file path=ppt/slides/slide9.xml><?xml version="1.0" encoding="utf-8"?>
+<p:sld xmlns:a="http://schemas.openxmlformats.org/drawingml/2006/main" xmlns:r="http://schemas.openxmlformats.org/officeDocument/2006/relationships" xmlns:p="http://schemas.openxmlformats.org/presentationml/2006/main">
+  <p:cSld>
+    <p:spTree>
+      <p:nvGrpSpPr>
+        <p:cNvPr id="1" name=""/>
+        <p:cNvGrpSpPr/>
+        <p:nvPr/>
+      </p:nvGrpSpPr>
+      <p:grpSpPr>
+        <a:xfrm>
+          <a:off x="0" y="0"/>
+          <a:ext cx="0" cy="0"/>
+          <a:chOff x="0" y="0"/>
+          <a:chExt cx="0" cy="0"/>
+        </a:xfrm>
+      </p:grpSpPr>
+      <p:sp>
+        <p:nvSpPr>
+          <p:cNvPr id="2" name="Title 1">
+            <a:extLst>
+              <a:ext uri="{FF2B5EF4-FFF2-40B4-BE49-F238E27FC236}">
+                <a16:creationId xmlns:a16="http://schemas.microsoft.com/office/drawing/2014/main" id="{5C96DB72-0639-4ED4-A100-E05B93DD0606}"/>
+              </a:ext>
+            </a:extLst>
+          </p:cNvPr>
+          <p:cNvSpPr>
+            <a:spLocks noGrp="1"/>
+          </p:cNvSpPr>
+          <p:nvPr>
+            <p:ph type="title"/>
+          </p:nvPr>
+        </p:nvSpPr>
+        <p:spPr/>
+        <p:txBody>
+          <a:bodyPr/>
+          <a:lstStyle/>
+          <a:p>
+            <a:pPr algn="ctr"/>
+            <a:r>
+              <a:rPr lang="en-US" dirty="0"/>
+              <a:t>Merging with </a:t>
+            </a:r>
+            <a:r>
+              <a:rPr lang="en-US" dirty="0" err="1"/>
+              <a:t>GitKraken</a:t>
+            </a:r>
+            <a:endParaRPr lang="en-US" dirty="0"/>
+          </a:p>
+        </p:txBody>
+      </p:sp>
+      <p:pic>
+        <p:nvPicPr>
+          <p:cNvPr id="7" name="Content Placeholder 6">
+            <a:extLst>
+              <a:ext uri="{FF2B5EF4-FFF2-40B4-BE49-F238E27FC236}">
+                <a16:creationId xmlns:a16="http://schemas.microsoft.com/office/drawing/2014/main" id="{6EB51BF3-85D7-4E3A-8B24-B9F937B8E1CA}"/>
+              </a:ext>
+            </a:extLst>
+          </p:cNvPr>
+          <p:cNvPicPr>
+            <a:picLocks noGrp="1" noChangeAspect="1"/>
+          </p:cNvPicPr>
+          <p:nvPr>
+            <p:ph sz="half" idx="1"/>
+          </p:nvPr>
+        </p:nvPicPr>
+        <p:blipFill>
+          <a:blip r:embed="rId2">
+            <a:extLst>
+              <a:ext uri="{28A0092B-C50C-407E-A947-70E740481C1C}">
+                <a14:useLocalDpi xmlns:a14="http://schemas.microsoft.com/office/drawing/2010/main" val="0"/>
+              </a:ext>
+            </a:extLst>
+          </a:blip>
+          <a:stretch>
+            <a:fillRect/>
+          </a:stretch>
+        </p:blipFill>
+        <p:spPr>
+          <a:xfrm>
+            <a:off x="533400" y="1825625"/>
+            <a:ext cx="5068717" cy="4270375"/>
+          </a:xfrm>
+        </p:spPr>
+      </p:pic>
+      <p:sp>
+        <p:nvSpPr>
+          <p:cNvPr id="5" name="Content Placeholder 4">
+            <a:extLst>
+              <a:ext uri="{FF2B5EF4-FFF2-40B4-BE49-F238E27FC236}">
+                <a16:creationId xmlns:a16="http://schemas.microsoft.com/office/drawing/2014/main" id="{E3C4B1E4-3737-48F0-8B5A-A4E923CEB6B3}"/>
+              </a:ext>
+            </a:extLst>
+          </p:cNvPr>
+          <p:cNvSpPr>
+            <a:spLocks noGrp="1"/>
+          </p:cNvSpPr>
+          <p:nvPr>
+            <p:ph sz="half" idx="2"/>
+          </p:nvPr>
+        </p:nvSpPr>
+        <p:spPr>
+          <a:xfrm>
+            <a:off x="6324600" y="1825625"/>
+            <a:ext cx="5334000" cy="4270375"/>
+          </a:xfrm>
+        </p:spPr>
+        <p:txBody>
+          <a:bodyPr/>
+          <a:lstStyle/>
+          <a:p>
+            <a:r>
+              <a:rPr lang="en-US" dirty="0"/>
+              <a:t>Merging takes </a:t>
+            </a:r>
+            <a:r>
+              <a:rPr lang="en-US" i="1" dirty="0"/>
+              <a:t>differences </a:t>
+            </a:r>
+            <a:r>
+              <a:rPr lang="en-US" dirty="0"/>
+              <a:t>from another branch, and apply them to whichever branch you are currently working on.</a:t>
+            </a:r>
+          </a:p>
+          <a:p>
+            <a:r>
+              <a:rPr lang="en-US" dirty="0"/>
+              <a:t>This is accomplished by dragging one local branch into another branch. It should open a menu, from which you want to select ‘</a:t>
+            </a:r>
+            <a:r>
+              <a:rPr lang="en-US" i="1" dirty="0"/>
+              <a:t>Merge </a:t>
+            </a:r>
+            <a:r>
+              <a:rPr lang="en-US" i="1" dirty="0" err="1"/>
+              <a:t>branchX</a:t>
+            </a:r>
+            <a:r>
+              <a:rPr lang="en-US" i="1" dirty="0"/>
+              <a:t> into </a:t>
+            </a:r>
+            <a:r>
+              <a:rPr lang="en-US" i="1" dirty="0" err="1"/>
+              <a:t>branchY</a:t>
+            </a:r>
+            <a:r>
+              <a:rPr lang="en-US" i="1"/>
+              <a:t>.</a:t>
+            </a:r>
+            <a:endParaRPr lang="en-US" dirty="0"/>
+          </a:p>
+        </p:txBody>
+      </p:sp>
+    </p:spTree>
+    <p:extLst>
+      <p:ext uri="{BB962C8B-B14F-4D97-AF65-F5344CB8AC3E}">
+        <p14:creationId xmlns:p14="http://schemas.microsoft.com/office/powerpoint/2010/main" val="3040420738"/>
       </p:ext>
     </p:extLst>
   </p:cSld>
@@ -5880,132 +6078,6 @@
 </file>
 
 <file path=customXml/item2.xml><?xml version="1.0" encoding="utf-8"?>
-<p:properties xmlns:p="http://schemas.microsoft.com/office/2006/metadata/properties" xmlns:xsi="http://www.w3.org/2001/XMLSchema-instance" xmlns:pc="http://schemas.microsoft.com/office/infopath/2007/PartnerControls">
-  <documentManagement>
-    <DirectSourceMarket xmlns="4873beb7-5857-4685-be1f-d57550cc96cc" xsi:nil="true"/>
-    <ApprovalStatus xmlns="4873beb7-5857-4685-be1f-d57550cc96cc">InProgress</ApprovalStatus>
-    <MarketSpecific xmlns="4873beb7-5857-4685-be1f-d57550cc96cc">false</MarketSpecific>
-    <LocComments xmlns="4873beb7-5857-4685-be1f-d57550cc96cc" xsi:nil="true"/>
-    <ThumbnailAssetId xmlns="4873beb7-5857-4685-be1f-d57550cc96cc" xsi:nil="true"/>
-    <PrimaryImageGen xmlns="4873beb7-5857-4685-be1f-d57550cc96cc">true</PrimaryImageGen>
-    <LegacyData xmlns="4873beb7-5857-4685-be1f-d57550cc96cc" xsi:nil="true"/>
-    <LocRecommendedHandoff xmlns="4873beb7-5857-4685-be1f-d57550cc96cc" xsi:nil="true"/>
-    <BusinessGroup xmlns="4873beb7-5857-4685-be1f-d57550cc96cc" xsi:nil="true"/>
-    <BlockPublish xmlns="4873beb7-5857-4685-be1f-d57550cc96cc">false</BlockPublish>
-    <TPFriendlyName xmlns="4873beb7-5857-4685-be1f-d57550cc96cc" xsi:nil="true"/>
-    <NumericId xmlns="4873beb7-5857-4685-be1f-d57550cc96cc" xsi:nil="true"/>
-    <APEditor xmlns="4873beb7-5857-4685-be1f-d57550cc96cc">
-      <UserInfo>
-        <DisplayName/>
-        <AccountId xsi:nil="true"/>
-        <AccountType/>
-      </UserInfo>
-    </APEditor>
-    <SourceTitle xmlns="4873beb7-5857-4685-be1f-d57550cc96cc" xsi:nil="true"/>
-    <OpenTemplate xmlns="4873beb7-5857-4685-be1f-d57550cc96cc">true</OpenTemplate>
-    <UALocComments xmlns="4873beb7-5857-4685-be1f-d57550cc96cc" xsi:nil="true"/>
-    <ParentAssetId xmlns="4873beb7-5857-4685-be1f-d57550cc96cc" xsi:nil="true"/>
-    <IntlLangReviewDate xmlns="4873beb7-5857-4685-be1f-d57550cc96cc" xsi:nil="true"/>
-    <FeatureTagsTaxHTField0 xmlns="4873beb7-5857-4685-be1f-d57550cc96cc">
-      <Terms xmlns="http://schemas.microsoft.com/office/infopath/2007/PartnerControls"/>
-    </FeatureTagsTaxHTField0>
-    <PublishStatusLookup xmlns="4873beb7-5857-4685-be1f-d57550cc96cc">
-      <Value>1566889</Value>
-    </PublishStatusLookup>
-    <Providers xmlns="4873beb7-5857-4685-be1f-d57550cc96cc" xsi:nil="true"/>
-    <MachineTranslated xmlns="4873beb7-5857-4685-be1f-d57550cc96cc">false</MachineTranslated>
-    <OriginalSourceMarket xmlns="4873beb7-5857-4685-be1f-d57550cc96cc" xsi:nil="true"/>
-    <APDescription xmlns="4873beb7-5857-4685-be1f-d57550cc96cc" xsi:nil="true"/>
-    <ClipArtFilename xmlns="4873beb7-5857-4685-be1f-d57550cc96cc" xsi:nil="true"/>
-    <ContentItem xmlns="4873beb7-5857-4685-be1f-d57550cc96cc" xsi:nil="true"/>
-    <TPInstallLocation xmlns="4873beb7-5857-4685-be1f-d57550cc96cc" xsi:nil="true"/>
-    <PublishTargets xmlns="4873beb7-5857-4685-be1f-d57550cc96cc">OfficeOnlineVNext</PublishTargets>
-    <TimesCloned xmlns="4873beb7-5857-4685-be1f-d57550cc96cc" xsi:nil="true"/>
-    <AssetStart xmlns="4873beb7-5857-4685-be1f-d57550cc96cc">2012-05-23T08:44:00+00:00</AssetStart>
-    <Provider xmlns="4873beb7-5857-4685-be1f-d57550cc96cc" xsi:nil="true"/>
-    <AcquiredFrom xmlns="4873beb7-5857-4685-be1f-d57550cc96cc">Internal MS</AcquiredFrom>
-    <FriendlyTitle xmlns="4873beb7-5857-4685-be1f-d57550cc96cc" xsi:nil="true"/>
-    <LastHandOff xmlns="4873beb7-5857-4685-be1f-d57550cc96cc" xsi:nil="true"/>
-    <TPClientViewer xmlns="4873beb7-5857-4685-be1f-d57550cc96cc" xsi:nil="true"/>
-    <UACurrentWords xmlns="4873beb7-5857-4685-be1f-d57550cc96cc" xsi:nil="true"/>
-    <ArtSampleDocs xmlns="4873beb7-5857-4685-be1f-d57550cc96cc" xsi:nil="true"/>
-    <UALocRecommendation xmlns="4873beb7-5857-4685-be1f-d57550cc96cc">Localize</UALocRecommendation>
-    <Manager xmlns="4873beb7-5857-4685-be1f-d57550cc96cc" xsi:nil="true"/>
-    <ShowIn xmlns="4873beb7-5857-4685-be1f-d57550cc96cc">Show everywhere</ShowIn>
-    <UANotes xmlns="4873beb7-5857-4685-be1f-d57550cc96cc" xsi:nil="true"/>
-    <TemplateStatus xmlns="4873beb7-5857-4685-be1f-d57550cc96cc">Complete</TemplateStatus>
-    <InternalTagsTaxHTField0 xmlns="4873beb7-5857-4685-be1f-d57550cc96cc">
-      <Terms xmlns="http://schemas.microsoft.com/office/infopath/2007/PartnerControls"/>
-    </InternalTagsTaxHTField0>
-    <CSXHash xmlns="4873beb7-5857-4685-be1f-d57550cc96cc" xsi:nil="true"/>
-    <Downloads xmlns="4873beb7-5857-4685-be1f-d57550cc96cc">0</Downloads>
-    <VoteCount xmlns="4873beb7-5857-4685-be1f-d57550cc96cc" xsi:nil="true"/>
-    <OOCacheId xmlns="4873beb7-5857-4685-be1f-d57550cc96cc" xsi:nil="true"/>
-    <IsDeleted xmlns="4873beb7-5857-4685-be1f-d57550cc96cc">false</IsDeleted>
-    <AssetExpire xmlns="4873beb7-5857-4685-be1f-d57550cc96cc">2029-01-01T08:00:00+00:00</AssetExpire>
-    <DSATActionTaken xmlns="4873beb7-5857-4685-be1f-d57550cc96cc" xsi:nil="true"/>
-    <CSXSubmissionMarket xmlns="4873beb7-5857-4685-be1f-d57550cc96cc" xsi:nil="true"/>
-    <TPExecutable xmlns="4873beb7-5857-4685-be1f-d57550cc96cc" xsi:nil="true"/>
-    <SubmitterId xmlns="4873beb7-5857-4685-be1f-d57550cc96cc" xsi:nil="true"/>
-    <EditorialTags xmlns="4873beb7-5857-4685-be1f-d57550cc96cc" xsi:nil="true"/>
-    <ApprovalLog xmlns="4873beb7-5857-4685-be1f-d57550cc96cc" xsi:nil="true"/>
-    <AssetType xmlns="4873beb7-5857-4685-be1f-d57550cc96cc">TP</AssetType>
-    <BugNumber xmlns="4873beb7-5857-4685-be1f-d57550cc96cc" xsi:nil="true"/>
-    <CSXSubmissionDate xmlns="4873beb7-5857-4685-be1f-d57550cc96cc" xsi:nil="true"/>
-    <CSXUpdate xmlns="4873beb7-5857-4685-be1f-d57550cc96cc">false</CSXUpdate>
-    <Milestone xmlns="4873beb7-5857-4685-be1f-d57550cc96cc" xsi:nil="true"/>
-    <RecommendationsModifier xmlns="4873beb7-5857-4685-be1f-d57550cc96cc" xsi:nil="true"/>
-    <OriginAsset xmlns="4873beb7-5857-4685-be1f-d57550cc96cc" xsi:nil="true"/>
-    <TPComponent xmlns="4873beb7-5857-4685-be1f-d57550cc96cc" xsi:nil="true"/>
-    <AssetId xmlns="4873beb7-5857-4685-be1f-d57550cc96cc">TP102901017</AssetId>
-    <IntlLocPriority xmlns="4873beb7-5857-4685-be1f-d57550cc96cc" xsi:nil="true"/>
-    <PolicheckWords xmlns="4873beb7-5857-4685-be1f-d57550cc96cc" xsi:nil="true"/>
-    <TPLaunchHelpLink xmlns="4873beb7-5857-4685-be1f-d57550cc96cc" xsi:nil="true"/>
-    <TPApplication xmlns="4873beb7-5857-4685-be1f-d57550cc96cc" xsi:nil="true"/>
-    <CrawlForDependencies xmlns="4873beb7-5857-4685-be1f-d57550cc96cc">false</CrawlForDependencies>
-    <HandoffToMSDN xmlns="4873beb7-5857-4685-be1f-d57550cc96cc" xsi:nil="true"/>
-    <PlannedPubDate xmlns="4873beb7-5857-4685-be1f-d57550cc96cc" xsi:nil="true"/>
-    <IntlLangReviewer xmlns="4873beb7-5857-4685-be1f-d57550cc96cc" xsi:nil="true"/>
-    <TrustLevel xmlns="4873beb7-5857-4685-be1f-d57550cc96cc">1 Microsoft Managed Content</TrustLevel>
-    <LocLastLocAttemptVersionLookup xmlns="4873beb7-5857-4685-be1f-d57550cc96cc">836753</LocLastLocAttemptVersionLookup>
-    <IsSearchable xmlns="4873beb7-5857-4685-be1f-d57550cc96cc">true</IsSearchable>
-    <TemplateTemplateType xmlns="4873beb7-5857-4685-be1f-d57550cc96cc">PowerPoint Design Template</TemplateTemplateType>
-    <CampaignTagsTaxHTField0 xmlns="4873beb7-5857-4685-be1f-d57550cc96cc">
-      <Terms xmlns="http://schemas.microsoft.com/office/infopath/2007/PartnerControls"/>
-    </CampaignTagsTaxHTField0>
-    <TPNamespace xmlns="4873beb7-5857-4685-be1f-d57550cc96cc" xsi:nil="true"/>
-    <TaxCatchAll xmlns="4873beb7-5857-4685-be1f-d57550cc96cc"/>
-    <Markets xmlns="4873beb7-5857-4685-be1f-d57550cc96cc"/>
-    <UAProjectedTotalWords xmlns="4873beb7-5857-4685-be1f-d57550cc96cc" xsi:nil="true"/>
-    <IntlLangReview xmlns="4873beb7-5857-4685-be1f-d57550cc96cc">false</IntlLangReview>
-    <OutputCachingOn xmlns="4873beb7-5857-4685-be1f-d57550cc96cc">false</OutputCachingOn>
-    <AverageRating xmlns="4873beb7-5857-4685-be1f-d57550cc96cc" xsi:nil="true"/>
-    <APAuthor xmlns="4873beb7-5857-4685-be1f-d57550cc96cc">
-      <UserInfo>
-        <DisplayName>REDMOND\v-anij</DisplayName>
-        <AccountId>2469</AccountId>
-        <AccountType/>
-      </UserInfo>
-    </APAuthor>
-    <LocManualTestRequired xmlns="4873beb7-5857-4685-be1f-d57550cc96cc">false</LocManualTestRequired>
-    <TPCommandLine xmlns="4873beb7-5857-4685-be1f-d57550cc96cc" xsi:nil="true"/>
-    <TPAppVersion xmlns="4873beb7-5857-4685-be1f-d57550cc96cc" xsi:nil="true"/>
-    <EditorialStatus xmlns="4873beb7-5857-4685-be1f-d57550cc96cc">Complete</EditorialStatus>
-    <LastModifiedDateTime xmlns="4873beb7-5857-4685-be1f-d57550cc96cc" xsi:nil="true"/>
-    <ScenarioTagsTaxHTField0 xmlns="4873beb7-5857-4685-be1f-d57550cc96cc">
-      <Terms xmlns="http://schemas.microsoft.com/office/infopath/2007/PartnerControls"/>
-    </ScenarioTagsTaxHTField0>
-    <OriginalRelease xmlns="4873beb7-5857-4685-be1f-d57550cc96cc">15</OriginalRelease>
-    <TPLaunchHelpLinkType xmlns="4873beb7-5857-4685-be1f-d57550cc96cc">Template</TPLaunchHelpLinkType>
-    <LocalizationTagsTaxHTField0 xmlns="4873beb7-5857-4685-be1f-d57550cc96cc">
-      <Terms xmlns="http://schemas.microsoft.com/office/infopath/2007/PartnerControls"/>
-    </LocalizationTagsTaxHTField0>
-    <LocMarketGroupTiers2 xmlns="4873beb7-5857-4685-be1f-d57550cc96cc" xsi:nil="true"/>
-  </documentManagement>
-</p:properties>
-</file>
-
-<file path=customXml/item3.xml><?xml version="1.0" encoding="utf-8"?>
 <ct:contentTypeSchema xmlns:ct="http://schemas.microsoft.com/office/2006/metadata/contentType" xmlns:ma="http://schemas.microsoft.com/office/2006/metadata/properties/metaAttributes" ct:_="" ma:_="" ma:contentTypeName="TemplateFile" ma:contentTypeID="0x0101006EDDDB5EE6D98C44930B742096920B300400F5B6D36B3EF94B4E9A635CDF2A18F5B8" ma:contentTypeVersion="72" ma:contentTypeDescription="Create a new document." ma:contentTypeScope="" ma:versionID="a23e56308344d904b51738559c3d67c9">
   <xsd:schema xmlns:xsd="http://www.w3.org/2001/XMLSchema" xmlns:xs="http://www.w3.org/2001/XMLSchema" xmlns:p="http://schemas.microsoft.com/office/2006/metadata/properties" xmlns:ns2="4873beb7-5857-4685-be1f-d57550cc96cc" targetNamespace="http://schemas.microsoft.com/office/2006/metadata/properties" ma:root="true" ma:fieldsID="cd0908cc4600e77bf5da051303e00c8d" ns2:_="">
     <xsd:import namespace="4873beb7-5857-4685-be1f-d57550cc96cc"/>
@@ -7045,6 +7117,132 @@
 </ct:contentTypeSchema>
 </file>
 
+<file path=customXml/item3.xml><?xml version="1.0" encoding="utf-8"?>
+<p:properties xmlns:p="http://schemas.microsoft.com/office/2006/metadata/properties" xmlns:xsi="http://www.w3.org/2001/XMLSchema-instance" xmlns:pc="http://schemas.microsoft.com/office/infopath/2007/PartnerControls">
+  <documentManagement>
+    <DirectSourceMarket xmlns="4873beb7-5857-4685-be1f-d57550cc96cc" xsi:nil="true"/>
+    <ApprovalStatus xmlns="4873beb7-5857-4685-be1f-d57550cc96cc">InProgress</ApprovalStatus>
+    <MarketSpecific xmlns="4873beb7-5857-4685-be1f-d57550cc96cc">false</MarketSpecific>
+    <LocComments xmlns="4873beb7-5857-4685-be1f-d57550cc96cc" xsi:nil="true"/>
+    <ThumbnailAssetId xmlns="4873beb7-5857-4685-be1f-d57550cc96cc" xsi:nil="true"/>
+    <PrimaryImageGen xmlns="4873beb7-5857-4685-be1f-d57550cc96cc">true</PrimaryImageGen>
+    <LegacyData xmlns="4873beb7-5857-4685-be1f-d57550cc96cc" xsi:nil="true"/>
+    <LocRecommendedHandoff xmlns="4873beb7-5857-4685-be1f-d57550cc96cc" xsi:nil="true"/>
+    <BusinessGroup xmlns="4873beb7-5857-4685-be1f-d57550cc96cc" xsi:nil="true"/>
+    <BlockPublish xmlns="4873beb7-5857-4685-be1f-d57550cc96cc">false</BlockPublish>
+    <TPFriendlyName xmlns="4873beb7-5857-4685-be1f-d57550cc96cc" xsi:nil="true"/>
+    <NumericId xmlns="4873beb7-5857-4685-be1f-d57550cc96cc" xsi:nil="true"/>
+    <APEditor xmlns="4873beb7-5857-4685-be1f-d57550cc96cc">
+      <UserInfo>
+        <DisplayName/>
+        <AccountId xsi:nil="true"/>
+        <AccountType/>
+      </UserInfo>
+    </APEditor>
+    <SourceTitle xmlns="4873beb7-5857-4685-be1f-d57550cc96cc" xsi:nil="true"/>
+    <OpenTemplate xmlns="4873beb7-5857-4685-be1f-d57550cc96cc">true</OpenTemplate>
+    <UALocComments xmlns="4873beb7-5857-4685-be1f-d57550cc96cc" xsi:nil="true"/>
+    <ParentAssetId xmlns="4873beb7-5857-4685-be1f-d57550cc96cc" xsi:nil="true"/>
+    <IntlLangReviewDate xmlns="4873beb7-5857-4685-be1f-d57550cc96cc" xsi:nil="true"/>
+    <FeatureTagsTaxHTField0 xmlns="4873beb7-5857-4685-be1f-d57550cc96cc">
+      <Terms xmlns="http://schemas.microsoft.com/office/infopath/2007/PartnerControls"/>
+    </FeatureTagsTaxHTField0>
+    <PublishStatusLookup xmlns="4873beb7-5857-4685-be1f-d57550cc96cc">
+      <Value>1566889</Value>
+    </PublishStatusLookup>
+    <Providers xmlns="4873beb7-5857-4685-be1f-d57550cc96cc" xsi:nil="true"/>
+    <MachineTranslated xmlns="4873beb7-5857-4685-be1f-d57550cc96cc">false</MachineTranslated>
+    <OriginalSourceMarket xmlns="4873beb7-5857-4685-be1f-d57550cc96cc" xsi:nil="true"/>
+    <APDescription xmlns="4873beb7-5857-4685-be1f-d57550cc96cc" xsi:nil="true"/>
+    <ClipArtFilename xmlns="4873beb7-5857-4685-be1f-d57550cc96cc" xsi:nil="true"/>
+    <ContentItem xmlns="4873beb7-5857-4685-be1f-d57550cc96cc" xsi:nil="true"/>
+    <TPInstallLocation xmlns="4873beb7-5857-4685-be1f-d57550cc96cc" xsi:nil="true"/>
+    <PublishTargets xmlns="4873beb7-5857-4685-be1f-d57550cc96cc">OfficeOnlineVNext</PublishTargets>
+    <TimesCloned xmlns="4873beb7-5857-4685-be1f-d57550cc96cc" xsi:nil="true"/>
+    <AssetStart xmlns="4873beb7-5857-4685-be1f-d57550cc96cc">2012-05-23T08:44:00+00:00</AssetStart>
+    <Provider xmlns="4873beb7-5857-4685-be1f-d57550cc96cc" xsi:nil="true"/>
+    <AcquiredFrom xmlns="4873beb7-5857-4685-be1f-d57550cc96cc">Internal MS</AcquiredFrom>
+    <FriendlyTitle xmlns="4873beb7-5857-4685-be1f-d57550cc96cc" xsi:nil="true"/>
+    <LastHandOff xmlns="4873beb7-5857-4685-be1f-d57550cc96cc" xsi:nil="true"/>
+    <TPClientViewer xmlns="4873beb7-5857-4685-be1f-d57550cc96cc" xsi:nil="true"/>
+    <UACurrentWords xmlns="4873beb7-5857-4685-be1f-d57550cc96cc" xsi:nil="true"/>
+    <ArtSampleDocs xmlns="4873beb7-5857-4685-be1f-d57550cc96cc" xsi:nil="true"/>
+    <UALocRecommendation xmlns="4873beb7-5857-4685-be1f-d57550cc96cc">Localize</UALocRecommendation>
+    <Manager xmlns="4873beb7-5857-4685-be1f-d57550cc96cc" xsi:nil="true"/>
+    <ShowIn xmlns="4873beb7-5857-4685-be1f-d57550cc96cc">Show everywhere</ShowIn>
+    <UANotes xmlns="4873beb7-5857-4685-be1f-d57550cc96cc" xsi:nil="true"/>
+    <TemplateStatus xmlns="4873beb7-5857-4685-be1f-d57550cc96cc">Complete</TemplateStatus>
+    <InternalTagsTaxHTField0 xmlns="4873beb7-5857-4685-be1f-d57550cc96cc">
+      <Terms xmlns="http://schemas.microsoft.com/office/infopath/2007/PartnerControls"/>
+    </InternalTagsTaxHTField0>
+    <CSXHash xmlns="4873beb7-5857-4685-be1f-d57550cc96cc" xsi:nil="true"/>
+    <Downloads xmlns="4873beb7-5857-4685-be1f-d57550cc96cc">0</Downloads>
+    <VoteCount xmlns="4873beb7-5857-4685-be1f-d57550cc96cc" xsi:nil="true"/>
+    <OOCacheId xmlns="4873beb7-5857-4685-be1f-d57550cc96cc" xsi:nil="true"/>
+    <IsDeleted xmlns="4873beb7-5857-4685-be1f-d57550cc96cc">false</IsDeleted>
+    <AssetExpire xmlns="4873beb7-5857-4685-be1f-d57550cc96cc">2029-01-01T08:00:00+00:00</AssetExpire>
+    <DSATActionTaken xmlns="4873beb7-5857-4685-be1f-d57550cc96cc" xsi:nil="true"/>
+    <CSXSubmissionMarket xmlns="4873beb7-5857-4685-be1f-d57550cc96cc" xsi:nil="true"/>
+    <TPExecutable xmlns="4873beb7-5857-4685-be1f-d57550cc96cc" xsi:nil="true"/>
+    <SubmitterId xmlns="4873beb7-5857-4685-be1f-d57550cc96cc" xsi:nil="true"/>
+    <EditorialTags xmlns="4873beb7-5857-4685-be1f-d57550cc96cc" xsi:nil="true"/>
+    <ApprovalLog xmlns="4873beb7-5857-4685-be1f-d57550cc96cc" xsi:nil="true"/>
+    <AssetType xmlns="4873beb7-5857-4685-be1f-d57550cc96cc">TP</AssetType>
+    <BugNumber xmlns="4873beb7-5857-4685-be1f-d57550cc96cc" xsi:nil="true"/>
+    <CSXSubmissionDate xmlns="4873beb7-5857-4685-be1f-d57550cc96cc" xsi:nil="true"/>
+    <CSXUpdate xmlns="4873beb7-5857-4685-be1f-d57550cc96cc">false</CSXUpdate>
+    <Milestone xmlns="4873beb7-5857-4685-be1f-d57550cc96cc" xsi:nil="true"/>
+    <RecommendationsModifier xmlns="4873beb7-5857-4685-be1f-d57550cc96cc" xsi:nil="true"/>
+    <OriginAsset xmlns="4873beb7-5857-4685-be1f-d57550cc96cc" xsi:nil="true"/>
+    <TPComponent xmlns="4873beb7-5857-4685-be1f-d57550cc96cc" xsi:nil="true"/>
+    <AssetId xmlns="4873beb7-5857-4685-be1f-d57550cc96cc">TP102901017</AssetId>
+    <IntlLocPriority xmlns="4873beb7-5857-4685-be1f-d57550cc96cc" xsi:nil="true"/>
+    <PolicheckWords xmlns="4873beb7-5857-4685-be1f-d57550cc96cc" xsi:nil="true"/>
+    <TPLaunchHelpLink xmlns="4873beb7-5857-4685-be1f-d57550cc96cc" xsi:nil="true"/>
+    <TPApplication xmlns="4873beb7-5857-4685-be1f-d57550cc96cc" xsi:nil="true"/>
+    <CrawlForDependencies xmlns="4873beb7-5857-4685-be1f-d57550cc96cc">false</CrawlForDependencies>
+    <HandoffToMSDN xmlns="4873beb7-5857-4685-be1f-d57550cc96cc" xsi:nil="true"/>
+    <PlannedPubDate xmlns="4873beb7-5857-4685-be1f-d57550cc96cc" xsi:nil="true"/>
+    <IntlLangReviewer xmlns="4873beb7-5857-4685-be1f-d57550cc96cc" xsi:nil="true"/>
+    <TrustLevel xmlns="4873beb7-5857-4685-be1f-d57550cc96cc">1 Microsoft Managed Content</TrustLevel>
+    <LocLastLocAttemptVersionLookup xmlns="4873beb7-5857-4685-be1f-d57550cc96cc">836753</LocLastLocAttemptVersionLookup>
+    <IsSearchable xmlns="4873beb7-5857-4685-be1f-d57550cc96cc">true</IsSearchable>
+    <TemplateTemplateType xmlns="4873beb7-5857-4685-be1f-d57550cc96cc">PowerPoint Design Template</TemplateTemplateType>
+    <CampaignTagsTaxHTField0 xmlns="4873beb7-5857-4685-be1f-d57550cc96cc">
+      <Terms xmlns="http://schemas.microsoft.com/office/infopath/2007/PartnerControls"/>
+    </CampaignTagsTaxHTField0>
+    <TPNamespace xmlns="4873beb7-5857-4685-be1f-d57550cc96cc" xsi:nil="true"/>
+    <TaxCatchAll xmlns="4873beb7-5857-4685-be1f-d57550cc96cc"/>
+    <Markets xmlns="4873beb7-5857-4685-be1f-d57550cc96cc"/>
+    <UAProjectedTotalWords xmlns="4873beb7-5857-4685-be1f-d57550cc96cc" xsi:nil="true"/>
+    <IntlLangReview xmlns="4873beb7-5857-4685-be1f-d57550cc96cc">false</IntlLangReview>
+    <OutputCachingOn xmlns="4873beb7-5857-4685-be1f-d57550cc96cc">false</OutputCachingOn>
+    <AverageRating xmlns="4873beb7-5857-4685-be1f-d57550cc96cc" xsi:nil="true"/>
+    <APAuthor xmlns="4873beb7-5857-4685-be1f-d57550cc96cc">
+      <UserInfo>
+        <DisplayName>REDMOND\v-anij</DisplayName>
+        <AccountId>2469</AccountId>
+        <AccountType/>
+      </UserInfo>
+    </APAuthor>
+    <LocManualTestRequired xmlns="4873beb7-5857-4685-be1f-d57550cc96cc">false</LocManualTestRequired>
+    <TPCommandLine xmlns="4873beb7-5857-4685-be1f-d57550cc96cc" xsi:nil="true"/>
+    <TPAppVersion xmlns="4873beb7-5857-4685-be1f-d57550cc96cc" xsi:nil="true"/>
+    <EditorialStatus xmlns="4873beb7-5857-4685-be1f-d57550cc96cc">Complete</EditorialStatus>
+    <LastModifiedDateTime xmlns="4873beb7-5857-4685-be1f-d57550cc96cc" xsi:nil="true"/>
+    <ScenarioTagsTaxHTField0 xmlns="4873beb7-5857-4685-be1f-d57550cc96cc">
+      <Terms xmlns="http://schemas.microsoft.com/office/infopath/2007/PartnerControls"/>
+    </ScenarioTagsTaxHTField0>
+    <OriginalRelease xmlns="4873beb7-5857-4685-be1f-d57550cc96cc">15</OriginalRelease>
+    <TPLaunchHelpLinkType xmlns="4873beb7-5857-4685-be1f-d57550cc96cc">Template</TPLaunchHelpLinkType>
+    <LocalizationTagsTaxHTField0 xmlns="4873beb7-5857-4685-be1f-d57550cc96cc">
+      <Terms xmlns="http://schemas.microsoft.com/office/infopath/2007/PartnerControls"/>
+    </LocalizationTagsTaxHTField0>
+    <LocMarketGroupTiers2 xmlns="4873beb7-5857-4685-be1f-d57550cc96cc" xsi:nil="true"/>
+  </documentManagement>
+</p:properties>
+</file>
+
 <file path=customXml/itemProps1.xml><?xml version="1.0" encoding="utf-8"?>
 <ds:datastoreItem xmlns:ds="http://schemas.openxmlformats.org/officeDocument/2006/customXml" ds:itemID="{746CFF6F-D9AA-4BC0-911A-0A1356771912}">
   <ds:schemaRefs>
@@ -7054,22 +7252,6 @@
 </file>
 
 <file path=customXml/itemProps2.xml><?xml version="1.0" encoding="utf-8"?>
-<ds:datastoreItem xmlns:ds="http://schemas.openxmlformats.org/officeDocument/2006/customXml" ds:itemID="{04098515-0C12-46CF-BC7C-69B4A13CD5FA}">
-  <ds:schemaRefs>
-    <ds:schemaRef ds:uri="http://schemas.microsoft.com/office/infopath/2007/PartnerControls"/>
-    <ds:schemaRef ds:uri="http://purl.org/dc/elements/1.1/"/>
-    <ds:schemaRef ds:uri="http://purl.org/dc/terms/"/>
-    <ds:schemaRef ds:uri="http://schemas.microsoft.com/office/2006/documentManagement/types"/>
-    <ds:schemaRef ds:uri="http://purl.org/dc/dcmitype/"/>
-    <ds:schemaRef ds:uri="4873beb7-5857-4685-be1f-d57550cc96cc"/>
-    <ds:schemaRef ds:uri="http://schemas.openxmlformats.org/package/2006/metadata/core-properties"/>
-    <ds:schemaRef ds:uri="http://schemas.microsoft.com/office/2006/metadata/properties"/>
-    <ds:schemaRef ds:uri="http://www.w3.org/XML/1998/namespace"/>
-  </ds:schemaRefs>
-</ds:datastoreItem>
-</file>
-
-<file path=customXml/itemProps3.xml><?xml version="1.0" encoding="utf-8"?>
 <ds:datastoreItem xmlns:ds="http://schemas.openxmlformats.org/officeDocument/2006/customXml" ds:itemID="{0B5C6E15-39DC-470B-9445-F754B9458020}">
   <ds:schemaRefs>
     <ds:schemaRef ds:uri="http://schemas.microsoft.com/office/2006/metadata/contentType"/>
@@ -7085,4 +7267,20 @@
     <ds:schemaRef ds:uri="http://schemas.microsoft.com/internal/obd"/>
   </ds:schemaRefs>
 </ds:datastoreItem>
+</file>
+
+<file path=customXml/itemProps3.xml><?xml version="1.0" encoding="utf-8"?>
+<ds:datastoreItem xmlns:ds="http://schemas.openxmlformats.org/officeDocument/2006/customXml" ds:itemID="{04098515-0C12-46CF-BC7C-69B4A13CD5FA}">
+  <ds:schemaRefs>
+    <ds:schemaRef ds:uri="http://schemas.microsoft.com/office/infopath/2007/PartnerControls"/>
+    <ds:schemaRef ds:uri="http://purl.org/dc/elements/1.1/"/>
+    <ds:schemaRef ds:uri="http://purl.org/dc/terms/"/>
+    <ds:schemaRef ds:uri="http://schemas.microsoft.com/office/2006/documentManagement/types"/>
+    <ds:schemaRef ds:uri="http://purl.org/dc/dcmitype/"/>
+    <ds:schemaRef ds:uri="4873beb7-5857-4685-be1f-d57550cc96cc"/>
+    <ds:schemaRef ds:uri="http://schemas.openxmlformats.org/package/2006/metadata/core-properties"/>
+    <ds:schemaRef ds:uri="http://schemas.microsoft.com/office/2006/metadata/properties"/>
+    <ds:schemaRef ds:uri="http://www.w3.org/XML/1998/namespace"/>
+  </ds:schemaRefs>
+</ds:datastoreItem>
 </file>
</xml_diff>

<commit_message>
Final edits to PP For GitKraken Material
</commit_message>
<xml_diff>
--- a/GIT HUB Branching & Merging.pptx
+++ b/GIT HUB Branching & Merging.pptx
@@ -5,10 +5,10 @@
     <p:sldMasterId id="2147483648" r:id="rId4"/>
   </p:sldMasterIdLst>
   <p:notesMasterIdLst>
-    <p:notesMasterId r:id="rId14"/>
+    <p:notesMasterId r:id="rId16"/>
   </p:notesMasterIdLst>
   <p:handoutMasterIdLst>
-    <p:handoutMasterId r:id="rId15"/>
+    <p:handoutMasterId r:id="rId17"/>
   </p:handoutMasterIdLst>
   <p:sldIdLst>
     <p:sldId id="256" r:id="rId5"/>
@@ -20,6 +20,8 @@
     <p:sldId id="265" r:id="rId11"/>
     <p:sldId id="266" r:id="rId12"/>
     <p:sldId id="267" r:id="rId13"/>
+    <p:sldId id="268" r:id="rId14"/>
+    <p:sldId id="269" r:id="rId15"/>
   </p:sldIdLst>
   <p:sldSz cx="12192000" cy="6858000"/>
   <p:notesSz cx="6858000" cy="9144000"/>
@@ -3790,6 +3792,253 @@
       </p:transition>
     </mc:Fallback>
   </mc:AlternateContent>
+</p:sld>
+</file>
+
+<file path=ppt/slides/slide10.xml><?xml version="1.0" encoding="utf-8"?>
+<p:sld xmlns:a="http://schemas.openxmlformats.org/drawingml/2006/main" xmlns:r="http://schemas.openxmlformats.org/officeDocument/2006/relationships" xmlns:p="http://schemas.openxmlformats.org/presentationml/2006/main">
+  <p:cSld>
+    <p:spTree>
+      <p:nvGrpSpPr>
+        <p:cNvPr id="1" name=""/>
+        <p:cNvGrpSpPr/>
+        <p:nvPr/>
+      </p:nvGrpSpPr>
+      <p:grpSpPr>
+        <a:xfrm>
+          <a:off x="0" y="0"/>
+          <a:ext cx="0" cy="0"/>
+          <a:chOff x="0" y="0"/>
+          <a:chExt cx="0" cy="0"/>
+        </a:xfrm>
+      </p:grpSpPr>
+      <p:sp>
+        <p:nvSpPr>
+          <p:cNvPr id="5" name="Title 4">
+            <a:extLst>
+              <a:ext uri="{FF2B5EF4-FFF2-40B4-BE49-F238E27FC236}">
+                <a16:creationId xmlns:a16="http://schemas.microsoft.com/office/drawing/2014/main" id="{4268C492-29AE-4CDA-98EC-3F72CCF3ECCD}"/>
+              </a:ext>
+            </a:extLst>
+          </p:cNvPr>
+          <p:cNvSpPr>
+            <a:spLocks noGrp="1"/>
+          </p:cNvSpPr>
+          <p:nvPr>
+            <p:ph type="title"/>
+          </p:nvPr>
+        </p:nvSpPr>
+        <p:spPr>
+          <a:xfrm>
+            <a:off x="1524000" y="304800"/>
+            <a:ext cx="9144000" cy="1295400"/>
+          </a:xfrm>
+        </p:spPr>
+        <p:txBody>
+          <a:bodyPr>
+            <a:normAutofit fontScale="90000"/>
+          </a:bodyPr>
+          <a:lstStyle/>
+          <a:p>
+            <a:pPr algn="ctr"/>
+            <a:r>
+              <a:rPr lang="en-US" dirty="0" err="1">
+                <a:solidFill>
+                  <a:srgbClr val="92D050"/>
+                </a:solidFill>
+              </a:rPr>
+              <a:t>GitKraken</a:t>
+            </a:r>
+            <a:r>
+              <a:rPr lang="en-US" dirty="0">
+                <a:solidFill>
+                  <a:srgbClr val="92D050"/>
+                </a:solidFill>
+              </a:rPr>
+              <a:t> Graphical View</a:t>
+            </a:r>
+            <a:br>
+              <a:rPr lang="en-US" sz="3100" dirty="0">
+                <a:solidFill>
+                  <a:srgbClr val="92D050"/>
+                </a:solidFill>
+              </a:rPr>
+            </a:br>
+            <a:br>
+              <a:rPr lang="en-US" sz="3100" dirty="0">
+                <a:solidFill>
+                  <a:srgbClr val="92D050"/>
+                </a:solidFill>
+              </a:rPr>
+            </a:br>
+            <a:r>
+              <a:rPr lang="en-US" sz="2000" dirty="0">
+                <a:solidFill>
+                  <a:srgbClr val="92D050"/>
+                </a:solidFill>
+              </a:rPr>
+              <a:t>(What you are seeing is </a:t>
+            </a:r>
+            <a:r>
+              <a:rPr lang="en-US" sz="2000" dirty="0" err="1">
+                <a:solidFill>
+                  <a:srgbClr val="92D050"/>
+                </a:solidFill>
+              </a:rPr>
+              <a:t>Adam’sPPEdits</a:t>
+            </a:r>
+            <a:r>
+              <a:rPr lang="en-US" sz="2000" dirty="0">
+                <a:solidFill>
+                  <a:srgbClr val="92D050"/>
+                </a:solidFill>
+              </a:rPr>
+              <a:t> branch merging back into the master branch.)</a:t>
+            </a:r>
+            <a:endParaRPr lang="en-US" dirty="0"/>
+          </a:p>
+        </p:txBody>
+      </p:sp>
+      <p:pic>
+        <p:nvPicPr>
+          <p:cNvPr id="10" name="Content Placeholder 9">
+            <a:extLst>
+              <a:ext uri="{FF2B5EF4-FFF2-40B4-BE49-F238E27FC236}">
+                <a16:creationId xmlns:a16="http://schemas.microsoft.com/office/drawing/2014/main" id="{96B44A6E-FB94-4837-8F40-B22432DE83FD}"/>
+              </a:ext>
+            </a:extLst>
+          </p:cNvPr>
+          <p:cNvPicPr>
+            <a:picLocks noGrp="1" noChangeAspect="1"/>
+          </p:cNvPicPr>
+          <p:nvPr>
+            <p:ph idx="1"/>
+          </p:nvPr>
+        </p:nvPicPr>
+        <p:blipFill>
+          <a:blip r:embed="rId2">
+            <a:extLst>
+              <a:ext uri="{28A0092B-C50C-407E-A947-70E740481C1C}">
+                <a14:useLocalDpi xmlns:a14="http://schemas.microsoft.com/office/drawing/2010/main" val="0"/>
+              </a:ext>
+            </a:extLst>
+          </a:blip>
+          <a:stretch>
+            <a:fillRect/>
+          </a:stretch>
+        </p:blipFill>
+        <p:spPr>
+          <a:xfrm>
+            <a:off x="990600" y="2092002"/>
+            <a:ext cx="10134600" cy="4308798"/>
+          </a:xfrm>
+        </p:spPr>
+      </p:pic>
+    </p:spTree>
+    <p:extLst>
+      <p:ext uri="{BB962C8B-B14F-4D97-AF65-F5344CB8AC3E}">
+        <p14:creationId xmlns:p14="http://schemas.microsoft.com/office/powerpoint/2010/main" val="3140109940"/>
+      </p:ext>
+    </p:extLst>
+  </p:cSld>
+  <p:clrMapOvr>
+    <a:masterClrMapping/>
+  </p:clrMapOvr>
+</p:sld>
+</file>
+
+<file path=ppt/slides/slide11.xml><?xml version="1.0" encoding="utf-8"?>
+<p:sld xmlns:a="http://schemas.openxmlformats.org/drawingml/2006/main" xmlns:r="http://schemas.openxmlformats.org/officeDocument/2006/relationships" xmlns:p="http://schemas.openxmlformats.org/presentationml/2006/main">
+  <p:cSld>
+    <p:spTree>
+      <p:nvGrpSpPr>
+        <p:cNvPr id="1" name=""/>
+        <p:cNvGrpSpPr/>
+        <p:nvPr/>
+      </p:nvGrpSpPr>
+      <p:grpSpPr>
+        <a:xfrm>
+          <a:off x="0" y="0"/>
+          <a:ext cx="0" cy="0"/>
+          <a:chOff x="0" y="0"/>
+          <a:chExt cx="0" cy="0"/>
+        </a:xfrm>
+      </p:grpSpPr>
+      <p:sp>
+        <p:nvSpPr>
+          <p:cNvPr id="2" name="Title 1">
+            <a:extLst>
+              <a:ext uri="{FF2B5EF4-FFF2-40B4-BE49-F238E27FC236}">
+                <a16:creationId xmlns:a16="http://schemas.microsoft.com/office/drawing/2014/main" id="{C687B6E5-2CDA-4F64-AF56-998CC7C585F0}"/>
+              </a:ext>
+            </a:extLst>
+          </p:cNvPr>
+          <p:cNvSpPr>
+            <a:spLocks noGrp="1"/>
+          </p:cNvSpPr>
+          <p:nvPr>
+            <p:ph type="title"/>
+          </p:nvPr>
+        </p:nvSpPr>
+        <p:spPr>
+          <a:xfrm>
+            <a:off x="1524000" y="457200"/>
+            <a:ext cx="9144000" cy="2743200"/>
+          </a:xfrm>
+        </p:spPr>
+        <p:txBody>
+          <a:bodyPr/>
+          <a:lstStyle/>
+          <a:p>
+            <a:pPr algn="ctr"/>
+            <a:r>
+              <a:rPr lang="en-US" dirty="0"/>
+              <a:t>That’s all folks!</a:t>
+            </a:r>
+          </a:p>
+        </p:txBody>
+      </p:sp>
+      <p:sp>
+        <p:nvSpPr>
+          <p:cNvPr id="6" name="Text Placeholder 5">
+            <a:extLst>
+              <a:ext uri="{FF2B5EF4-FFF2-40B4-BE49-F238E27FC236}">
+                <a16:creationId xmlns:a16="http://schemas.microsoft.com/office/drawing/2014/main" id="{377C6317-A545-45BE-BAF0-A7D8413E60E3}"/>
+              </a:ext>
+            </a:extLst>
+          </p:cNvPr>
+          <p:cNvSpPr>
+            <a:spLocks noGrp="1"/>
+          </p:cNvSpPr>
+          <p:nvPr>
+            <p:ph type="body" idx="1"/>
+          </p:nvPr>
+        </p:nvSpPr>
+        <p:spPr/>
+        <p:txBody>
+          <a:bodyPr>
+            <a:normAutofit/>
+          </a:bodyPr>
+          <a:lstStyle/>
+          <a:p>
+            <a:pPr algn="ctr"/>
+            <a:r>
+              <a:rPr lang="en-US" sz="4000" dirty="0"/>
+              <a:t>Now lets all try it for ourselves.</a:t>
+            </a:r>
+          </a:p>
+        </p:txBody>
+      </p:sp>
+    </p:spTree>
+    <p:extLst>
+      <p:ext uri="{BB962C8B-B14F-4D97-AF65-F5344CB8AC3E}">
+        <p14:creationId xmlns:p14="http://schemas.microsoft.com/office/powerpoint/2010/main" val="3547668761"/>
+      </p:ext>
+    </p:extLst>
+  </p:cSld>
+  <p:clrMapOvr>
+    <a:masterClrMapping/>
+  </p:clrMapOvr>
 </p:sld>
 </file>
 
@@ -6078,6 +6327,132 @@
 </file>
 
 <file path=customXml/item2.xml><?xml version="1.0" encoding="utf-8"?>
+<p:properties xmlns:p="http://schemas.microsoft.com/office/2006/metadata/properties" xmlns:xsi="http://www.w3.org/2001/XMLSchema-instance" xmlns:pc="http://schemas.microsoft.com/office/infopath/2007/PartnerControls">
+  <documentManagement>
+    <DirectSourceMarket xmlns="4873beb7-5857-4685-be1f-d57550cc96cc" xsi:nil="true"/>
+    <ApprovalStatus xmlns="4873beb7-5857-4685-be1f-d57550cc96cc">InProgress</ApprovalStatus>
+    <MarketSpecific xmlns="4873beb7-5857-4685-be1f-d57550cc96cc">false</MarketSpecific>
+    <LocComments xmlns="4873beb7-5857-4685-be1f-d57550cc96cc" xsi:nil="true"/>
+    <ThumbnailAssetId xmlns="4873beb7-5857-4685-be1f-d57550cc96cc" xsi:nil="true"/>
+    <PrimaryImageGen xmlns="4873beb7-5857-4685-be1f-d57550cc96cc">true</PrimaryImageGen>
+    <LegacyData xmlns="4873beb7-5857-4685-be1f-d57550cc96cc" xsi:nil="true"/>
+    <LocRecommendedHandoff xmlns="4873beb7-5857-4685-be1f-d57550cc96cc" xsi:nil="true"/>
+    <BusinessGroup xmlns="4873beb7-5857-4685-be1f-d57550cc96cc" xsi:nil="true"/>
+    <BlockPublish xmlns="4873beb7-5857-4685-be1f-d57550cc96cc">false</BlockPublish>
+    <TPFriendlyName xmlns="4873beb7-5857-4685-be1f-d57550cc96cc" xsi:nil="true"/>
+    <NumericId xmlns="4873beb7-5857-4685-be1f-d57550cc96cc" xsi:nil="true"/>
+    <APEditor xmlns="4873beb7-5857-4685-be1f-d57550cc96cc">
+      <UserInfo>
+        <DisplayName/>
+        <AccountId xsi:nil="true"/>
+        <AccountType/>
+      </UserInfo>
+    </APEditor>
+    <SourceTitle xmlns="4873beb7-5857-4685-be1f-d57550cc96cc" xsi:nil="true"/>
+    <OpenTemplate xmlns="4873beb7-5857-4685-be1f-d57550cc96cc">true</OpenTemplate>
+    <UALocComments xmlns="4873beb7-5857-4685-be1f-d57550cc96cc" xsi:nil="true"/>
+    <ParentAssetId xmlns="4873beb7-5857-4685-be1f-d57550cc96cc" xsi:nil="true"/>
+    <IntlLangReviewDate xmlns="4873beb7-5857-4685-be1f-d57550cc96cc" xsi:nil="true"/>
+    <FeatureTagsTaxHTField0 xmlns="4873beb7-5857-4685-be1f-d57550cc96cc">
+      <Terms xmlns="http://schemas.microsoft.com/office/infopath/2007/PartnerControls"/>
+    </FeatureTagsTaxHTField0>
+    <PublishStatusLookup xmlns="4873beb7-5857-4685-be1f-d57550cc96cc">
+      <Value>1566889</Value>
+    </PublishStatusLookup>
+    <Providers xmlns="4873beb7-5857-4685-be1f-d57550cc96cc" xsi:nil="true"/>
+    <MachineTranslated xmlns="4873beb7-5857-4685-be1f-d57550cc96cc">false</MachineTranslated>
+    <OriginalSourceMarket xmlns="4873beb7-5857-4685-be1f-d57550cc96cc" xsi:nil="true"/>
+    <APDescription xmlns="4873beb7-5857-4685-be1f-d57550cc96cc" xsi:nil="true"/>
+    <ClipArtFilename xmlns="4873beb7-5857-4685-be1f-d57550cc96cc" xsi:nil="true"/>
+    <ContentItem xmlns="4873beb7-5857-4685-be1f-d57550cc96cc" xsi:nil="true"/>
+    <TPInstallLocation xmlns="4873beb7-5857-4685-be1f-d57550cc96cc" xsi:nil="true"/>
+    <PublishTargets xmlns="4873beb7-5857-4685-be1f-d57550cc96cc">OfficeOnlineVNext</PublishTargets>
+    <TimesCloned xmlns="4873beb7-5857-4685-be1f-d57550cc96cc" xsi:nil="true"/>
+    <AssetStart xmlns="4873beb7-5857-4685-be1f-d57550cc96cc">2012-05-23T08:44:00+00:00</AssetStart>
+    <Provider xmlns="4873beb7-5857-4685-be1f-d57550cc96cc" xsi:nil="true"/>
+    <AcquiredFrom xmlns="4873beb7-5857-4685-be1f-d57550cc96cc">Internal MS</AcquiredFrom>
+    <FriendlyTitle xmlns="4873beb7-5857-4685-be1f-d57550cc96cc" xsi:nil="true"/>
+    <LastHandOff xmlns="4873beb7-5857-4685-be1f-d57550cc96cc" xsi:nil="true"/>
+    <TPClientViewer xmlns="4873beb7-5857-4685-be1f-d57550cc96cc" xsi:nil="true"/>
+    <UACurrentWords xmlns="4873beb7-5857-4685-be1f-d57550cc96cc" xsi:nil="true"/>
+    <ArtSampleDocs xmlns="4873beb7-5857-4685-be1f-d57550cc96cc" xsi:nil="true"/>
+    <UALocRecommendation xmlns="4873beb7-5857-4685-be1f-d57550cc96cc">Localize</UALocRecommendation>
+    <Manager xmlns="4873beb7-5857-4685-be1f-d57550cc96cc" xsi:nil="true"/>
+    <ShowIn xmlns="4873beb7-5857-4685-be1f-d57550cc96cc">Show everywhere</ShowIn>
+    <UANotes xmlns="4873beb7-5857-4685-be1f-d57550cc96cc" xsi:nil="true"/>
+    <TemplateStatus xmlns="4873beb7-5857-4685-be1f-d57550cc96cc">Complete</TemplateStatus>
+    <InternalTagsTaxHTField0 xmlns="4873beb7-5857-4685-be1f-d57550cc96cc">
+      <Terms xmlns="http://schemas.microsoft.com/office/infopath/2007/PartnerControls"/>
+    </InternalTagsTaxHTField0>
+    <CSXHash xmlns="4873beb7-5857-4685-be1f-d57550cc96cc" xsi:nil="true"/>
+    <Downloads xmlns="4873beb7-5857-4685-be1f-d57550cc96cc">0</Downloads>
+    <VoteCount xmlns="4873beb7-5857-4685-be1f-d57550cc96cc" xsi:nil="true"/>
+    <OOCacheId xmlns="4873beb7-5857-4685-be1f-d57550cc96cc" xsi:nil="true"/>
+    <IsDeleted xmlns="4873beb7-5857-4685-be1f-d57550cc96cc">false</IsDeleted>
+    <AssetExpire xmlns="4873beb7-5857-4685-be1f-d57550cc96cc">2029-01-01T08:00:00+00:00</AssetExpire>
+    <DSATActionTaken xmlns="4873beb7-5857-4685-be1f-d57550cc96cc" xsi:nil="true"/>
+    <CSXSubmissionMarket xmlns="4873beb7-5857-4685-be1f-d57550cc96cc" xsi:nil="true"/>
+    <TPExecutable xmlns="4873beb7-5857-4685-be1f-d57550cc96cc" xsi:nil="true"/>
+    <SubmitterId xmlns="4873beb7-5857-4685-be1f-d57550cc96cc" xsi:nil="true"/>
+    <EditorialTags xmlns="4873beb7-5857-4685-be1f-d57550cc96cc" xsi:nil="true"/>
+    <ApprovalLog xmlns="4873beb7-5857-4685-be1f-d57550cc96cc" xsi:nil="true"/>
+    <AssetType xmlns="4873beb7-5857-4685-be1f-d57550cc96cc">TP</AssetType>
+    <BugNumber xmlns="4873beb7-5857-4685-be1f-d57550cc96cc" xsi:nil="true"/>
+    <CSXSubmissionDate xmlns="4873beb7-5857-4685-be1f-d57550cc96cc" xsi:nil="true"/>
+    <CSXUpdate xmlns="4873beb7-5857-4685-be1f-d57550cc96cc">false</CSXUpdate>
+    <Milestone xmlns="4873beb7-5857-4685-be1f-d57550cc96cc" xsi:nil="true"/>
+    <RecommendationsModifier xmlns="4873beb7-5857-4685-be1f-d57550cc96cc" xsi:nil="true"/>
+    <OriginAsset xmlns="4873beb7-5857-4685-be1f-d57550cc96cc" xsi:nil="true"/>
+    <TPComponent xmlns="4873beb7-5857-4685-be1f-d57550cc96cc" xsi:nil="true"/>
+    <AssetId xmlns="4873beb7-5857-4685-be1f-d57550cc96cc">TP102901017</AssetId>
+    <IntlLocPriority xmlns="4873beb7-5857-4685-be1f-d57550cc96cc" xsi:nil="true"/>
+    <PolicheckWords xmlns="4873beb7-5857-4685-be1f-d57550cc96cc" xsi:nil="true"/>
+    <TPLaunchHelpLink xmlns="4873beb7-5857-4685-be1f-d57550cc96cc" xsi:nil="true"/>
+    <TPApplication xmlns="4873beb7-5857-4685-be1f-d57550cc96cc" xsi:nil="true"/>
+    <CrawlForDependencies xmlns="4873beb7-5857-4685-be1f-d57550cc96cc">false</CrawlForDependencies>
+    <HandoffToMSDN xmlns="4873beb7-5857-4685-be1f-d57550cc96cc" xsi:nil="true"/>
+    <PlannedPubDate xmlns="4873beb7-5857-4685-be1f-d57550cc96cc" xsi:nil="true"/>
+    <IntlLangReviewer xmlns="4873beb7-5857-4685-be1f-d57550cc96cc" xsi:nil="true"/>
+    <TrustLevel xmlns="4873beb7-5857-4685-be1f-d57550cc96cc">1 Microsoft Managed Content</TrustLevel>
+    <LocLastLocAttemptVersionLookup xmlns="4873beb7-5857-4685-be1f-d57550cc96cc">836753</LocLastLocAttemptVersionLookup>
+    <IsSearchable xmlns="4873beb7-5857-4685-be1f-d57550cc96cc">true</IsSearchable>
+    <TemplateTemplateType xmlns="4873beb7-5857-4685-be1f-d57550cc96cc">PowerPoint Design Template</TemplateTemplateType>
+    <CampaignTagsTaxHTField0 xmlns="4873beb7-5857-4685-be1f-d57550cc96cc">
+      <Terms xmlns="http://schemas.microsoft.com/office/infopath/2007/PartnerControls"/>
+    </CampaignTagsTaxHTField0>
+    <TPNamespace xmlns="4873beb7-5857-4685-be1f-d57550cc96cc" xsi:nil="true"/>
+    <TaxCatchAll xmlns="4873beb7-5857-4685-be1f-d57550cc96cc"/>
+    <Markets xmlns="4873beb7-5857-4685-be1f-d57550cc96cc"/>
+    <UAProjectedTotalWords xmlns="4873beb7-5857-4685-be1f-d57550cc96cc" xsi:nil="true"/>
+    <IntlLangReview xmlns="4873beb7-5857-4685-be1f-d57550cc96cc">false</IntlLangReview>
+    <OutputCachingOn xmlns="4873beb7-5857-4685-be1f-d57550cc96cc">false</OutputCachingOn>
+    <AverageRating xmlns="4873beb7-5857-4685-be1f-d57550cc96cc" xsi:nil="true"/>
+    <APAuthor xmlns="4873beb7-5857-4685-be1f-d57550cc96cc">
+      <UserInfo>
+        <DisplayName>REDMOND\v-anij</DisplayName>
+        <AccountId>2469</AccountId>
+        <AccountType/>
+      </UserInfo>
+    </APAuthor>
+    <LocManualTestRequired xmlns="4873beb7-5857-4685-be1f-d57550cc96cc">false</LocManualTestRequired>
+    <TPCommandLine xmlns="4873beb7-5857-4685-be1f-d57550cc96cc" xsi:nil="true"/>
+    <TPAppVersion xmlns="4873beb7-5857-4685-be1f-d57550cc96cc" xsi:nil="true"/>
+    <EditorialStatus xmlns="4873beb7-5857-4685-be1f-d57550cc96cc">Complete</EditorialStatus>
+    <LastModifiedDateTime xmlns="4873beb7-5857-4685-be1f-d57550cc96cc" xsi:nil="true"/>
+    <ScenarioTagsTaxHTField0 xmlns="4873beb7-5857-4685-be1f-d57550cc96cc">
+      <Terms xmlns="http://schemas.microsoft.com/office/infopath/2007/PartnerControls"/>
+    </ScenarioTagsTaxHTField0>
+    <OriginalRelease xmlns="4873beb7-5857-4685-be1f-d57550cc96cc">15</OriginalRelease>
+    <TPLaunchHelpLinkType xmlns="4873beb7-5857-4685-be1f-d57550cc96cc">Template</TPLaunchHelpLinkType>
+    <LocalizationTagsTaxHTField0 xmlns="4873beb7-5857-4685-be1f-d57550cc96cc">
+      <Terms xmlns="http://schemas.microsoft.com/office/infopath/2007/PartnerControls"/>
+    </LocalizationTagsTaxHTField0>
+    <LocMarketGroupTiers2 xmlns="4873beb7-5857-4685-be1f-d57550cc96cc" xsi:nil="true"/>
+  </documentManagement>
+</p:properties>
+</file>
+
+<file path=customXml/item3.xml><?xml version="1.0" encoding="utf-8"?>
 <ct:contentTypeSchema xmlns:ct="http://schemas.microsoft.com/office/2006/metadata/contentType" xmlns:ma="http://schemas.microsoft.com/office/2006/metadata/properties/metaAttributes" ct:_="" ma:_="" ma:contentTypeName="TemplateFile" ma:contentTypeID="0x0101006EDDDB5EE6D98C44930B742096920B300400F5B6D36B3EF94B4E9A635CDF2A18F5B8" ma:contentTypeVersion="72" ma:contentTypeDescription="Create a new document." ma:contentTypeScope="" ma:versionID="a23e56308344d904b51738559c3d67c9">
   <xsd:schema xmlns:xsd="http://www.w3.org/2001/XMLSchema" xmlns:xs="http://www.w3.org/2001/XMLSchema" xmlns:p="http://schemas.microsoft.com/office/2006/metadata/properties" xmlns:ns2="4873beb7-5857-4685-be1f-d57550cc96cc" targetNamespace="http://schemas.microsoft.com/office/2006/metadata/properties" ma:root="true" ma:fieldsID="cd0908cc4600e77bf5da051303e00c8d" ns2:_="">
     <xsd:import namespace="4873beb7-5857-4685-be1f-d57550cc96cc"/>
@@ -7117,132 +7492,6 @@
 </ct:contentTypeSchema>
 </file>
 
-<file path=customXml/item3.xml><?xml version="1.0" encoding="utf-8"?>
-<p:properties xmlns:p="http://schemas.microsoft.com/office/2006/metadata/properties" xmlns:xsi="http://www.w3.org/2001/XMLSchema-instance" xmlns:pc="http://schemas.microsoft.com/office/infopath/2007/PartnerControls">
-  <documentManagement>
-    <DirectSourceMarket xmlns="4873beb7-5857-4685-be1f-d57550cc96cc" xsi:nil="true"/>
-    <ApprovalStatus xmlns="4873beb7-5857-4685-be1f-d57550cc96cc">InProgress</ApprovalStatus>
-    <MarketSpecific xmlns="4873beb7-5857-4685-be1f-d57550cc96cc">false</MarketSpecific>
-    <LocComments xmlns="4873beb7-5857-4685-be1f-d57550cc96cc" xsi:nil="true"/>
-    <ThumbnailAssetId xmlns="4873beb7-5857-4685-be1f-d57550cc96cc" xsi:nil="true"/>
-    <PrimaryImageGen xmlns="4873beb7-5857-4685-be1f-d57550cc96cc">true</PrimaryImageGen>
-    <LegacyData xmlns="4873beb7-5857-4685-be1f-d57550cc96cc" xsi:nil="true"/>
-    <LocRecommendedHandoff xmlns="4873beb7-5857-4685-be1f-d57550cc96cc" xsi:nil="true"/>
-    <BusinessGroup xmlns="4873beb7-5857-4685-be1f-d57550cc96cc" xsi:nil="true"/>
-    <BlockPublish xmlns="4873beb7-5857-4685-be1f-d57550cc96cc">false</BlockPublish>
-    <TPFriendlyName xmlns="4873beb7-5857-4685-be1f-d57550cc96cc" xsi:nil="true"/>
-    <NumericId xmlns="4873beb7-5857-4685-be1f-d57550cc96cc" xsi:nil="true"/>
-    <APEditor xmlns="4873beb7-5857-4685-be1f-d57550cc96cc">
-      <UserInfo>
-        <DisplayName/>
-        <AccountId xsi:nil="true"/>
-        <AccountType/>
-      </UserInfo>
-    </APEditor>
-    <SourceTitle xmlns="4873beb7-5857-4685-be1f-d57550cc96cc" xsi:nil="true"/>
-    <OpenTemplate xmlns="4873beb7-5857-4685-be1f-d57550cc96cc">true</OpenTemplate>
-    <UALocComments xmlns="4873beb7-5857-4685-be1f-d57550cc96cc" xsi:nil="true"/>
-    <ParentAssetId xmlns="4873beb7-5857-4685-be1f-d57550cc96cc" xsi:nil="true"/>
-    <IntlLangReviewDate xmlns="4873beb7-5857-4685-be1f-d57550cc96cc" xsi:nil="true"/>
-    <FeatureTagsTaxHTField0 xmlns="4873beb7-5857-4685-be1f-d57550cc96cc">
-      <Terms xmlns="http://schemas.microsoft.com/office/infopath/2007/PartnerControls"/>
-    </FeatureTagsTaxHTField0>
-    <PublishStatusLookup xmlns="4873beb7-5857-4685-be1f-d57550cc96cc">
-      <Value>1566889</Value>
-    </PublishStatusLookup>
-    <Providers xmlns="4873beb7-5857-4685-be1f-d57550cc96cc" xsi:nil="true"/>
-    <MachineTranslated xmlns="4873beb7-5857-4685-be1f-d57550cc96cc">false</MachineTranslated>
-    <OriginalSourceMarket xmlns="4873beb7-5857-4685-be1f-d57550cc96cc" xsi:nil="true"/>
-    <APDescription xmlns="4873beb7-5857-4685-be1f-d57550cc96cc" xsi:nil="true"/>
-    <ClipArtFilename xmlns="4873beb7-5857-4685-be1f-d57550cc96cc" xsi:nil="true"/>
-    <ContentItem xmlns="4873beb7-5857-4685-be1f-d57550cc96cc" xsi:nil="true"/>
-    <TPInstallLocation xmlns="4873beb7-5857-4685-be1f-d57550cc96cc" xsi:nil="true"/>
-    <PublishTargets xmlns="4873beb7-5857-4685-be1f-d57550cc96cc">OfficeOnlineVNext</PublishTargets>
-    <TimesCloned xmlns="4873beb7-5857-4685-be1f-d57550cc96cc" xsi:nil="true"/>
-    <AssetStart xmlns="4873beb7-5857-4685-be1f-d57550cc96cc">2012-05-23T08:44:00+00:00</AssetStart>
-    <Provider xmlns="4873beb7-5857-4685-be1f-d57550cc96cc" xsi:nil="true"/>
-    <AcquiredFrom xmlns="4873beb7-5857-4685-be1f-d57550cc96cc">Internal MS</AcquiredFrom>
-    <FriendlyTitle xmlns="4873beb7-5857-4685-be1f-d57550cc96cc" xsi:nil="true"/>
-    <LastHandOff xmlns="4873beb7-5857-4685-be1f-d57550cc96cc" xsi:nil="true"/>
-    <TPClientViewer xmlns="4873beb7-5857-4685-be1f-d57550cc96cc" xsi:nil="true"/>
-    <UACurrentWords xmlns="4873beb7-5857-4685-be1f-d57550cc96cc" xsi:nil="true"/>
-    <ArtSampleDocs xmlns="4873beb7-5857-4685-be1f-d57550cc96cc" xsi:nil="true"/>
-    <UALocRecommendation xmlns="4873beb7-5857-4685-be1f-d57550cc96cc">Localize</UALocRecommendation>
-    <Manager xmlns="4873beb7-5857-4685-be1f-d57550cc96cc" xsi:nil="true"/>
-    <ShowIn xmlns="4873beb7-5857-4685-be1f-d57550cc96cc">Show everywhere</ShowIn>
-    <UANotes xmlns="4873beb7-5857-4685-be1f-d57550cc96cc" xsi:nil="true"/>
-    <TemplateStatus xmlns="4873beb7-5857-4685-be1f-d57550cc96cc">Complete</TemplateStatus>
-    <InternalTagsTaxHTField0 xmlns="4873beb7-5857-4685-be1f-d57550cc96cc">
-      <Terms xmlns="http://schemas.microsoft.com/office/infopath/2007/PartnerControls"/>
-    </InternalTagsTaxHTField0>
-    <CSXHash xmlns="4873beb7-5857-4685-be1f-d57550cc96cc" xsi:nil="true"/>
-    <Downloads xmlns="4873beb7-5857-4685-be1f-d57550cc96cc">0</Downloads>
-    <VoteCount xmlns="4873beb7-5857-4685-be1f-d57550cc96cc" xsi:nil="true"/>
-    <OOCacheId xmlns="4873beb7-5857-4685-be1f-d57550cc96cc" xsi:nil="true"/>
-    <IsDeleted xmlns="4873beb7-5857-4685-be1f-d57550cc96cc">false</IsDeleted>
-    <AssetExpire xmlns="4873beb7-5857-4685-be1f-d57550cc96cc">2029-01-01T08:00:00+00:00</AssetExpire>
-    <DSATActionTaken xmlns="4873beb7-5857-4685-be1f-d57550cc96cc" xsi:nil="true"/>
-    <CSXSubmissionMarket xmlns="4873beb7-5857-4685-be1f-d57550cc96cc" xsi:nil="true"/>
-    <TPExecutable xmlns="4873beb7-5857-4685-be1f-d57550cc96cc" xsi:nil="true"/>
-    <SubmitterId xmlns="4873beb7-5857-4685-be1f-d57550cc96cc" xsi:nil="true"/>
-    <EditorialTags xmlns="4873beb7-5857-4685-be1f-d57550cc96cc" xsi:nil="true"/>
-    <ApprovalLog xmlns="4873beb7-5857-4685-be1f-d57550cc96cc" xsi:nil="true"/>
-    <AssetType xmlns="4873beb7-5857-4685-be1f-d57550cc96cc">TP</AssetType>
-    <BugNumber xmlns="4873beb7-5857-4685-be1f-d57550cc96cc" xsi:nil="true"/>
-    <CSXSubmissionDate xmlns="4873beb7-5857-4685-be1f-d57550cc96cc" xsi:nil="true"/>
-    <CSXUpdate xmlns="4873beb7-5857-4685-be1f-d57550cc96cc">false</CSXUpdate>
-    <Milestone xmlns="4873beb7-5857-4685-be1f-d57550cc96cc" xsi:nil="true"/>
-    <RecommendationsModifier xmlns="4873beb7-5857-4685-be1f-d57550cc96cc" xsi:nil="true"/>
-    <OriginAsset xmlns="4873beb7-5857-4685-be1f-d57550cc96cc" xsi:nil="true"/>
-    <TPComponent xmlns="4873beb7-5857-4685-be1f-d57550cc96cc" xsi:nil="true"/>
-    <AssetId xmlns="4873beb7-5857-4685-be1f-d57550cc96cc">TP102901017</AssetId>
-    <IntlLocPriority xmlns="4873beb7-5857-4685-be1f-d57550cc96cc" xsi:nil="true"/>
-    <PolicheckWords xmlns="4873beb7-5857-4685-be1f-d57550cc96cc" xsi:nil="true"/>
-    <TPLaunchHelpLink xmlns="4873beb7-5857-4685-be1f-d57550cc96cc" xsi:nil="true"/>
-    <TPApplication xmlns="4873beb7-5857-4685-be1f-d57550cc96cc" xsi:nil="true"/>
-    <CrawlForDependencies xmlns="4873beb7-5857-4685-be1f-d57550cc96cc">false</CrawlForDependencies>
-    <HandoffToMSDN xmlns="4873beb7-5857-4685-be1f-d57550cc96cc" xsi:nil="true"/>
-    <PlannedPubDate xmlns="4873beb7-5857-4685-be1f-d57550cc96cc" xsi:nil="true"/>
-    <IntlLangReviewer xmlns="4873beb7-5857-4685-be1f-d57550cc96cc" xsi:nil="true"/>
-    <TrustLevel xmlns="4873beb7-5857-4685-be1f-d57550cc96cc">1 Microsoft Managed Content</TrustLevel>
-    <LocLastLocAttemptVersionLookup xmlns="4873beb7-5857-4685-be1f-d57550cc96cc">836753</LocLastLocAttemptVersionLookup>
-    <IsSearchable xmlns="4873beb7-5857-4685-be1f-d57550cc96cc">true</IsSearchable>
-    <TemplateTemplateType xmlns="4873beb7-5857-4685-be1f-d57550cc96cc">PowerPoint Design Template</TemplateTemplateType>
-    <CampaignTagsTaxHTField0 xmlns="4873beb7-5857-4685-be1f-d57550cc96cc">
-      <Terms xmlns="http://schemas.microsoft.com/office/infopath/2007/PartnerControls"/>
-    </CampaignTagsTaxHTField0>
-    <TPNamespace xmlns="4873beb7-5857-4685-be1f-d57550cc96cc" xsi:nil="true"/>
-    <TaxCatchAll xmlns="4873beb7-5857-4685-be1f-d57550cc96cc"/>
-    <Markets xmlns="4873beb7-5857-4685-be1f-d57550cc96cc"/>
-    <UAProjectedTotalWords xmlns="4873beb7-5857-4685-be1f-d57550cc96cc" xsi:nil="true"/>
-    <IntlLangReview xmlns="4873beb7-5857-4685-be1f-d57550cc96cc">false</IntlLangReview>
-    <OutputCachingOn xmlns="4873beb7-5857-4685-be1f-d57550cc96cc">false</OutputCachingOn>
-    <AverageRating xmlns="4873beb7-5857-4685-be1f-d57550cc96cc" xsi:nil="true"/>
-    <APAuthor xmlns="4873beb7-5857-4685-be1f-d57550cc96cc">
-      <UserInfo>
-        <DisplayName>REDMOND\v-anij</DisplayName>
-        <AccountId>2469</AccountId>
-        <AccountType/>
-      </UserInfo>
-    </APAuthor>
-    <LocManualTestRequired xmlns="4873beb7-5857-4685-be1f-d57550cc96cc">false</LocManualTestRequired>
-    <TPCommandLine xmlns="4873beb7-5857-4685-be1f-d57550cc96cc" xsi:nil="true"/>
-    <TPAppVersion xmlns="4873beb7-5857-4685-be1f-d57550cc96cc" xsi:nil="true"/>
-    <EditorialStatus xmlns="4873beb7-5857-4685-be1f-d57550cc96cc">Complete</EditorialStatus>
-    <LastModifiedDateTime xmlns="4873beb7-5857-4685-be1f-d57550cc96cc" xsi:nil="true"/>
-    <ScenarioTagsTaxHTField0 xmlns="4873beb7-5857-4685-be1f-d57550cc96cc">
-      <Terms xmlns="http://schemas.microsoft.com/office/infopath/2007/PartnerControls"/>
-    </ScenarioTagsTaxHTField0>
-    <OriginalRelease xmlns="4873beb7-5857-4685-be1f-d57550cc96cc">15</OriginalRelease>
-    <TPLaunchHelpLinkType xmlns="4873beb7-5857-4685-be1f-d57550cc96cc">Template</TPLaunchHelpLinkType>
-    <LocalizationTagsTaxHTField0 xmlns="4873beb7-5857-4685-be1f-d57550cc96cc">
-      <Terms xmlns="http://schemas.microsoft.com/office/infopath/2007/PartnerControls"/>
-    </LocalizationTagsTaxHTField0>
-    <LocMarketGroupTiers2 xmlns="4873beb7-5857-4685-be1f-d57550cc96cc" xsi:nil="true"/>
-  </documentManagement>
-</p:properties>
-</file>
-
 <file path=customXml/itemProps1.xml><?xml version="1.0" encoding="utf-8"?>
 <ds:datastoreItem xmlns:ds="http://schemas.openxmlformats.org/officeDocument/2006/customXml" ds:itemID="{746CFF6F-D9AA-4BC0-911A-0A1356771912}">
   <ds:schemaRefs>
@@ -7252,6 +7501,22 @@
 </file>
 
 <file path=customXml/itemProps2.xml><?xml version="1.0" encoding="utf-8"?>
+<ds:datastoreItem xmlns:ds="http://schemas.openxmlformats.org/officeDocument/2006/customXml" ds:itemID="{04098515-0C12-46CF-BC7C-69B4A13CD5FA}">
+  <ds:schemaRefs>
+    <ds:schemaRef ds:uri="http://schemas.microsoft.com/office/infopath/2007/PartnerControls"/>
+    <ds:schemaRef ds:uri="http://purl.org/dc/elements/1.1/"/>
+    <ds:schemaRef ds:uri="http://purl.org/dc/terms/"/>
+    <ds:schemaRef ds:uri="http://schemas.microsoft.com/office/2006/documentManagement/types"/>
+    <ds:schemaRef ds:uri="http://purl.org/dc/dcmitype/"/>
+    <ds:schemaRef ds:uri="4873beb7-5857-4685-be1f-d57550cc96cc"/>
+    <ds:schemaRef ds:uri="http://schemas.openxmlformats.org/package/2006/metadata/core-properties"/>
+    <ds:schemaRef ds:uri="http://schemas.microsoft.com/office/2006/metadata/properties"/>
+    <ds:schemaRef ds:uri="http://www.w3.org/XML/1998/namespace"/>
+  </ds:schemaRefs>
+</ds:datastoreItem>
+</file>
+
+<file path=customXml/itemProps3.xml><?xml version="1.0" encoding="utf-8"?>
 <ds:datastoreItem xmlns:ds="http://schemas.openxmlformats.org/officeDocument/2006/customXml" ds:itemID="{0B5C6E15-39DC-470B-9445-F754B9458020}">
   <ds:schemaRefs>
     <ds:schemaRef ds:uri="http://schemas.microsoft.com/office/2006/metadata/contentType"/>
@@ -7267,20 +7532,4 @@
     <ds:schemaRef ds:uri="http://schemas.microsoft.com/internal/obd"/>
   </ds:schemaRefs>
 </ds:datastoreItem>
-</file>
-
-<file path=customXml/itemProps3.xml><?xml version="1.0" encoding="utf-8"?>
-<ds:datastoreItem xmlns:ds="http://schemas.openxmlformats.org/officeDocument/2006/customXml" ds:itemID="{04098515-0C12-46CF-BC7C-69B4A13CD5FA}">
-  <ds:schemaRefs>
-    <ds:schemaRef ds:uri="http://schemas.microsoft.com/office/infopath/2007/PartnerControls"/>
-    <ds:schemaRef ds:uri="http://purl.org/dc/elements/1.1/"/>
-    <ds:schemaRef ds:uri="http://purl.org/dc/terms/"/>
-    <ds:schemaRef ds:uri="http://schemas.microsoft.com/office/2006/documentManagement/types"/>
-    <ds:schemaRef ds:uri="http://purl.org/dc/dcmitype/"/>
-    <ds:schemaRef ds:uri="4873beb7-5857-4685-be1f-d57550cc96cc"/>
-    <ds:schemaRef ds:uri="http://schemas.openxmlformats.org/package/2006/metadata/core-properties"/>
-    <ds:schemaRef ds:uri="http://schemas.microsoft.com/office/2006/metadata/properties"/>
-    <ds:schemaRef ds:uri="http://www.w3.org/XML/1998/namespace"/>
-  </ds:schemaRefs>
-</ds:datastoreItem>
 </file>
</xml_diff>